<commit_message>
Flesh out online boutique example (#240)
* Add files via upload

* Add files via upload

* Document layering of platforms

* Minor tweaks to the documentation about platform layering

* Refactor Kubernetes profile
Update example services

* Add hosting relationships

* Add properties to endpoint capabilities in Kubernetes Service and MicroService nodes

* Add capability and requirement mappings to substituting template
</commit_message>
<xml_diff>
--- a/profiles/community/tosca/platform/sources/platforms.pptx
+++ b/profiles/community/tosca/platform/sources/platforms.pptx
@@ -6,6 +6,7 @@
   </p:sldMasterIdLst>
   <p:sldIdLst>
     <p:sldId id="256" r:id="rId2"/>
+    <p:sldId id="272" r:id="rId3"/>
   </p:sldIdLst>
   <p:sldSz cx="12192000" cy="6858000"/>
   <p:notesSz cx="6858000" cy="9144000"/>
@@ -259,7 +260,7 @@
           <a:p>
             <a:fld id="{5BAF7096-B8B4-4A3B-8A26-165AAEF12400}" type="datetimeFigureOut">
               <a:rPr lang="en-US" smtClean="0"/>
-              <a:t>9/2/2025</a:t>
+              <a:t>10/24/2025</a:t>
             </a:fld>
             <a:endParaRPr lang="en-US"/>
           </a:p>
@@ -457,7 +458,7 @@
           <a:p>
             <a:fld id="{5BAF7096-B8B4-4A3B-8A26-165AAEF12400}" type="datetimeFigureOut">
               <a:rPr lang="en-US" smtClean="0"/>
-              <a:t>9/2/2025</a:t>
+              <a:t>10/24/2025</a:t>
             </a:fld>
             <a:endParaRPr lang="en-US"/>
           </a:p>
@@ -665,7 +666,7 @@
           <a:p>
             <a:fld id="{5BAF7096-B8B4-4A3B-8A26-165AAEF12400}" type="datetimeFigureOut">
               <a:rPr lang="en-US" smtClean="0"/>
-              <a:t>9/2/2025</a:t>
+              <a:t>10/24/2025</a:t>
             </a:fld>
             <a:endParaRPr lang="en-US"/>
           </a:p>
@@ -863,7 +864,7 @@
           <a:p>
             <a:fld id="{5BAF7096-B8B4-4A3B-8A26-165AAEF12400}" type="datetimeFigureOut">
               <a:rPr lang="en-US" smtClean="0"/>
-              <a:t>9/2/2025</a:t>
+              <a:t>10/24/2025</a:t>
             </a:fld>
             <a:endParaRPr lang="en-US"/>
           </a:p>
@@ -1138,7 +1139,7 @@
           <a:p>
             <a:fld id="{5BAF7096-B8B4-4A3B-8A26-165AAEF12400}" type="datetimeFigureOut">
               <a:rPr lang="en-US" smtClean="0"/>
-              <a:t>9/2/2025</a:t>
+              <a:t>10/24/2025</a:t>
             </a:fld>
             <a:endParaRPr lang="en-US"/>
           </a:p>
@@ -1403,7 +1404,7 @@
           <a:p>
             <a:fld id="{5BAF7096-B8B4-4A3B-8A26-165AAEF12400}" type="datetimeFigureOut">
               <a:rPr lang="en-US" smtClean="0"/>
-              <a:t>9/2/2025</a:t>
+              <a:t>10/24/2025</a:t>
             </a:fld>
             <a:endParaRPr lang="en-US"/>
           </a:p>
@@ -1815,7 +1816,7 @@
           <a:p>
             <a:fld id="{5BAF7096-B8B4-4A3B-8A26-165AAEF12400}" type="datetimeFigureOut">
               <a:rPr lang="en-US" smtClean="0"/>
-              <a:t>9/2/2025</a:t>
+              <a:t>10/24/2025</a:t>
             </a:fld>
             <a:endParaRPr lang="en-US"/>
           </a:p>
@@ -1956,7 +1957,7 @@
           <a:p>
             <a:fld id="{5BAF7096-B8B4-4A3B-8A26-165AAEF12400}" type="datetimeFigureOut">
               <a:rPr lang="en-US" smtClean="0"/>
-              <a:t>9/2/2025</a:t>
+              <a:t>10/24/2025</a:t>
             </a:fld>
             <a:endParaRPr lang="en-US"/>
           </a:p>
@@ -2069,7 +2070,7 @@
           <a:p>
             <a:fld id="{5BAF7096-B8B4-4A3B-8A26-165AAEF12400}" type="datetimeFigureOut">
               <a:rPr lang="en-US" smtClean="0"/>
-              <a:t>9/2/2025</a:t>
+              <a:t>10/24/2025</a:t>
             </a:fld>
             <a:endParaRPr lang="en-US"/>
           </a:p>
@@ -2380,7 +2381,7 @@
           <a:p>
             <a:fld id="{5BAF7096-B8B4-4A3B-8A26-165AAEF12400}" type="datetimeFigureOut">
               <a:rPr lang="en-US" smtClean="0"/>
-              <a:t>9/2/2025</a:t>
+              <a:t>10/24/2025</a:t>
             </a:fld>
             <a:endParaRPr lang="en-US"/>
           </a:p>
@@ -2668,7 +2669,7 @@
           <a:p>
             <a:fld id="{5BAF7096-B8B4-4A3B-8A26-165AAEF12400}" type="datetimeFigureOut">
               <a:rPr lang="en-US" smtClean="0"/>
-              <a:t>9/2/2025</a:t>
+              <a:t>10/24/2025</a:t>
             </a:fld>
             <a:endParaRPr lang="en-US"/>
           </a:p>
@@ -2909,7 +2910,7 @@
           <a:p>
             <a:fld id="{5BAF7096-B8B4-4A3B-8A26-165AAEF12400}" type="datetimeFigureOut">
               <a:rPr lang="en-US" smtClean="0"/>
-              <a:t>9/2/2025</a:t>
+              <a:t>10/24/2025</a:t>
             </a:fld>
             <a:endParaRPr lang="en-US"/>
           </a:p>
@@ -3759,6 +3760,3608 @@
 </p:sld>
 </file>
 
+<file path=ppt/slides/slide2.xml><?xml version="1.0" encoding="utf-8"?>
+<p:sld xmlns:a="http://schemas.openxmlformats.org/drawingml/2006/main" xmlns:r="http://schemas.openxmlformats.org/officeDocument/2006/relationships" xmlns:p="http://schemas.openxmlformats.org/presentationml/2006/main">
+  <p:cSld>
+    <p:spTree>
+      <p:nvGrpSpPr>
+        <p:cNvPr id="1" name=""/>
+        <p:cNvGrpSpPr/>
+        <p:nvPr/>
+      </p:nvGrpSpPr>
+      <p:grpSpPr>
+        <a:xfrm>
+          <a:off x="0" y="0"/>
+          <a:ext cx="0" cy="0"/>
+          <a:chOff x="0" y="0"/>
+          <a:chExt cx="0" cy="0"/>
+        </a:xfrm>
+      </p:grpSpPr>
+      <p:grpSp>
+        <p:nvGrpSpPr>
+          <p:cNvPr id="158" name="Group 157">
+            <a:extLst>
+              <a:ext uri="{FF2B5EF4-FFF2-40B4-BE49-F238E27FC236}">
+                <a16:creationId xmlns:a16="http://schemas.microsoft.com/office/drawing/2014/main" id="{89B5453C-5C0C-A119-4649-6648B96F22D2}"/>
+              </a:ext>
+            </a:extLst>
+          </p:cNvPr>
+          <p:cNvGrpSpPr/>
+          <p:nvPr/>
+        </p:nvGrpSpPr>
+        <p:grpSpPr>
+          <a:xfrm>
+            <a:off x="4546712" y="1548208"/>
+            <a:ext cx="3098576" cy="3761585"/>
+            <a:chOff x="3034142" y="1397252"/>
+            <a:chExt cx="3098576" cy="3761585"/>
+          </a:xfrm>
+        </p:grpSpPr>
+        <p:grpSp>
+          <p:nvGrpSpPr>
+            <p:cNvPr id="7" name="Group 6">
+              <a:extLst>
+                <a:ext uri="{FF2B5EF4-FFF2-40B4-BE49-F238E27FC236}">
+                  <a16:creationId xmlns:a16="http://schemas.microsoft.com/office/drawing/2014/main" id="{4A70A9DF-47B9-CEAD-865F-0834AE9A2B1A}"/>
+                </a:ext>
+              </a:extLst>
+            </p:cNvPr>
+            <p:cNvGrpSpPr/>
+            <p:nvPr/>
+          </p:nvGrpSpPr>
+          <p:grpSpPr>
+            <a:xfrm>
+              <a:off x="3034142" y="4167805"/>
+              <a:ext cx="771421" cy="991032"/>
+              <a:chOff x="3816079" y="4223863"/>
+              <a:chExt cx="771421" cy="991032"/>
+            </a:xfrm>
+          </p:grpSpPr>
+          <p:sp>
+            <p:nvSpPr>
+              <p:cNvPr id="2" name="Rectangle 1">
+                <a:extLst>
+                  <a:ext uri="{FF2B5EF4-FFF2-40B4-BE49-F238E27FC236}">
+                    <a16:creationId xmlns:a16="http://schemas.microsoft.com/office/drawing/2014/main" id="{A766DE60-5600-8066-7EC4-37760E70BB23}"/>
+                  </a:ext>
+                </a:extLst>
+              </p:cNvPr>
+              <p:cNvSpPr/>
+              <p:nvPr/>
+            </p:nvSpPr>
+            <p:spPr>
+              <a:xfrm>
+                <a:off x="3816079" y="4722603"/>
+                <a:ext cx="771421" cy="250978"/>
+              </a:xfrm>
+              <a:prstGeom prst="rect">
+                <a:avLst/>
+              </a:prstGeom>
+              <a:solidFill>
+                <a:schemeClr val="bg1">
+                  <a:lumMod val="95000"/>
+                </a:schemeClr>
+              </a:solidFill>
+              <a:ln w="19050">
+                <a:solidFill>
+                  <a:schemeClr val="bg2"/>
+                </a:solidFill>
+              </a:ln>
+            </p:spPr>
+            <p:style>
+              <a:lnRef idx="2">
+                <a:schemeClr val="accent1">
+                  <a:shade val="50000"/>
+                </a:schemeClr>
+              </a:lnRef>
+              <a:fillRef idx="1">
+                <a:schemeClr val="accent1"/>
+              </a:fillRef>
+              <a:effectRef idx="0">
+                <a:schemeClr val="accent1"/>
+              </a:effectRef>
+              <a:fontRef idx="minor">
+                <a:schemeClr val="lt1"/>
+              </a:fontRef>
+            </p:style>
+            <p:txBody>
+              <a:bodyPr lIns="0" rIns="0" rtlCol="0" anchor="ctr"/>
+              <a:lstStyle/>
+              <a:p>
+                <a:pPr marL="0" marR="0" lvl="0" indent="0" algn="ctr" defTabSz="914400" rtl="0" eaLnBrk="1" fontAlgn="auto" latinLnBrk="0" hangingPunct="1">
+                  <a:lnSpc>
+                    <a:spcPct val="100000"/>
+                  </a:lnSpc>
+                  <a:spcBef>
+                    <a:spcPts val="0"/>
+                  </a:spcBef>
+                  <a:spcAft>
+                    <a:spcPts val="0"/>
+                  </a:spcAft>
+                  <a:buClrTx/>
+                  <a:buSzTx/>
+                  <a:buFontTx/>
+                  <a:buNone/>
+                  <a:tabLst/>
+                  <a:defRPr/>
+                </a:pPr>
+                <a:r>
+                  <a:rPr kumimoji="0" lang="en-US" sz="900" b="0" i="0" u="none" strike="noStrike" kern="1200" cap="none" spc="0" normalizeH="0" baseline="0" noProof="0" dirty="0" err="1">
+                    <a:ln>
+                      <a:noFill/>
+                    </a:ln>
+                    <a:solidFill>
+                      <a:prstClr val="black"/>
+                    </a:solidFill>
+                    <a:effectLst/>
+                    <a:uLnTx/>
+                    <a:uFillTx/>
+                    <a:ea typeface="+mn-ea"/>
+                    <a:cs typeface="+mn-cs"/>
+                  </a:rPr>
+                  <a:t>AWSRegion</a:t>
+                </a:r>
+                <a:endParaRPr kumimoji="0" lang="en-US" sz="900" b="0" i="0" u="none" strike="noStrike" kern="1200" cap="none" spc="0" normalizeH="0" baseline="0" noProof="0" dirty="0">
+                  <a:ln>
+                    <a:noFill/>
+                  </a:ln>
+                  <a:solidFill>
+                    <a:prstClr val="black"/>
+                  </a:solidFill>
+                  <a:effectLst/>
+                  <a:uLnTx/>
+                  <a:uFillTx/>
+                  <a:ea typeface="+mn-ea"/>
+                  <a:cs typeface="+mn-cs"/>
+                </a:endParaRPr>
+              </a:p>
+            </p:txBody>
+          </p:sp>
+          <p:sp>
+            <p:nvSpPr>
+              <p:cNvPr id="3" name="Rectangle: Rounded Corners 2">
+                <a:extLst>
+                  <a:ext uri="{FF2B5EF4-FFF2-40B4-BE49-F238E27FC236}">
+                    <a16:creationId xmlns:a16="http://schemas.microsoft.com/office/drawing/2014/main" id="{708E7CFE-00D5-094D-1788-53F3B216125E}"/>
+                  </a:ext>
+                </a:extLst>
+              </p:cNvPr>
+              <p:cNvSpPr/>
+              <p:nvPr/>
+            </p:nvSpPr>
+            <p:spPr>
+              <a:xfrm>
+                <a:off x="3816080" y="4399416"/>
+                <a:ext cx="771420" cy="815479"/>
+              </a:xfrm>
+              <a:prstGeom prst="roundRect">
+                <a:avLst/>
+              </a:prstGeom>
+              <a:noFill/>
+              <a:ln w="19050">
+                <a:solidFill>
+                  <a:schemeClr val="tx1"/>
+                </a:solidFill>
+              </a:ln>
+            </p:spPr>
+            <p:style>
+              <a:lnRef idx="2">
+                <a:schemeClr val="accent1">
+                  <a:shade val="50000"/>
+                </a:schemeClr>
+              </a:lnRef>
+              <a:fillRef idx="1">
+                <a:schemeClr val="accent1"/>
+              </a:fillRef>
+              <a:effectRef idx="0">
+                <a:schemeClr val="accent1"/>
+              </a:effectRef>
+              <a:fontRef idx="minor">
+                <a:schemeClr val="lt1"/>
+              </a:fontRef>
+            </p:style>
+            <p:txBody>
+              <a:bodyPr lIns="45720" tIns="0" bIns="9144" rtlCol="0" anchor="b" anchorCtr="0"/>
+              <a:lstStyle/>
+              <a:p>
+                <a:pPr marL="0" marR="0" lvl="0" indent="0" algn="l" defTabSz="914400" rtl="0" eaLnBrk="1" fontAlgn="auto" latinLnBrk="0" hangingPunct="1">
+                  <a:lnSpc>
+                    <a:spcPct val="100000"/>
+                  </a:lnSpc>
+                  <a:spcBef>
+                    <a:spcPts val="0"/>
+                  </a:spcBef>
+                  <a:spcAft>
+                    <a:spcPts val="0"/>
+                  </a:spcAft>
+                  <a:buClrTx/>
+                  <a:buSzTx/>
+                  <a:buFontTx/>
+                  <a:buNone/>
+                  <a:tabLst/>
+                  <a:defRPr/>
+                </a:pPr>
+                <a:r>
+                  <a:rPr lang="en-US" sz="800" dirty="0">
+                    <a:solidFill>
+                      <a:prstClr val="black"/>
+                    </a:solidFill>
+                  </a:rPr>
+                  <a:t>us-west-1</a:t>
+                </a:r>
+                <a:endParaRPr kumimoji="0" lang="en-US" sz="800" b="0" i="0" u="none" strike="noStrike" kern="1200" cap="none" spc="0" normalizeH="0" baseline="0" noProof="0" dirty="0">
+                  <a:ln>
+                    <a:noFill/>
+                  </a:ln>
+                  <a:solidFill>
+                    <a:prstClr val="black"/>
+                  </a:solidFill>
+                  <a:effectLst/>
+                  <a:uLnTx/>
+                  <a:uFillTx/>
+                  <a:ea typeface="+mn-ea"/>
+                  <a:cs typeface="+mn-cs"/>
+                </a:endParaRPr>
+              </a:p>
+            </p:txBody>
+          </p:sp>
+          <p:sp>
+            <p:nvSpPr>
+              <p:cNvPr id="4" name="Arrow: Chevron 3">
+                <a:extLst>
+                  <a:ext uri="{FF2B5EF4-FFF2-40B4-BE49-F238E27FC236}">
+                    <a16:creationId xmlns:a16="http://schemas.microsoft.com/office/drawing/2014/main" id="{7CCFF26C-1AEC-D238-D76B-951ECFECECF8}"/>
+                  </a:ext>
+                </a:extLst>
+              </p:cNvPr>
+              <p:cNvSpPr/>
+              <p:nvPr/>
+            </p:nvSpPr>
+            <p:spPr>
+              <a:xfrm rot="5400000">
+                <a:off x="4026243" y="4166150"/>
+                <a:ext cx="351106" cy="466531"/>
+              </a:xfrm>
+              <a:prstGeom prst="chevron">
+                <a:avLst>
+                  <a:gd name="adj" fmla="val 14000"/>
+                </a:avLst>
+              </a:prstGeom>
+              <a:solidFill>
+                <a:schemeClr val="bg1"/>
+              </a:solidFill>
+              <a:ln w="12700">
+                <a:solidFill>
+                  <a:schemeClr val="tx1"/>
+                </a:solidFill>
+              </a:ln>
+            </p:spPr>
+            <p:style>
+              <a:lnRef idx="2">
+                <a:schemeClr val="accent1">
+                  <a:shade val="50000"/>
+                </a:schemeClr>
+              </a:lnRef>
+              <a:fillRef idx="1">
+                <a:schemeClr val="accent1"/>
+              </a:fillRef>
+              <a:effectRef idx="0">
+                <a:schemeClr val="accent1"/>
+              </a:effectRef>
+              <a:fontRef idx="minor">
+                <a:schemeClr val="lt1"/>
+              </a:fontRef>
+            </p:style>
+            <p:txBody>
+              <a:bodyPr tIns="0" rtlCol="0" anchor="t" anchorCtr="0"/>
+              <a:lstStyle/>
+              <a:p>
+                <a:pPr marL="0" marR="0" lvl="0" indent="0" algn="l" defTabSz="914400" rtl="0" eaLnBrk="1" fontAlgn="auto" latinLnBrk="0" hangingPunct="1">
+                  <a:lnSpc>
+                    <a:spcPct val="100000"/>
+                  </a:lnSpc>
+                  <a:spcBef>
+                    <a:spcPts val="0"/>
+                  </a:spcBef>
+                  <a:spcAft>
+                    <a:spcPts val="0"/>
+                  </a:spcAft>
+                  <a:buClrTx/>
+                  <a:buSzTx/>
+                  <a:buFontTx/>
+                  <a:buNone/>
+                  <a:tabLst/>
+                  <a:defRPr/>
+                </a:pPr>
+                <a:endParaRPr kumimoji="0" lang="en-US" sz="1000" b="0" i="0" u="none" strike="noStrike" kern="1200" cap="none" spc="0" normalizeH="0" baseline="0" noProof="0">
+                  <a:ln>
+                    <a:noFill/>
+                  </a:ln>
+                  <a:solidFill>
+                    <a:prstClr val="black"/>
+                  </a:solidFill>
+                  <a:effectLst/>
+                  <a:uLnTx/>
+                  <a:uFillTx/>
+                  <a:ea typeface="+mn-ea"/>
+                  <a:cs typeface="+mn-cs"/>
+                </a:endParaRPr>
+              </a:p>
+            </p:txBody>
+          </p:sp>
+          <p:sp>
+            <p:nvSpPr>
+              <p:cNvPr id="5" name="TextBox 4">
+                <a:extLst>
+                  <a:ext uri="{FF2B5EF4-FFF2-40B4-BE49-F238E27FC236}">
+                    <a16:creationId xmlns:a16="http://schemas.microsoft.com/office/drawing/2014/main" id="{138423F9-D309-57C4-30BA-70D1F0E542AE}"/>
+                  </a:ext>
+                </a:extLst>
+              </p:cNvPr>
+              <p:cNvSpPr txBox="1"/>
+              <p:nvPr/>
+            </p:nvSpPr>
+            <p:spPr>
+              <a:xfrm>
+                <a:off x="3995650" y="4276305"/>
+                <a:ext cx="412292" cy="230832"/>
+              </a:xfrm>
+              <a:prstGeom prst="rect">
+                <a:avLst/>
+              </a:prstGeom>
+              <a:noFill/>
+            </p:spPr>
+            <p:txBody>
+              <a:bodyPr wrap="square" rtlCol="0">
+                <a:spAutoFit/>
+              </a:bodyPr>
+              <a:lstStyle/>
+              <a:p>
+                <a:pPr marL="0" marR="0" lvl="0" indent="0" algn="l" defTabSz="914400" rtl="0" eaLnBrk="1" fontAlgn="auto" latinLnBrk="0" hangingPunct="1">
+                  <a:lnSpc>
+                    <a:spcPct val="100000"/>
+                  </a:lnSpc>
+                  <a:spcBef>
+                    <a:spcPts val="0"/>
+                  </a:spcBef>
+                  <a:spcAft>
+                    <a:spcPts val="0"/>
+                  </a:spcAft>
+                  <a:buClrTx/>
+                  <a:buSzTx/>
+                  <a:buFontTx/>
+                  <a:buNone/>
+                  <a:tabLst/>
+                  <a:defRPr/>
+                </a:pPr>
+                <a:r>
+                  <a:rPr kumimoji="0" lang="en-US" sz="900" b="0" i="0" u="none" strike="noStrike" kern="1200" cap="none" spc="0" normalizeH="0" baseline="0" noProof="0" dirty="0">
+                    <a:ln>
+                      <a:noFill/>
+                    </a:ln>
+                    <a:solidFill>
+                      <a:prstClr val="black"/>
+                    </a:solidFill>
+                    <a:effectLst/>
+                    <a:uLnTx/>
+                    <a:uFillTx/>
+                    <a:ea typeface="+mn-ea"/>
+                    <a:cs typeface="+mn-cs"/>
+                  </a:rPr>
+                  <a:t>host</a:t>
+                </a:r>
+              </a:p>
+            </p:txBody>
+          </p:sp>
+        </p:grpSp>
+        <p:grpSp>
+          <p:nvGrpSpPr>
+            <p:cNvPr id="8" name="Group 7">
+              <a:extLst>
+                <a:ext uri="{FF2B5EF4-FFF2-40B4-BE49-F238E27FC236}">
+                  <a16:creationId xmlns:a16="http://schemas.microsoft.com/office/drawing/2014/main" id="{75829CF0-3931-A621-680C-EF9B941C8C0E}"/>
+                </a:ext>
+              </a:extLst>
+            </p:cNvPr>
+            <p:cNvGrpSpPr/>
+            <p:nvPr/>
+          </p:nvGrpSpPr>
+          <p:grpSpPr>
+            <a:xfrm>
+              <a:off x="5361297" y="4167805"/>
+              <a:ext cx="771421" cy="991032"/>
+              <a:chOff x="3816079" y="4223863"/>
+              <a:chExt cx="771421" cy="991032"/>
+            </a:xfrm>
+          </p:grpSpPr>
+          <p:sp>
+            <p:nvSpPr>
+              <p:cNvPr id="9" name="Rectangle 8">
+                <a:extLst>
+                  <a:ext uri="{FF2B5EF4-FFF2-40B4-BE49-F238E27FC236}">
+                    <a16:creationId xmlns:a16="http://schemas.microsoft.com/office/drawing/2014/main" id="{25A33A85-1F93-5D96-66D3-70B1C94C1F75}"/>
+                  </a:ext>
+                </a:extLst>
+              </p:cNvPr>
+              <p:cNvSpPr/>
+              <p:nvPr/>
+            </p:nvSpPr>
+            <p:spPr>
+              <a:xfrm>
+                <a:off x="3816079" y="4722603"/>
+                <a:ext cx="771421" cy="250978"/>
+              </a:xfrm>
+              <a:prstGeom prst="rect">
+                <a:avLst/>
+              </a:prstGeom>
+              <a:solidFill>
+                <a:schemeClr val="bg1">
+                  <a:lumMod val="95000"/>
+                </a:schemeClr>
+              </a:solidFill>
+              <a:ln w="19050">
+                <a:solidFill>
+                  <a:schemeClr val="bg2"/>
+                </a:solidFill>
+              </a:ln>
+            </p:spPr>
+            <p:style>
+              <a:lnRef idx="2">
+                <a:schemeClr val="accent1">
+                  <a:shade val="50000"/>
+                </a:schemeClr>
+              </a:lnRef>
+              <a:fillRef idx="1">
+                <a:schemeClr val="accent1"/>
+              </a:fillRef>
+              <a:effectRef idx="0">
+                <a:schemeClr val="accent1"/>
+              </a:effectRef>
+              <a:fontRef idx="minor">
+                <a:schemeClr val="lt1"/>
+              </a:fontRef>
+            </p:style>
+            <p:txBody>
+              <a:bodyPr lIns="0" rIns="0" rtlCol="0" anchor="ctr"/>
+              <a:lstStyle/>
+              <a:p>
+                <a:pPr marL="0" marR="0" lvl="0" indent="0" algn="ctr" defTabSz="914400" rtl="0" eaLnBrk="1" fontAlgn="auto" latinLnBrk="0" hangingPunct="1">
+                  <a:lnSpc>
+                    <a:spcPct val="100000"/>
+                  </a:lnSpc>
+                  <a:spcBef>
+                    <a:spcPts val="0"/>
+                  </a:spcBef>
+                  <a:spcAft>
+                    <a:spcPts val="0"/>
+                  </a:spcAft>
+                  <a:buClrTx/>
+                  <a:buSzTx/>
+                  <a:buFontTx/>
+                  <a:buNone/>
+                  <a:tabLst/>
+                  <a:defRPr/>
+                </a:pPr>
+                <a:r>
+                  <a:rPr kumimoji="0" lang="en-US" sz="900" b="0" i="0" u="none" strike="noStrike" kern="1200" cap="none" spc="0" normalizeH="0" baseline="0" noProof="0" dirty="0">
+                    <a:ln>
+                      <a:noFill/>
+                    </a:ln>
+                    <a:solidFill>
+                      <a:prstClr val="black"/>
+                    </a:solidFill>
+                    <a:effectLst/>
+                    <a:uLnTx/>
+                    <a:uFillTx/>
+                    <a:ea typeface="+mn-ea"/>
+                    <a:cs typeface="+mn-cs"/>
+                  </a:rPr>
+                  <a:t>Kubernetes</a:t>
+                </a:r>
+              </a:p>
+              <a:p>
+                <a:pPr marL="0" marR="0" lvl="0" indent="0" algn="ctr" defTabSz="914400" rtl="0" eaLnBrk="1" fontAlgn="auto" latinLnBrk="0" hangingPunct="1">
+                  <a:lnSpc>
+                    <a:spcPct val="100000"/>
+                  </a:lnSpc>
+                  <a:spcBef>
+                    <a:spcPts val="0"/>
+                  </a:spcBef>
+                  <a:spcAft>
+                    <a:spcPts val="0"/>
+                  </a:spcAft>
+                  <a:buClrTx/>
+                  <a:buSzTx/>
+                  <a:buFontTx/>
+                  <a:buNone/>
+                  <a:tabLst/>
+                  <a:defRPr/>
+                </a:pPr>
+                <a:r>
+                  <a:rPr kumimoji="0" lang="en-US" sz="900" b="0" i="0" u="none" strike="noStrike" kern="1200" cap="none" spc="0" normalizeH="0" baseline="0" noProof="0" dirty="0">
+                    <a:ln>
+                      <a:noFill/>
+                    </a:ln>
+                    <a:solidFill>
+                      <a:prstClr val="black"/>
+                    </a:solidFill>
+                    <a:effectLst/>
+                    <a:uLnTx/>
+                    <a:uFillTx/>
+                    <a:ea typeface="+mn-ea"/>
+                    <a:cs typeface="+mn-cs"/>
+                  </a:rPr>
+                  <a:t>Cluster</a:t>
+                </a:r>
+              </a:p>
+            </p:txBody>
+          </p:sp>
+          <p:sp>
+            <p:nvSpPr>
+              <p:cNvPr id="10" name="Rectangle: Rounded Corners 9">
+                <a:extLst>
+                  <a:ext uri="{FF2B5EF4-FFF2-40B4-BE49-F238E27FC236}">
+                    <a16:creationId xmlns:a16="http://schemas.microsoft.com/office/drawing/2014/main" id="{21F7507A-F404-BB35-01A6-D62B2F5616CF}"/>
+                  </a:ext>
+                </a:extLst>
+              </p:cNvPr>
+              <p:cNvSpPr/>
+              <p:nvPr/>
+            </p:nvSpPr>
+            <p:spPr>
+              <a:xfrm>
+                <a:off x="3816080" y="4399416"/>
+                <a:ext cx="771420" cy="815479"/>
+              </a:xfrm>
+              <a:prstGeom prst="roundRect">
+                <a:avLst/>
+              </a:prstGeom>
+              <a:noFill/>
+              <a:ln w="19050">
+                <a:solidFill>
+                  <a:schemeClr val="tx1"/>
+                </a:solidFill>
+              </a:ln>
+            </p:spPr>
+            <p:style>
+              <a:lnRef idx="2">
+                <a:schemeClr val="accent1">
+                  <a:shade val="50000"/>
+                </a:schemeClr>
+              </a:lnRef>
+              <a:fillRef idx="1">
+                <a:schemeClr val="accent1"/>
+              </a:fillRef>
+              <a:effectRef idx="0">
+                <a:schemeClr val="accent1"/>
+              </a:effectRef>
+              <a:fontRef idx="minor">
+                <a:schemeClr val="lt1"/>
+              </a:fontRef>
+            </p:style>
+            <p:txBody>
+              <a:bodyPr lIns="45720" tIns="0" bIns="9144" rtlCol="0" anchor="b" anchorCtr="0"/>
+              <a:lstStyle/>
+              <a:p>
+                <a:pPr marL="0" marR="0" lvl="0" indent="0" algn="l" defTabSz="914400" rtl="0" eaLnBrk="1" fontAlgn="auto" latinLnBrk="0" hangingPunct="1">
+                  <a:lnSpc>
+                    <a:spcPct val="100000"/>
+                  </a:lnSpc>
+                  <a:spcBef>
+                    <a:spcPts val="0"/>
+                  </a:spcBef>
+                  <a:spcAft>
+                    <a:spcPts val="0"/>
+                  </a:spcAft>
+                  <a:buClrTx/>
+                  <a:buSzTx/>
+                  <a:buFontTx/>
+                  <a:buNone/>
+                  <a:tabLst/>
+                  <a:defRPr/>
+                </a:pPr>
+                <a:r>
+                  <a:rPr lang="en-US" sz="800" dirty="0">
+                    <a:solidFill>
+                      <a:prstClr val="black"/>
+                    </a:solidFill>
+                  </a:rPr>
+                  <a:t>cluster-1</a:t>
+                </a:r>
+                <a:endParaRPr kumimoji="0" lang="en-US" sz="800" b="0" i="0" u="none" strike="noStrike" kern="1200" cap="none" spc="0" normalizeH="0" baseline="0" noProof="0" dirty="0">
+                  <a:ln>
+                    <a:noFill/>
+                  </a:ln>
+                  <a:solidFill>
+                    <a:prstClr val="black"/>
+                  </a:solidFill>
+                  <a:effectLst/>
+                  <a:uLnTx/>
+                  <a:uFillTx/>
+                  <a:ea typeface="+mn-ea"/>
+                  <a:cs typeface="+mn-cs"/>
+                </a:endParaRPr>
+              </a:p>
+            </p:txBody>
+          </p:sp>
+          <p:sp>
+            <p:nvSpPr>
+              <p:cNvPr id="11" name="Arrow: Chevron 10">
+                <a:extLst>
+                  <a:ext uri="{FF2B5EF4-FFF2-40B4-BE49-F238E27FC236}">
+                    <a16:creationId xmlns:a16="http://schemas.microsoft.com/office/drawing/2014/main" id="{339FCE90-7024-46D1-CB09-B07EF4A3D32F}"/>
+                  </a:ext>
+                </a:extLst>
+              </p:cNvPr>
+              <p:cNvSpPr/>
+              <p:nvPr/>
+            </p:nvSpPr>
+            <p:spPr>
+              <a:xfrm rot="5400000">
+                <a:off x="4026243" y="4166150"/>
+                <a:ext cx="351106" cy="466531"/>
+              </a:xfrm>
+              <a:prstGeom prst="chevron">
+                <a:avLst>
+                  <a:gd name="adj" fmla="val 14000"/>
+                </a:avLst>
+              </a:prstGeom>
+              <a:solidFill>
+                <a:schemeClr val="bg1"/>
+              </a:solidFill>
+              <a:ln w="12700">
+                <a:solidFill>
+                  <a:schemeClr val="tx1"/>
+                </a:solidFill>
+              </a:ln>
+            </p:spPr>
+            <p:style>
+              <a:lnRef idx="2">
+                <a:schemeClr val="accent1">
+                  <a:shade val="50000"/>
+                </a:schemeClr>
+              </a:lnRef>
+              <a:fillRef idx="1">
+                <a:schemeClr val="accent1"/>
+              </a:fillRef>
+              <a:effectRef idx="0">
+                <a:schemeClr val="accent1"/>
+              </a:effectRef>
+              <a:fontRef idx="minor">
+                <a:schemeClr val="lt1"/>
+              </a:fontRef>
+            </p:style>
+            <p:txBody>
+              <a:bodyPr tIns="0" rtlCol="0" anchor="t" anchorCtr="0"/>
+              <a:lstStyle/>
+              <a:p>
+                <a:pPr marL="0" marR="0" lvl="0" indent="0" algn="l" defTabSz="914400" rtl="0" eaLnBrk="1" fontAlgn="auto" latinLnBrk="0" hangingPunct="1">
+                  <a:lnSpc>
+                    <a:spcPct val="100000"/>
+                  </a:lnSpc>
+                  <a:spcBef>
+                    <a:spcPts val="0"/>
+                  </a:spcBef>
+                  <a:spcAft>
+                    <a:spcPts val="0"/>
+                  </a:spcAft>
+                  <a:buClrTx/>
+                  <a:buSzTx/>
+                  <a:buFontTx/>
+                  <a:buNone/>
+                  <a:tabLst/>
+                  <a:defRPr/>
+                </a:pPr>
+                <a:endParaRPr kumimoji="0" lang="en-US" sz="1000" b="0" i="0" u="none" strike="noStrike" kern="1200" cap="none" spc="0" normalizeH="0" baseline="0" noProof="0">
+                  <a:ln>
+                    <a:noFill/>
+                  </a:ln>
+                  <a:solidFill>
+                    <a:prstClr val="black"/>
+                  </a:solidFill>
+                  <a:effectLst/>
+                  <a:uLnTx/>
+                  <a:uFillTx/>
+                  <a:ea typeface="+mn-ea"/>
+                  <a:cs typeface="+mn-cs"/>
+                </a:endParaRPr>
+              </a:p>
+            </p:txBody>
+          </p:sp>
+          <p:sp>
+            <p:nvSpPr>
+              <p:cNvPr id="12" name="TextBox 11">
+                <a:extLst>
+                  <a:ext uri="{FF2B5EF4-FFF2-40B4-BE49-F238E27FC236}">
+                    <a16:creationId xmlns:a16="http://schemas.microsoft.com/office/drawing/2014/main" id="{1354BC33-2392-2DBD-DACC-495B8EDF5CFA}"/>
+                  </a:ext>
+                </a:extLst>
+              </p:cNvPr>
+              <p:cNvSpPr txBox="1"/>
+              <p:nvPr/>
+            </p:nvSpPr>
+            <p:spPr>
+              <a:xfrm>
+                <a:off x="3995650" y="4276305"/>
+                <a:ext cx="412292" cy="230832"/>
+              </a:xfrm>
+              <a:prstGeom prst="rect">
+                <a:avLst/>
+              </a:prstGeom>
+              <a:noFill/>
+            </p:spPr>
+            <p:txBody>
+              <a:bodyPr wrap="square" rtlCol="0">
+                <a:spAutoFit/>
+              </a:bodyPr>
+              <a:lstStyle/>
+              <a:p>
+                <a:pPr marL="0" marR="0" lvl="0" indent="0" algn="l" defTabSz="914400" rtl="0" eaLnBrk="1" fontAlgn="auto" latinLnBrk="0" hangingPunct="1">
+                  <a:lnSpc>
+                    <a:spcPct val="100000"/>
+                  </a:lnSpc>
+                  <a:spcBef>
+                    <a:spcPts val="0"/>
+                  </a:spcBef>
+                  <a:spcAft>
+                    <a:spcPts val="0"/>
+                  </a:spcAft>
+                  <a:buClrTx/>
+                  <a:buSzTx/>
+                  <a:buFontTx/>
+                  <a:buNone/>
+                  <a:tabLst/>
+                  <a:defRPr/>
+                </a:pPr>
+                <a:r>
+                  <a:rPr kumimoji="0" lang="en-US" sz="900" b="0" i="0" u="none" strike="noStrike" kern="1200" cap="none" spc="0" normalizeH="0" baseline="0" noProof="0" dirty="0">
+                    <a:ln>
+                      <a:noFill/>
+                    </a:ln>
+                    <a:solidFill>
+                      <a:prstClr val="black"/>
+                    </a:solidFill>
+                    <a:effectLst/>
+                    <a:uLnTx/>
+                    <a:uFillTx/>
+                    <a:ea typeface="+mn-ea"/>
+                    <a:cs typeface="+mn-cs"/>
+                  </a:rPr>
+                  <a:t>host</a:t>
+                </a:r>
+              </a:p>
+            </p:txBody>
+          </p:sp>
+        </p:grpSp>
+        <p:grpSp>
+          <p:nvGrpSpPr>
+            <p:cNvPr id="18" name="Group 17">
+              <a:extLst>
+                <a:ext uri="{FF2B5EF4-FFF2-40B4-BE49-F238E27FC236}">
+                  <a16:creationId xmlns:a16="http://schemas.microsoft.com/office/drawing/2014/main" id="{0965E86A-1C94-A558-145A-CBC2E89E62AD}"/>
+                </a:ext>
+              </a:extLst>
+            </p:cNvPr>
+            <p:cNvGrpSpPr/>
+            <p:nvPr/>
+          </p:nvGrpSpPr>
+          <p:grpSpPr>
+            <a:xfrm>
+              <a:off x="4197720" y="4167805"/>
+              <a:ext cx="771421" cy="991032"/>
+              <a:chOff x="3816079" y="4223863"/>
+              <a:chExt cx="771421" cy="991032"/>
+            </a:xfrm>
+          </p:grpSpPr>
+          <p:sp>
+            <p:nvSpPr>
+              <p:cNvPr id="19" name="Rectangle 18">
+                <a:extLst>
+                  <a:ext uri="{FF2B5EF4-FFF2-40B4-BE49-F238E27FC236}">
+                    <a16:creationId xmlns:a16="http://schemas.microsoft.com/office/drawing/2014/main" id="{D1423ABE-B95A-39BF-B25A-51AE295D7BCC}"/>
+                  </a:ext>
+                </a:extLst>
+              </p:cNvPr>
+              <p:cNvSpPr/>
+              <p:nvPr/>
+            </p:nvSpPr>
+            <p:spPr>
+              <a:xfrm>
+                <a:off x="3816079" y="4722603"/>
+                <a:ext cx="771421" cy="250978"/>
+              </a:xfrm>
+              <a:prstGeom prst="rect">
+                <a:avLst/>
+              </a:prstGeom>
+              <a:solidFill>
+                <a:schemeClr val="bg1">
+                  <a:lumMod val="95000"/>
+                </a:schemeClr>
+              </a:solidFill>
+              <a:ln w="19050">
+                <a:solidFill>
+                  <a:schemeClr val="bg2"/>
+                </a:solidFill>
+              </a:ln>
+            </p:spPr>
+            <p:style>
+              <a:lnRef idx="2">
+                <a:schemeClr val="accent1">
+                  <a:shade val="50000"/>
+                </a:schemeClr>
+              </a:lnRef>
+              <a:fillRef idx="1">
+                <a:schemeClr val="accent1"/>
+              </a:fillRef>
+              <a:effectRef idx="0">
+                <a:schemeClr val="accent1"/>
+              </a:effectRef>
+              <a:fontRef idx="minor">
+                <a:schemeClr val="lt1"/>
+              </a:fontRef>
+            </p:style>
+            <p:txBody>
+              <a:bodyPr lIns="0" rIns="0" rtlCol="0" anchor="ctr"/>
+              <a:lstStyle/>
+              <a:p>
+                <a:pPr marL="0" marR="0" lvl="0" indent="0" algn="ctr" defTabSz="914400" rtl="0" eaLnBrk="1" fontAlgn="auto" latinLnBrk="0" hangingPunct="1">
+                  <a:lnSpc>
+                    <a:spcPct val="100000"/>
+                  </a:lnSpc>
+                  <a:spcBef>
+                    <a:spcPts val="0"/>
+                  </a:spcBef>
+                  <a:spcAft>
+                    <a:spcPts val="0"/>
+                  </a:spcAft>
+                  <a:buClrTx/>
+                  <a:buSzTx/>
+                  <a:buFontTx/>
+                  <a:buNone/>
+                  <a:tabLst/>
+                  <a:defRPr/>
+                </a:pPr>
+                <a:r>
+                  <a:rPr kumimoji="0" lang="en-US" sz="900" b="0" i="0" u="none" strike="noStrike" kern="1200" cap="none" spc="0" normalizeH="0" baseline="0" noProof="0" dirty="0">
+                    <a:ln>
+                      <a:noFill/>
+                    </a:ln>
+                    <a:solidFill>
+                      <a:prstClr val="black"/>
+                    </a:solidFill>
+                    <a:effectLst/>
+                    <a:uLnTx/>
+                    <a:uFillTx/>
+                    <a:ea typeface="+mn-ea"/>
+                    <a:cs typeface="+mn-cs"/>
+                  </a:rPr>
+                  <a:t>Compute</a:t>
+                </a:r>
+              </a:p>
+              <a:p>
+                <a:pPr marL="0" marR="0" lvl="0" indent="0" algn="ctr" defTabSz="914400" rtl="0" eaLnBrk="1" fontAlgn="auto" latinLnBrk="0" hangingPunct="1">
+                  <a:lnSpc>
+                    <a:spcPct val="100000"/>
+                  </a:lnSpc>
+                  <a:spcBef>
+                    <a:spcPts val="0"/>
+                  </a:spcBef>
+                  <a:spcAft>
+                    <a:spcPts val="0"/>
+                  </a:spcAft>
+                  <a:buClrTx/>
+                  <a:buSzTx/>
+                  <a:buFontTx/>
+                  <a:buNone/>
+                  <a:tabLst/>
+                  <a:defRPr/>
+                </a:pPr>
+                <a:r>
+                  <a:rPr kumimoji="0" lang="en-US" sz="900" b="0" i="0" u="none" strike="noStrike" kern="1200" cap="none" spc="0" normalizeH="0" baseline="0" noProof="0" dirty="0">
+                    <a:ln>
+                      <a:noFill/>
+                    </a:ln>
+                    <a:solidFill>
+                      <a:prstClr val="black"/>
+                    </a:solidFill>
+                    <a:effectLst/>
+                    <a:uLnTx/>
+                    <a:uFillTx/>
+                    <a:ea typeface="+mn-ea"/>
+                    <a:cs typeface="+mn-cs"/>
+                  </a:rPr>
+                  <a:t>Platform</a:t>
+                </a:r>
+              </a:p>
+            </p:txBody>
+          </p:sp>
+          <p:sp>
+            <p:nvSpPr>
+              <p:cNvPr id="20" name="Rectangle: Rounded Corners 19">
+                <a:extLst>
+                  <a:ext uri="{FF2B5EF4-FFF2-40B4-BE49-F238E27FC236}">
+                    <a16:creationId xmlns:a16="http://schemas.microsoft.com/office/drawing/2014/main" id="{78CF353B-5D46-A40D-867F-63CF5553D636}"/>
+                  </a:ext>
+                </a:extLst>
+              </p:cNvPr>
+              <p:cNvSpPr/>
+              <p:nvPr/>
+            </p:nvSpPr>
+            <p:spPr>
+              <a:xfrm>
+                <a:off x="3816080" y="4399416"/>
+                <a:ext cx="771420" cy="815479"/>
+              </a:xfrm>
+              <a:prstGeom prst="roundRect">
+                <a:avLst/>
+              </a:prstGeom>
+              <a:noFill/>
+              <a:ln w="19050">
+                <a:solidFill>
+                  <a:schemeClr val="tx1"/>
+                </a:solidFill>
+              </a:ln>
+            </p:spPr>
+            <p:style>
+              <a:lnRef idx="2">
+                <a:schemeClr val="accent1">
+                  <a:shade val="50000"/>
+                </a:schemeClr>
+              </a:lnRef>
+              <a:fillRef idx="1">
+                <a:schemeClr val="accent1"/>
+              </a:fillRef>
+              <a:effectRef idx="0">
+                <a:schemeClr val="accent1"/>
+              </a:effectRef>
+              <a:fontRef idx="minor">
+                <a:schemeClr val="lt1"/>
+              </a:fontRef>
+            </p:style>
+            <p:txBody>
+              <a:bodyPr lIns="45720" tIns="0" bIns="9144" rtlCol="0" anchor="b" anchorCtr="0"/>
+              <a:lstStyle/>
+              <a:p>
+                <a:pPr lvl="0">
+                  <a:defRPr/>
+                </a:pPr>
+                <a:r>
+                  <a:rPr lang="en-US" sz="800" dirty="0">
+                    <a:solidFill>
+                      <a:prstClr val="black"/>
+                    </a:solidFill>
+                  </a:rPr>
+                  <a:t>server-1</a:t>
+                </a:r>
+                <a:endParaRPr kumimoji="0" lang="en-US" sz="800" b="0" i="0" u="none" strike="noStrike" kern="1200" cap="none" spc="0" normalizeH="0" baseline="0" noProof="0" dirty="0">
+                  <a:ln>
+                    <a:noFill/>
+                  </a:ln>
+                  <a:solidFill>
+                    <a:prstClr val="black"/>
+                  </a:solidFill>
+                  <a:effectLst/>
+                  <a:uLnTx/>
+                  <a:uFillTx/>
+                  <a:ea typeface="+mn-ea"/>
+                  <a:cs typeface="+mn-cs"/>
+                </a:endParaRPr>
+              </a:p>
+            </p:txBody>
+          </p:sp>
+          <p:sp>
+            <p:nvSpPr>
+              <p:cNvPr id="21" name="Arrow: Chevron 20">
+                <a:extLst>
+                  <a:ext uri="{FF2B5EF4-FFF2-40B4-BE49-F238E27FC236}">
+                    <a16:creationId xmlns:a16="http://schemas.microsoft.com/office/drawing/2014/main" id="{C60B1716-C9A4-F253-E974-95F1F394129E}"/>
+                  </a:ext>
+                </a:extLst>
+              </p:cNvPr>
+              <p:cNvSpPr/>
+              <p:nvPr/>
+            </p:nvSpPr>
+            <p:spPr>
+              <a:xfrm rot="5400000">
+                <a:off x="4026243" y="4166150"/>
+                <a:ext cx="351106" cy="466531"/>
+              </a:xfrm>
+              <a:prstGeom prst="chevron">
+                <a:avLst>
+                  <a:gd name="adj" fmla="val 14000"/>
+                </a:avLst>
+              </a:prstGeom>
+              <a:solidFill>
+                <a:schemeClr val="bg1"/>
+              </a:solidFill>
+              <a:ln w="12700">
+                <a:solidFill>
+                  <a:schemeClr val="tx1"/>
+                </a:solidFill>
+              </a:ln>
+            </p:spPr>
+            <p:style>
+              <a:lnRef idx="2">
+                <a:schemeClr val="accent1">
+                  <a:shade val="50000"/>
+                </a:schemeClr>
+              </a:lnRef>
+              <a:fillRef idx="1">
+                <a:schemeClr val="accent1"/>
+              </a:fillRef>
+              <a:effectRef idx="0">
+                <a:schemeClr val="accent1"/>
+              </a:effectRef>
+              <a:fontRef idx="minor">
+                <a:schemeClr val="lt1"/>
+              </a:fontRef>
+            </p:style>
+            <p:txBody>
+              <a:bodyPr tIns="0" rtlCol="0" anchor="t" anchorCtr="0"/>
+              <a:lstStyle/>
+              <a:p>
+                <a:pPr marL="0" marR="0" lvl="0" indent="0" algn="l" defTabSz="914400" rtl="0" eaLnBrk="1" fontAlgn="auto" latinLnBrk="0" hangingPunct="1">
+                  <a:lnSpc>
+                    <a:spcPct val="100000"/>
+                  </a:lnSpc>
+                  <a:spcBef>
+                    <a:spcPts val="0"/>
+                  </a:spcBef>
+                  <a:spcAft>
+                    <a:spcPts val="0"/>
+                  </a:spcAft>
+                  <a:buClrTx/>
+                  <a:buSzTx/>
+                  <a:buFontTx/>
+                  <a:buNone/>
+                  <a:tabLst/>
+                  <a:defRPr/>
+                </a:pPr>
+                <a:endParaRPr kumimoji="0" lang="en-US" sz="1000" b="0" i="0" u="none" strike="noStrike" kern="1200" cap="none" spc="0" normalizeH="0" baseline="0" noProof="0">
+                  <a:ln>
+                    <a:noFill/>
+                  </a:ln>
+                  <a:solidFill>
+                    <a:prstClr val="black"/>
+                  </a:solidFill>
+                  <a:effectLst/>
+                  <a:uLnTx/>
+                  <a:uFillTx/>
+                  <a:ea typeface="+mn-ea"/>
+                  <a:cs typeface="+mn-cs"/>
+                </a:endParaRPr>
+              </a:p>
+            </p:txBody>
+          </p:sp>
+          <p:sp>
+            <p:nvSpPr>
+              <p:cNvPr id="22" name="TextBox 21">
+                <a:extLst>
+                  <a:ext uri="{FF2B5EF4-FFF2-40B4-BE49-F238E27FC236}">
+                    <a16:creationId xmlns:a16="http://schemas.microsoft.com/office/drawing/2014/main" id="{F268AEC8-6C38-0232-0F56-5A4E5946BD1B}"/>
+                  </a:ext>
+                </a:extLst>
+              </p:cNvPr>
+              <p:cNvSpPr txBox="1"/>
+              <p:nvPr/>
+            </p:nvSpPr>
+            <p:spPr>
+              <a:xfrm>
+                <a:off x="3995650" y="4276305"/>
+                <a:ext cx="412292" cy="230832"/>
+              </a:xfrm>
+              <a:prstGeom prst="rect">
+                <a:avLst/>
+              </a:prstGeom>
+              <a:noFill/>
+            </p:spPr>
+            <p:txBody>
+              <a:bodyPr wrap="square" rtlCol="0">
+                <a:spAutoFit/>
+              </a:bodyPr>
+              <a:lstStyle/>
+              <a:p>
+                <a:pPr marL="0" marR="0" lvl="0" indent="0" algn="l" defTabSz="914400" rtl="0" eaLnBrk="1" fontAlgn="auto" latinLnBrk="0" hangingPunct="1">
+                  <a:lnSpc>
+                    <a:spcPct val="100000"/>
+                  </a:lnSpc>
+                  <a:spcBef>
+                    <a:spcPts val="0"/>
+                  </a:spcBef>
+                  <a:spcAft>
+                    <a:spcPts val="0"/>
+                  </a:spcAft>
+                  <a:buClrTx/>
+                  <a:buSzTx/>
+                  <a:buFontTx/>
+                  <a:buNone/>
+                  <a:tabLst/>
+                  <a:defRPr/>
+                </a:pPr>
+                <a:r>
+                  <a:rPr kumimoji="0" lang="en-US" sz="900" b="0" i="0" u="none" strike="noStrike" kern="1200" cap="none" spc="0" normalizeH="0" baseline="0" noProof="0" dirty="0">
+                    <a:ln>
+                      <a:noFill/>
+                    </a:ln>
+                    <a:solidFill>
+                      <a:prstClr val="black"/>
+                    </a:solidFill>
+                    <a:effectLst/>
+                    <a:uLnTx/>
+                    <a:uFillTx/>
+                    <a:ea typeface="+mn-ea"/>
+                    <a:cs typeface="+mn-cs"/>
+                  </a:rPr>
+                  <a:t>host</a:t>
+                </a:r>
+              </a:p>
+            </p:txBody>
+          </p:sp>
+        </p:grpSp>
+        <p:grpSp>
+          <p:nvGrpSpPr>
+            <p:cNvPr id="28" name="Group 27">
+              <a:extLst>
+                <a:ext uri="{FF2B5EF4-FFF2-40B4-BE49-F238E27FC236}">
+                  <a16:creationId xmlns:a16="http://schemas.microsoft.com/office/drawing/2014/main" id="{CA303DF7-B63A-A462-3056-B4A35CEA272B}"/>
+                </a:ext>
+              </a:extLst>
+            </p:cNvPr>
+            <p:cNvGrpSpPr/>
+            <p:nvPr/>
+          </p:nvGrpSpPr>
+          <p:grpSpPr>
+            <a:xfrm>
+              <a:off x="3034142" y="1397252"/>
+              <a:ext cx="771421" cy="974099"/>
+              <a:chOff x="3816085" y="2671396"/>
+              <a:chExt cx="771421" cy="974099"/>
+            </a:xfrm>
+          </p:grpSpPr>
+          <p:sp>
+            <p:nvSpPr>
+              <p:cNvPr id="29" name="Rectangle 28">
+                <a:extLst>
+                  <a:ext uri="{FF2B5EF4-FFF2-40B4-BE49-F238E27FC236}">
+                    <a16:creationId xmlns:a16="http://schemas.microsoft.com/office/drawing/2014/main" id="{785F5931-2EF8-FDA6-3705-9DD1486D46A7}"/>
+                  </a:ext>
+                </a:extLst>
+              </p:cNvPr>
+              <p:cNvSpPr/>
+              <p:nvPr/>
+            </p:nvSpPr>
+            <p:spPr>
+              <a:xfrm>
+                <a:off x="3816085" y="2911202"/>
+                <a:ext cx="771421" cy="279919"/>
+              </a:xfrm>
+              <a:prstGeom prst="rect">
+                <a:avLst/>
+              </a:prstGeom>
+              <a:solidFill>
+                <a:schemeClr val="bg1">
+                  <a:lumMod val="95000"/>
+                </a:schemeClr>
+              </a:solidFill>
+              <a:ln w="19050">
+                <a:solidFill>
+                  <a:schemeClr val="bg2"/>
+                </a:solidFill>
+              </a:ln>
+            </p:spPr>
+            <p:style>
+              <a:lnRef idx="2">
+                <a:schemeClr val="accent1">
+                  <a:shade val="50000"/>
+                </a:schemeClr>
+              </a:lnRef>
+              <a:fillRef idx="1">
+                <a:schemeClr val="accent1"/>
+              </a:fillRef>
+              <a:effectRef idx="0">
+                <a:schemeClr val="accent1"/>
+              </a:effectRef>
+              <a:fontRef idx="minor">
+                <a:schemeClr val="lt1"/>
+              </a:fontRef>
+            </p:style>
+            <p:txBody>
+              <a:bodyPr lIns="0" rIns="0" rtlCol="0" anchor="ctr"/>
+              <a:lstStyle/>
+              <a:p>
+                <a:pPr marL="0" marR="0" lvl="0" indent="0" algn="ctr" defTabSz="914400" rtl="0" eaLnBrk="1" fontAlgn="auto" latinLnBrk="0" hangingPunct="1">
+                  <a:lnSpc>
+                    <a:spcPct val="100000"/>
+                  </a:lnSpc>
+                  <a:spcBef>
+                    <a:spcPts val="0"/>
+                  </a:spcBef>
+                  <a:spcAft>
+                    <a:spcPts val="0"/>
+                  </a:spcAft>
+                  <a:buClrTx/>
+                  <a:buSzTx/>
+                  <a:buFontTx/>
+                  <a:buNone/>
+                  <a:tabLst/>
+                  <a:defRPr/>
+                </a:pPr>
+                <a:r>
+                  <a:rPr kumimoji="0" lang="en-US" sz="900" b="0" i="0" u="none" strike="noStrike" kern="1200" cap="none" spc="0" normalizeH="0" baseline="0" noProof="0" dirty="0">
+                    <a:ln>
+                      <a:noFill/>
+                    </a:ln>
+                    <a:solidFill>
+                      <a:prstClr val="black"/>
+                    </a:solidFill>
+                    <a:effectLst/>
+                    <a:uLnTx/>
+                    <a:uFillTx/>
+                    <a:ea typeface="+mn-ea"/>
+                    <a:cs typeface="+mn-cs"/>
+                  </a:rPr>
+                  <a:t>Compute</a:t>
+                </a:r>
+              </a:p>
+              <a:p>
+                <a:pPr marL="0" marR="0" lvl="0" indent="0" algn="ctr" defTabSz="914400" rtl="0" eaLnBrk="1" fontAlgn="auto" latinLnBrk="0" hangingPunct="1">
+                  <a:lnSpc>
+                    <a:spcPct val="100000"/>
+                  </a:lnSpc>
+                  <a:spcBef>
+                    <a:spcPts val="0"/>
+                  </a:spcBef>
+                  <a:spcAft>
+                    <a:spcPts val="0"/>
+                  </a:spcAft>
+                  <a:buClrTx/>
+                  <a:buSzTx/>
+                  <a:buFontTx/>
+                  <a:buNone/>
+                  <a:tabLst/>
+                  <a:defRPr/>
+                </a:pPr>
+                <a:r>
+                  <a:rPr lang="en-US" sz="900" dirty="0">
+                    <a:solidFill>
+                      <a:prstClr val="black"/>
+                    </a:solidFill>
+                  </a:rPr>
+                  <a:t>Platform</a:t>
+                </a:r>
+                <a:endParaRPr kumimoji="0" lang="en-US" sz="900" b="0" i="0" u="none" strike="noStrike" kern="1200" cap="none" spc="0" normalizeH="0" baseline="0" noProof="0" dirty="0">
+                  <a:ln>
+                    <a:noFill/>
+                  </a:ln>
+                  <a:solidFill>
+                    <a:prstClr val="black"/>
+                  </a:solidFill>
+                  <a:effectLst/>
+                  <a:uLnTx/>
+                  <a:uFillTx/>
+                  <a:ea typeface="+mn-ea"/>
+                  <a:cs typeface="+mn-cs"/>
+                </a:endParaRPr>
+              </a:p>
+            </p:txBody>
+          </p:sp>
+          <p:sp>
+            <p:nvSpPr>
+              <p:cNvPr id="30" name="Rectangle: Rounded Corners 29">
+                <a:extLst>
+                  <a:ext uri="{FF2B5EF4-FFF2-40B4-BE49-F238E27FC236}">
+                    <a16:creationId xmlns:a16="http://schemas.microsoft.com/office/drawing/2014/main" id="{06639B89-A87E-6F94-BBA8-64CCA7390726}"/>
+                  </a:ext>
+                </a:extLst>
+              </p:cNvPr>
+              <p:cNvSpPr/>
+              <p:nvPr/>
+            </p:nvSpPr>
+            <p:spPr>
+              <a:xfrm>
+                <a:off x="3816085" y="2671396"/>
+                <a:ext cx="771420" cy="815478"/>
+              </a:xfrm>
+              <a:prstGeom prst="roundRect">
+                <a:avLst/>
+              </a:prstGeom>
+              <a:noFill/>
+              <a:ln w="19050">
+                <a:solidFill>
+                  <a:schemeClr val="tx1"/>
+                </a:solidFill>
+              </a:ln>
+            </p:spPr>
+            <p:style>
+              <a:lnRef idx="2">
+                <a:schemeClr val="accent1">
+                  <a:shade val="50000"/>
+                </a:schemeClr>
+              </a:lnRef>
+              <a:fillRef idx="1">
+                <a:schemeClr val="accent1"/>
+              </a:fillRef>
+              <a:effectRef idx="0">
+                <a:schemeClr val="accent1"/>
+              </a:effectRef>
+              <a:fontRef idx="minor">
+                <a:schemeClr val="lt1"/>
+              </a:fontRef>
+            </p:style>
+            <p:txBody>
+              <a:bodyPr tIns="0" rtlCol="0" anchor="t" anchorCtr="0"/>
+              <a:lstStyle/>
+              <a:p>
+                <a:pPr marL="0" marR="0" lvl="0" indent="0" algn="l" defTabSz="914400" rtl="0" eaLnBrk="1" fontAlgn="auto" latinLnBrk="0" hangingPunct="1">
+                  <a:lnSpc>
+                    <a:spcPct val="100000"/>
+                  </a:lnSpc>
+                  <a:spcBef>
+                    <a:spcPts val="0"/>
+                  </a:spcBef>
+                  <a:spcAft>
+                    <a:spcPts val="0"/>
+                  </a:spcAft>
+                  <a:buClrTx/>
+                  <a:buSzTx/>
+                  <a:buFontTx/>
+                  <a:buNone/>
+                  <a:tabLst/>
+                  <a:defRPr/>
+                </a:pPr>
+                <a:r>
+                  <a:rPr kumimoji="0" lang="en-US" sz="800" b="0" i="0" u="none" strike="noStrike" kern="1200" cap="none" spc="0" normalizeH="0" baseline="0" noProof="0" dirty="0">
+                    <a:ln>
+                      <a:noFill/>
+                    </a:ln>
+                    <a:solidFill>
+                      <a:prstClr val="black"/>
+                    </a:solidFill>
+                    <a:effectLst/>
+                    <a:uLnTx/>
+                    <a:uFillTx/>
+                    <a:ea typeface="+mn-ea"/>
+                    <a:cs typeface="+mn-cs"/>
+                  </a:rPr>
+                  <a:t>vm-1</a:t>
+                </a:r>
+              </a:p>
+            </p:txBody>
+          </p:sp>
+          <p:sp>
+            <p:nvSpPr>
+              <p:cNvPr id="31" name="Flowchart: Off-page Connector 30">
+                <a:extLst>
+                  <a:ext uri="{FF2B5EF4-FFF2-40B4-BE49-F238E27FC236}">
+                    <a16:creationId xmlns:a16="http://schemas.microsoft.com/office/drawing/2014/main" id="{88BA0694-B850-BC67-B211-A0691D4970B1}"/>
+                  </a:ext>
+                </a:extLst>
+              </p:cNvPr>
+              <p:cNvSpPr/>
+              <p:nvPr/>
+            </p:nvSpPr>
+            <p:spPr>
+              <a:xfrm>
+                <a:off x="3968530" y="3365576"/>
+                <a:ext cx="466531" cy="279919"/>
+              </a:xfrm>
+              <a:prstGeom prst="flowChartOffpageConnector">
+                <a:avLst/>
+              </a:prstGeom>
+              <a:solidFill>
+                <a:schemeClr val="bg1"/>
+              </a:solidFill>
+              <a:ln w="19050">
+                <a:solidFill>
+                  <a:schemeClr val="tx1"/>
+                </a:solidFill>
+              </a:ln>
+            </p:spPr>
+            <p:style>
+              <a:lnRef idx="2">
+                <a:schemeClr val="accent1">
+                  <a:shade val="50000"/>
+                </a:schemeClr>
+              </a:lnRef>
+              <a:fillRef idx="1">
+                <a:schemeClr val="accent1"/>
+              </a:fillRef>
+              <a:effectRef idx="0">
+                <a:schemeClr val="accent1"/>
+              </a:effectRef>
+              <a:fontRef idx="minor">
+                <a:schemeClr val="lt1"/>
+              </a:fontRef>
+            </p:style>
+            <p:txBody>
+              <a:bodyPr tIns="0" rtlCol="0" anchor="t" anchorCtr="0"/>
+              <a:lstStyle/>
+              <a:p>
+                <a:pPr marL="0" marR="0" lvl="0" indent="0" algn="l" defTabSz="914400" rtl="0" eaLnBrk="1" fontAlgn="auto" latinLnBrk="0" hangingPunct="1">
+                  <a:lnSpc>
+                    <a:spcPct val="100000"/>
+                  </a:lnSpc>
+                  <a:spcBef>
+                    <a:spcPts val="0"/>
+                  </a:spcBef>
+                  <a:spcAft>
+                    <a:spcPts val="0"/>
+                  </a:spcAft>
+                  <a:buClrTx/>
+                  <a:buSzTx/>
+                  <a:buFontTx/>
+                  <a:buNone/>
+                  <a:tabLst/>
+                  <a:defRPr/>
+                </a:pPr>
+                <a:endParaRPr kumimoji="0" lang="en-US" sz="1000" b="0" i="0" u="none" strike="noStrike" kern="1200" cap="none" spc="0" normalizeH="0" baseline="0" noProof="0">
+                  <a:ln>
+                    <a:noFill/>
+                  </a:ln>
+                  <a:solidFill>
+                    <a:prstClr val="black"/>
+                  </a:solidFill>
+                  <a:effectLst/>
+                  <a:uLnTx/>
+                  <a:uFillTx/>
+                  <a:ea typeface="+mn-ea"/>
+                  <a:cs typeface="+mn-cs"/>
+                </a:endParaRPr>
+              </a:p>
+            </p:txBody>
+          </p:sp>
+          <p:sp>
+            <p:nvSpPr>
+              <p:cNvPr id="32" name="TextBox 31">
+                <a:extLst>
+                  <a:ext uri="{FF2B5EF4-FFF2-40B4-BE49-F238E27FC236}">
+                    <a16:creationId xmlns:a16="http://schemas.microsoft.com/office/drawing/2014/main" id="{B1073C08-2ABA-B500-FE04-02D5BE3A9AC5}"/>
+                  </a:ext>
+                </a:extLst>
+              </p:cNvPr>
+              <p:cNvSpPr txBox="1"/>
+              <p:nvPr/>
+            </p:nvSpPr>
+            <p:spPr>
+              <a:xfrm>
+                <a:off x="3995649" y="3382425"/>
+                <a:ext cx="412292" cy="230832"/>
+              </a:xfrm>
+              <a:prstGeom prst="rect">
+                <a:avLst/>
+              </a:prstGeom>
+              <a:noFill/>
+            </p:spPr>
+            <p:txBody>
+              <a:bodyPr wrap="square" rtlCol="0">
+                <a:spAutoFit/>
+              </a:bodyPr>
+              <a:lstStyle/>
+              <a:p>
+                <a:pPr marL="0" marR="0" lvl="0" indent="0" algn="l" defTabSz="914400" rtl="0" eaLnBrk="1" fontAlgn="auto" latinLnBrk="0" hangingPunct="1">
+                  <a:lnSpc>
+                    <a:spcPct val="100000"/>
+                  </a:lnSpc>
+                  <a:spcBef>
+                    <a:spcPts val="0"/>
+                  </a:spcBef>
+                  <a:spcAft>
+                    <a:spcPts val="0"/>
+                  </a:spcAft>
+                  <a:buClrTx/>
+                  <a:buSzTx/>
+                  <a:buFontTx/>
+                  <a:buNone/>
+                  <a:tabLst/>
+                  <a:defRPr/>
+                </a:pPr>
+                <a:r>
+                  <a:rPr kumimoji="0" lang="en-US" sz="900" b="0" i="0" u="none" strike="noStrike" kern="1200" cap="none" spc="0" normalizeH="0" baseline="0" noProof="0" dirty="0">
+                    <a:ln>
+                      <a:noFill/>
+                    </a:ln>
+                    <a:solidFill>
+                      <a:prstClr val="black"/>
+                    </a:solidFill>
+                    <a:effectLst/>
+                    <a:uLnTx/>
+                    <a:uFillTx/>
+                    <a:ea typeface="+mn-ea"/>
+                    <a:cs typeface="+mn-cs"/>
+                  </a:rPr>
+                  <a:t>host</a:t>
+                </a:r>
+              </a:p>
+            </p:txBody>
+          </p:sp>
+        </p:grpSp>
+        <p:cxnSp>
+          <p:nvCxnSpPr>
+            <p:cNvPr id="153" name="Straight Arrow Connector 152">
+              <a:extLst>
+                <a:ext uri="{FF2B5EF4-FFF2-40B4-BE49-F238E27FC236}">
+                  <a16:creationId xmlns:a16="http://schemas.microsoft.com/office/drawing/2014/main" id="{984D0B08-A38E-44AC-4609-1708EC216A0F}"/>
+                </a:ext>
+              </a:extLst>
+            </p:cNvPr>
+            <p:cNvCxnSpPr>
+              <a:cxnSpLocks/>
+              <a:stCxn id="57" idx="0"/>
+              <a:endCxn id="137" idx="2"/>
+            </p:cNvCxnSpPr>
+            <p:nvPr/>
+          </p:nvCxnSpPr>
+          <p:spPr>
+            <a:xfrm flipV="1">
+              <a:off x="4583431" y="2371351"/>
+              <a:ext cx="0" cy="362085"/>
+            </a:xfrm>
+            <a:prstGeom prst="straightConnector1">
+              <a:avLst/>
+            </a:prstGeom>
+            <a:ln w="12700">
+              <a:solidFill>
+                <a:schemeClr val="tx1"/>
+              </a:solidFill>
+              <a:headEnd type="triangle" w="med" len="med"/>
+              <a:tailEnd type="none" w="med" len="med"/>
+            </a:ln>
+          </p:spPr>
+          <p:style>
+            <a:lnRef idx="1">
+              <a:schemeClr val="accent1"/>
+            </a:lnRef>
+            <a:fillRef idx="0">
+              <a:schemeClr val="accent1"/>
+            </a:fillRef>
+            <a:effectRef idx="0">
+              <a:schemeClr val="accent1"/>
+            </a:effectRef>
+            <a:fontRef idx="minor">
+              <a:schemeClr val="tx1"/>
+            </a:fontRef>
+          </p:style>
+        </p:cxnSp>
+        <p:cxnSp>
+          <p:nvCxnSpPr>
+            <p:cNvPr id="162" name="Straight Arrow Connector 161">
+              <a:extLst>
+                <a:ext uri="{FF2B5EF4-FFF2-40B4-BE49-F238E27FC236}">
+                  <a16:creationId xmlns:a16="http://schemas.microsoft.com/office/drawing/2014/main" id="{45D5E0C4-BF17-5CB4-4628-E9920D169DCC}"/>
+                </a:ext>
+              </a:extLst>
+            </p:cNvPr>
+            <p:cNvCxnSpPr>
+              <a:cxnSpLocks/>
+              <a:stCxn id="4" idx="1"/>
+              <a:endCxn id="31" idx="2"/>
+            </p:cNvCxnSpPr>
+            <p:nvPr/>
+          </p:nvCxnSpPr>
+          <p:spPr>
+            <a:xfrm flipH="1" flipV="1">
+              <a:off x="3419853" y="2371351"/>
+              <a:ext cx="6" cy="1845609"/>
+            </a:xfrm>
+            <a:prstGeom prst="straightConnector1">
+              <a:avLst/>
+            </a:prstGeom>
+            <a:ln w="12700">
+              <a:solidFill>
+                <a:schemeClr val="tx1"/>
+              </a:solidFill>
+              <a:headEnd type="triangle" w="med" len="med"/>
+              <a:tailEnd type="none" w="med" len="med"/>
+            </a:ln>
+          </p:spPr>
+          <p:style>
+            <a:lnRef idx="1">
+              <a:schemeClr val="accent1"/>
+            </a:lnRef>
+            <a:fillRef idx="0">
+              <a:schemeClr val="accent1"/>
+            </a:fillRef>
+            <a:effectRef idx="0">
+              <a:schemeClr val="accent1"/>
+            </a:effectRef>
+            <a:fontRef idx="minor">
+              <a:schemeClr val="tx1"/>
+            </a:fontRef>
+          </p:style>
+        </p:cxnSp>
+        <p:grpSp>
+          <p:nvGrpSpPr>
+            <p:cNvPr id="147" name="Group 146">
+              <a:extLst>
+                <a:ext uri="{FF2B5EF4-FFF2-40B4-BE49-F238E27FC236}">
+                  <a16:creationId xmlns:a16="http://schemas.microsoft.com/office/drawing/2014/main" id="{0375C6D9-01BE-B248-9FB8-0C3F014FEF4F}"/>
+                </a:ext>
+              </a:extLst>
+            </p:cNvPr>
+            <p:cNvGrpSpPr/>
+            <p:nvPr/>
+          </p:nvGrpSpPr>
+          <p:grpSpPr>
+            <a:xfrm>
+              <a:off x="4197720" y="2680994"/>
+              <a:ext cx="771421" cy="1177169"/>
+              <a:chOff x="4115528" y="2620040"/>
+              <a:chExt cx="771421" cy="1177169"/>
+            </a:xfrm>
+          </p:grpSpPr>
+          <p:grpSp>
+            <p:nvGrpSpPr>
+              <p:cNvPr id="146" name="Group 145">
+                <a:extLst>
+                  <a:ext uri="{FF2B5EF4-FFF2-40B4-BE49-F238E27FC236}">
+                    <a16:creationId xmlns:a16="http://schemas.microsoft.com/office/drawing/2014/main" id="{21372C5F-6019-6E0C-9508-4E8A358AF2EE}"/>
+                  </a:ext>
+                </a:extLst>
+              </p:cNvPr>
+              <p:cNvGrpSpPr/>
+              <p:nvPr/>
+            </p:nvGrpSpPr>
+            <p:grpSpPr>
+              <a:xfrm>
+                <a:off x="4115528" y="2823110"/>
+                <a:ext cx="771421" cy="815478"/>
+                <a:chOff x="4115528" y="2823110"/>
+                <a:chExt cx="771421" cy="815478"/>
+              </a:xfrm>
+            </p:grpSpPr>
+            <p:sp>
+              <p:nvSpPr>
+                <p:cNvPr id="34" name="Rectangle 33">
+                  <a:extLst>
+                    <a:ext uri="{FF2B5EF4-FFF2-40B4-BE49-F238E27FC236}">
+                      <a16:creationId xmlns:a16="http://schemas.microsoft.com/office/drawing/2014/main" id="{AC8C008F-40AE-7B56-066D-358A9B134B49}"/>
+                    </a:ext>
+                  </a:extLst>
+                </p:cNvPr>
+                <p:cNvSpPr/>
+                <p:nvPr/>
+              </p:nvSpPr>
+              <p:spPr>
+                <a:xfrm>
+                  <a:off x="4115528" y="3145212"/>
+                  <a:ext cx="771421" cy="279919"/>
+                </a:xfrm>
+                <a:prstGeom prst="rect">
+                  <a:avLst/>
+                </a:prstGeom>
+                <a:solidFill>
+                  <a:schemeClr val="bg1">
+                    <a:lumMod val="95000"/>
+                  </a:schemeClr>
+                </a:solidFill>
+                <a:ln w="19050">
+                  <a:solidFill>
+                    <a:schemeClr val="bg2"/>
+                  </a:solidFill>
+                </a:ln>
+              </p:spPr>
+              <p:style>
+                <a:lnRef idx="2">
+                  <a:schemeClr val="accent1">
+                    <a:shade val="50000"/>
+                  </a:schemeClr>
+                </a:lnRef>
+                <a:fillRef idx="1">
+                  <a:schemeClr val="accent1"/>
+                </a:fillRef>
+                <a:effectRef idx="0">
+                  <a:schemeClr val="accent1"/>
+                </a:effectRef>
+                <a:fontRef idx="minor">
+                  <a:schemeClr val="lt1"/>
+                </a:fontRef>
+              </p:style>
+              <p:txBody>
+                <a:bodyPr lIns="0" rIns="0" rtlCol="0" anchor="ctr"/>
+                <a:lstStyle/>
+                <a:p>
+                  <a:pPr marL="0" marR="0" lvl="0" indent="0" algn="ctr" defTabSz="914400" rtl="0" eaLnBrk="1" fontAlgn="auto" latinLnBrk="0" hangingPunct="1">
+                    <a:lnSpc>
+                      <a:spcPct val="100000"/>
+                    </a:lnSpc>
+                    <a:spcBef>
+                      <a:spcPts val="0"/>
+                    </a:spcBef>
+                    <a:spcAft>
+                      <a:spcPts val="0"/>
+                    </a:spcAft>
+                    <a:buClrTx/>
+                    <a:buSzTx/>
+                    <a:buFontTx/>
+                    <a:buNone/>
+                    <a:tabLst/>
+                    <a:defRPr/>
+                  </a:pPr>
+                  <a:r>
+                    <a:rPr kumimoji="0" lang="en-US" sz="900" b="0" i="0" u="none" strike="noStrike" kern="1200" cap="none" spc="0" normalizeH="0" baseline="0" noProof="0" dirty="0" err="1">
+                      <a:ln>
+                        <a:noFill/>
+                      </a:ln>
+                      <a:solidFill>
+                        <a:prstClr val="black"/>
+                      </a:solidFill>
+                      <a:effectLst/>
+                      <a:uLnTx/>
+                      <a:uFillTx/>
+                      <a:ea typeface="+mn-ea"/>
+                      <a:cs typeface="+mn-cs"/>
+                    </a:rPr>
+                    <a:t>Proxmox</a:t>
+                  </a:r>
+                  <a:endParaRPr kumimoji="0" lang="en-US" sz="900" b="0" i="0" u="none" strike="noStrike" kern="1200" cap="none" spc="0" normalizeH="0" baseline="0" noProof="0" dirty="0">
+                    <a:ln>
+                      <a:noFill/>
+                    </a:ln>
+                    <a:solidFill>
+                      <a:prstClr val="black"/>
+                    </a:solidFill>
+                    <a:effectLst/>
+                    <a:uLnTx/>
+                    <a:uFillTx/>
+                    <a:ea typeface="+mn-ea"/>
+                    <a:cs typeface="+mn-cs"/>
+                  </a:endParaRPr>
+                </a:p>
+              </p:txBody>
+            </p:sp>
+            <p:sp>
+              <p:nvSpPr>
+                <p:cNvPr id="35" name="Rectangle: Rounded Corners 34">
+                  <a:extLst>
+                    <a:ext uri="{FF2B5EF4-FFF2-40B4-BE49-F238E27FC236}">
+                      <a16:creationId xmlns:a16="http://schemas.microsoft.com/office/drawing/2014/main" id="{DFBFC135-6FE4-4904-9572-E0043D70EBD6}"/>
+                    </a:ext>
+                  </a:extLst>
+                </p:cNvPr>
+                <p:cNvSpPr/>
+                <p:nvPr/>
+              </p:nvSpPr>
+              <p:spPr>
+                <a:xfrm>
+                  <a:off x="4115528" y="2823110"/>
+                  <a:ext cx="771420" cy="815478"/>
+                </a:xfrm>
+                <a:prstGeom prst="roundRect">
+                  <a:avLst/>
+                </a:prstGeom>
+                <a:noFill/>
+                <a:ln w="19050">
+                  <a:solidFill>
+                    <a:schemeClr val="tx1"/>
+                  </a:solidFill>
+                </a:ln>
+              </p:spPr>
+              <p:style>
+                <a:lnRef idx="2">
+                  <a:schemeClr val="accent1">
+                    <a:shade val="50000"/>
+                  </a:schemeClr>
+                </a:lnRef>
+                <a:fillRef idx="1">
+                  <a:schemeClr val="accent1"/>
+                </a:fillRef>
+                <a:effectRef idx="0">
+                  <a:schemeClr val="accent1"/>
+                </a:effectRef>
+                <a:fontRef idx="minor">
+                  <a:schemeClr val="lt1"/>
+                </a:fontRef>
+              </p:style>
+              <p:txBody>
+                <a:bodyPr lIns="45720" tIns="118872" rtlCol="0" anchor="t" anchorCtr="0"/>
+                <a:lstStyle/>
+                <a:p>
+                  <a:pPr marL="0" marR="0" lvl="0" indent="0" algn="l" defTabSz="914400" rtl="0" eaLnBrk="1" fontAlgn="auto" latinLnBrk="0" hangingPunct="1">
+                    <a:lnSpc>
+                      <a:spcPct val="100000"/>
+                    </a:lnSpc>
+                    <a:spcBef>
+                      <a:spcPts val="0"/>
+                    </a:spcBef>
+                    <a:spcAft>
+                      <a:spcPts val="0"/>
+                    </a:spcAft>
+                    <a:buClrTx/>
+                    <a:buSzTx/>
+                    <a:buFontTx/>
+                    <a:buNone/>
+                    <a:tabLst/>
+                    <a:defRPr/>
+                  </a:pPr>
+                  <a:r>
+                    <a:rPr lang="en-US" sz="800" dirty="0" err="1">
+                      <a:solidFill>
+                        <a:prstClr val="black"/>
+                      </a:solidFill>
+                    </a:rPr>
+                    <a:t>proxmox</a:t>
+                  </a:r>
+                  <a:endParaRPr kumimoji="0" lang="en-US" sz="800" b="0" i="0" u="none" strike="noStrike" kern="1200" cap="none" spc="0" normalizeH="0" baseline="0" noProof="0" dirty="0">
+                    <a:ln>
+                      <a:noFill/>
+                    </a:ln>
+                    <a:solidFill>
+                      <a:prstClr val="black"/>
+                    </a:solidFill>
+                    <a:effectLst/>
+                    <a:uLnTx/>
+                    <a:uFillTx/>
+                    <a:ea typeface="+mn-ea"/>
+                    <a:cs typeface="+mn-cs"/>
+                  </a:endParaRPr>
+                </a:p>
+              </p:txBody>
+            </p:sp>
+          </p:grpSp>
+          <p:sp>
+            <p:nvSpPr>
+              <p:cNvPr id="36" name="Flowchart: Off-page Connector 35">
+                <a:extLst>
+                  <a:ext uri="{FF2B5EF4-FFF2-40B4-BE49-F238E27FC236}">
+                    <a16:creationId xmlns:a16="http://schemas.microsoft.com/office/drawing/2014/main" id="{200F0872-23D3-5A7D-8660-9DA58F7CD82D}"/>
+                  </a:ext>
+                </a:extLst>
+              </p:cNvPr>
+              <p:cNvSpPr/>
+              <p:nvPr/>
+            </p:nvSpPr>
+            <p:spPr>
+              <a:xfrm>
+                <a:off x="4267973" y="3517290"/>
+                <a:ext cx="466531" cy="279919"/>
+              </a:xfrm>
+              <a:prstGeom prst="flowChartOffpageConnector">
+                <a:avLst/>
+              </a:prstGeom>
+              <a:solidFill>
+                <a:schemeClr val="bg1"/>
+              </a:solidFill>
+              <a:ln w="19050">
+                <a:solidFill>
+                  <a:schemeClr val="tx1"/>
+                </a:solidFill>
+              </a:ln>
+            </p:spPr>
+            <p:style>
+              <a:lnRef idx="2">
+                <a:schemeClr val="accent1">
+                  <a:shade val="50000"/>
+                </a:schemeClr>
+              </a:lnRef>
+              <a:fillRef idx="1">
+                <a:schemeClr val="accent1"/>
+              </a:fillRef>
+              <a:effectRef idx="0">
+                <a:schemeClr val="accent1"/>
+              </a:effectRef>
+              <a:fontRef idx="minor">
+                <a:schemeClr val="lt1"/>
+              </a:fontRef>
+            </p:style>
+            <p:txBody>
+              <a:bodyPr tIns="0" rtlCol="0" anchor="t" anchorCtr="0"/>
+              <a:lstStyle/>
+              <a:p>
+                <a:pPr marL="0" marR="0" lvl="0" indent="0" algn="l" defTabSz="914400" rtl="0" eaLnBrk="1" fontAlgn="auto" latinLnBrk="0" hangingPunct="1">
+                  <a:lnSpc>
+                    <a:spcPct val="100000"/>
+                  </a:lnSpc>
+                  <a:spcBef>
+                    <a:spcPts val="0"/>
+                  </a:spcBef>
+                  <a:spcAft>
+                    <a:spcPts val="0"/>
+                  </a:spcAft>
+                  <a:buClrTx/>
+                  <a:buSzTx/>
+                  <a:buFontTx/>
+                  <a:buNone/>
+                  <a:tabLst/>
+                  <a:defRPr/>
+                </a:pPr>
+                <a:endParaRPr kumimoji="0" lang="en-US" sz="1000" b="0" i="0" u="none" strike="noStrike" kern="1200" cap="none" spc="0" normalizeH="0" baseline="0" noProof="0">
+                  <a:ln>
+                    <a:noFill/>
+                  </a:ln>
+                  <a:solidFill>
+                    <a:prstClr val="black"/>
+                  </a:solidFill>
+                  <a:effectLst/>
+                  <a:uLnTx/>
+                  <a:uFillTx/>
+                  <a:ea typeface="+mn-ea"/>
+                  <a:cs typeface="+mn-cs"/>
+                </a:endParaRPr>
+              </a:p>
+            </p:txBody>
+          </p:sp>
+          <p:sp>
+            <p:nvSpPr>
+              <p:cNvPr id="37" name="TextBox 36">
+                <a:extLst>
+                  <a:ext uri="{FF2B5EF4-FFF2-40B4-BE49-F238E27FC236}">
+                    <a16:creationId xmlns:a16="http://schemas.microsoft.com/office/drawing/2014/main" id="{75E9CD42-DACD-5EDE-FB72-AF6D27C6718E}"/>
+                  </a:ext>
+                </a:extLst>
+              </p:cNvPr>
+              <p:cNvSpPr txBox="1"/>
+              <p:nvPr/>
+            </p:nvSpPr>
+            <p:spPr>
+              <a:xfrm>
+                <a:off x="4295092" y="3534139"/>
+                <a:ext cx="412292" cy="230832"/>
+              </a:xfrm>
+              <a:prstGeom prst="rect">
+                <a:avLst/>
+              </a:prstGeom>
+              <a:noFill/>
+            </p:spPr>
+            <p:txBody>
+              <a:bodyPr wrap="square" rtlCol="0">
+                <a:spAutoFit/>
+              </a:bodyPr>
+              <a:lstStyle/>
+              <a:p>
+                <a:pPr marL="0" marR="0" lvl="0" indent="0" algn="l" defTabSz="914400" rtl="0" eaLnBrk="1" fontAlgn="auto" latinLnBrk="0" hangingPunct="1">
+                  <a:lnSpc>
+                    <a:spcPct val="100000"/>
+                  </a:lnSpc>
+                  <a:spcBef>
+                    <a:spcPts val="0"/>
+                  </a:spcBef>
+                  <a:spcAft>
+                    <a:spcPts val="0"/>
+                  </a:spcAft>
+                  <a:buClrTx/>
+                  <a:buSzTx/>
+                  <a:buFontTx/>
+                  <a:buNone/>
+                  <a:tabLst/>
+                  <a:defRPr/>
+                </a:pPr>
+                <a:r>
+                  <a:rPr kumimoji="0" lang="en-US" sz="900" b="0" i="0" u="none" strike="noStrike" kern="1200" cap="none" spc="0" normalizeH="0" baseline="0" noProof="0" dirty="0">
+                    <a:ln>
+                      <a:noFill/>
+                    </a:ln>
+                    <a:solidFill>
+                      <a:prstClr val="black"/>
+                    </a:solidFill>
+                    <a:effectLst/>
+                    <a:uLnTx/>
+                    <a:uFillTx/>
+                    <a:ea typeface="+mn-ea"/>
+                    <a:cs typeface="+mn-cs"/>
+                  </a:rPr>
+                  <a:t>host</a:t>
+                </a:r>
+              </a:p>
+            </p:txBody>
+          </p:sp>
+          <p:grpSp>
+            <p:nvGrpSpPr>
+              <p:cNvPr id="58" name="Group 57">
+                <a:extLst>
+                  <a:ext uri="{FF2B5EF4-FFF2-40B4-BE49-F238E27FC236}">
+                    <a16:creationId xmlns:a16="http://schemas.microsoft.com/office/drawing/2014/main" id="{F6FF56A3-16B1-831C-57CE-9919876BB236}"/>
+                  </a:ext>
+                </a:extLst>
+              </p:cNvPr>
+              <p:cNvGrpSpPr/>
+              <p:nvPr/>
+            </p:nvGrpSpPr>
+            <p:grpSpPr>
+              <a:xfrm>
+                <a:off x="4267973" y="2620040"/>
+                <a:ext cx="466531" cy="351106"/>
+                <a:chOff x="6810318" y="4284899"/>
+                <a:chExt cx="466531" cy="351106"/>
+              </a:xfrm>
+            </p:grpSpPr>
+            <p:sp>
+              <p:nvSpPr>
+                <p:cNvPr id="54" name="Arrow: Chevron 53">
+                  <a:extLst>
+                    <a:ext uri="{FF2B5EF4-FFF2-40B4-BE49-F238E27FC236}">
+                      <a16:creationId xmlns:a16="http://schemas.microsoft.com/office/drawing/2014/main" id="{20E00F62-D32A-8FB7-5FEB-5D3162EC33D3}"/>
+                    </a:ext>
+                  </a:extLst>
+                </p:cNvPr>
+                <p:cNvSpPr/>
+                <p:nvPr/>
+              </p:nvSpPr>
+              <p:spPr>
+                <a:xfrm rot="5400000">
+                  <a:off x="6868031" y="4227186"/>
+                  <a:ext cx="351106" cy="466531"/>
+                </a:xfrm>
+                <a:prstGeom prst="chevron">
+                  <a:avLst>
+                    <a:gd name="adj" fmla="val 14000"/>
+                  </a:avLst>
+                </a:prstGeom>
+                <a:solidFill>
+                  <a:schemeClr val="bg1"/>
+                </a:solidFill>
+                <a:ln w="12700">
+                  <a:solidFill>
+                    <a:schemeClr val="tx1"/>
+                  </a:solidFill>
+                </a:ln>
+              </p:spPr>
+              <p:style>
+                <a:lnRef idx="2">
+                  <a:schemeClr val="accent1">
+                    <a:shade val="50000"/>
+                  </a:schemeClr>
+                </a:lnRef>
+                <a:fillRef idx="1">
+                  <a:schemeClr val="accent1"/>
+                </a:fillRef>
+                <a:effectRef idx="0">
+                  <a:schemeClr val="accent1"/>
+                </a:effectRef>
+                <a:fontRef idx="minor">
+                  <a:schemeClr val="lt1"/>
+                </a:fontRef>
+              </p:style>
+              <p:txBody>
+                <a:bodyPr tIns="0" rtlCol="0" anchor="t" anchorCtr="0"/>
+                <a:lstStyle/>
+                <a:p>
+                  <a:pPr marL="0" marR="0" lvl="0" indent="0" algn="l" defTabSz="914400" rtl="0" eaLnBrk="1" fontAlgn="auto" latinLnBrk="0" hangingPunct="1">
+                    <a:lnSpc>
+                      <a:spcPct val="100000"/>
+                    </a:lnSpc>
+                    <a:spcBef>
+                      <a:spcPts val="0"/>
+                    </a:spcBef>
+                    <a:spcAft>
+                      <a:spcPts val="0"/>
+                    </a:spcAft>
+                    <a:buClrTx/>
+                    <a:buSzTx/>
+                    <a:buFontTx/>
+                    <a:buNone/>
+                    <a:tabLst/>
+                    <a:defRPr/>
+                  </a:pPr>
+                  <a:endParaRPr kumimoji="0" lang="en-US" sz="1000" b="0" i="0" u="none" strike="noStrike" kern="1200" cap="none" spc="0" normalizeH="0" baseline="0" noProof="0">
+                    <a:ln>
+                      <a:noFill/>
+                    </a:ln>
+                    <a:solidFill>
+                      <a:prstClr val="black"/>
+                    </a:solidFill>
+                    <a:effectLst/>
+                    <a:uLnTx/>
+                    <a:uFillTx/>
+                    <a:ea typeface="+mn-ea"/>
+                    <a:cs typeface="+mn-cs"/>
+                  </a:endParaRPr>
+                </a:p>
+              </p:txBody>
+            </p:sp>
+            <p:sp>
+              <p:nvSpPr>
+                <p:cNvPr id="57" name="TextBox 56">
+                  <a:extLst>
+                    <a:ext uri="{FF2B5EF4-FFF2-40B4-BE49-F238E27FC236}">
+                      <a16:creationId xmlns:a16="http://schemas.microsoft.com/office/drawing/2014/main" id="{430F5921-AE55-FC29-BAE4-5A0B0592787C}"/>
+                    </a:ext>
+                  </a:extLst>
+                </p:cNvPr>
+                <p:cNvSpPr txBox="1"/>
+                <p:nvPr/>
+              </p:nvSpPr>
+              <p:spPr>
+                <a:xfrm>
+                  <a:off x="6837438" y="4337341"/>
+                  <a:ext cx="412292" cy="230832"/>
+                </a:xfrm>
+                <a:prstGeom prst="rect">
+                  <a:avLst/>
+                </a:prstGeom>
+                <a:noFill/>
+              </p:spPr>
+              <p:txBody>
+                <a:bodyPr wrap="square" rtlCol="0">
+                  <a:spAutoFit/>
+                </a:bodyPr>
+                <a:lstStyle/>
+                <a:p>
+                  <a:pPr marL="0" marR="0" lvl="0" indent="0" algn="l" defTabSz="914400" rtl="0" eaLnBrk="1" fontAlgn="auto" latinLnBrk="0" hangingPunct="1">
+                    <a:lnSpc>
+                      <a:spcPct val="100000"/>
+                    </a:lnSpc>
+                    <a:spcBef>
+                      <a:spcPts val="0"/>
+                    </a:spcBef>
+                    <a:spcAft>
+                      <a:spcPts val="0"/>
+                    </a:spcAft>
+                    <a:buClrTx/>
+                    <a:buSzTx/>
+                    <a:buFontTx/>
+                    <a:buNone/>
+                    <a:tabLst/>
+                    <a:defRPr/>
+                  </a:pPr>
+                  <a:r>
+                    <a:rPr kumimoji="0" lang="en-US" sz="900" b="0" i="0" u="none" strike="noStrike" kern="1200" cap="none" spc="0" normalizeH="0" baseline="0" noProof="0" dirty="0">
+                      <a:ln>
+                        <a:noFill/>
+                      </a:ln>
+                      <a:solidFill>
+                        <a:prstClr val="black"/>
+                      </a:solidFill>
+                      <a:effectLst/>
+                      <a:uLnTx/>
+                      <a:uFillTx/>
+                      <a:ea typeface="+mn-ea"/>
+                      <a:cs typeface="+mn-cs"/>
+                    </a:rPr>
+                    <a:t>host</a:t>
+                  </a:r>
+                </a:p>
+              </p:txBody>
+            </p:sp>
+          </p:grpSp>
+        </p:grpSp>
+        <p:grpSp>
+          <p:nvGrpSpPr>
+            <p:cNvPr id="145" name="Group 144">
+              <a:extLst>
+                <a:ext uri="{FF2B5EF4-FFF2-40B4-BE49-F238E27FC236}">
+                  <a16:creationId xmlns:a16="http://schemas.microsoft.com/office/drawing/2014/main" id="{006269D2-6EAF-F75E-6930-85DBED06320B}"/>
+                </a:ext>
+              </a:extLst>
+            </p:cNvPr>
+            <p:cNvGrpSpPr/>
+            <p:nvPr/>
+          </p:nvGrpSpPr>
+          <p:grpSpPr>
+            <a:xfrm>
+              <a:off x="5361297" y="2680994"/>
+              <a:ext cx="771421" cy="1177169"/>
+              <a:chOff x="5361297" y="2496148"/>
+              <a:chExt cx="771421" cy="1177169"/>
+            </a:xfrm>
+          </p:grpSpPr>
+          <p:grpSp>
+            <p:nvGrpSpPr>
+              <p:cNvPr id="144" name="Group 143">
+                <a:extLst>
+                  <a:ext uri="{FF2B5EF4-FFF2-40B4-BE49-F238E27FC236}">
+                    <a16:creationId xmlns:a16="http://schemas.microsoft.com/office/drawing/2014/main" id="{F136A3C0-E9C9-C3DD-1CBA-AC4A2BE7E202}"/>
+                  </a:ext>
+                </a:extLst>
+              </p:cNvPr>
+              <p:cNvGrpSpPr/>
+              <p:nvPr/>
+            </p:nvGrpSpPr>
+            <p:grpSpPr>
+              <a:xfrm>
+                <a:off x="5361297" y="2699218"/>
+                <a:ext cx="771421" cy="815478"/>
+                <a:chOff x="5361297" y="2699218"/>
+                <a:chExt cx="771421" cy="815478"/>
+              </a:xfrm>
+            </p:grpSpPr>
+            <p:sp>
+              <p:nvSpPr>
+                <p:cNvPr id="62" name="Rectangle 61">
+                  <a:extLst>
+                    <a:ext uri="{FF2B5EF4-FFF2-40B4-BE49-F238E27FC236}">
+                      <a16:creationId xmlns:a16="http://schemas.microsoft.com/office/drawing/2014/main" id="{86204A80-509E-EF06-FA78-41005CAEC4E1}"/>
+                    </a:ext>
+                  </a:extLst>
+                </p:cNvPr>
+                <p:cNvSpPr/>
+                <p:nvPr/>
+              </p:nvSpPr>
+              <p:spPr>
+                <a:xfrm>
+                  <a:off x="5361297" y="3021320"/>
+                  <a:ext cx="771421" cy="279919"/>
+                </a:xfrm>
+                <a:prstGeom prst="rect">
+                  <a:avLst/>
+                </a:prstGeom>
+                <a:solidFill>
+                  <a:schemeClr val="bg1">
+                    <a:lumMod val="95000"/>
+                  </a:schemeClr>
+                </a:solidFill>
+                <a:ln w="19050">
+                  <a:solidFill>
+                    <a:schemeClr val="bg2"/>
+                  </a:solidFill>
+                </a:ln>
+              </p:spPr>
+              <p:style>
+                <a:lnRef idx="2">
+                  <a:schemeClr val="accent1">
+                    <a:shade val="50000"/>
+                  </a:schemeClr>
+                </a:lnRef>
+                <a:fillRef idx="1">
+                  <a:schemeClr val="accent1"/>
+                </a:fillRef>
+                <a:effectRef idx="0">
+                  <a:schemeClr val="accent1"/>
+                </a:effectRef>
+                <a:fontRef idx="minor">
+                  <a:schemeClr val="lt1"/>
+                </a:fontRef>
+              </p:style>
+              <p:txBody>
+                <a:bodyPr lIns="0" rIns="0" rtlCol="0" anchor="ctr"/>
+                <a:lstStyle/>
+                <a:p>
+                  <a:pPr marL="0" marR="0" lvl="0" indent="0" algn="ctr" defTabSz="914400" rtl="0" eaLnBrk="1" fontAlgn="auto" latinLnBrk="0" hangingPunct="1">
+                    <a:lnSpc>
+                      <a:spcPct val="100000"/>
+                    </a:lnSpc>
+                    <a:spcBef>
+                      <a:spcPts val="0"/>
+                    </a:spcBef>
+                    <a:spcAft>
+                      <a:spcPts val="0"/>
+                    </a:spcAft>
+                    <a:buClrTx/>
+                    <a:buSzTx/>
+                    <a:buFontTx/>
+                    <a:buNone/>
+                    <a:tabLst/>
+                    <a:defRPr/>
+                  </a:pPr>
+                  <a:r>
+                    <a:rPr kumimoji="0" lang="en-US" sz="900" b="0" i="0" u="none" strike="noStrike" kern="1200" cap="none" spc="0" normalizeH="0" baseline="0" noProof="0" dirty="0" err="1">
+                      <a:ln>
+                        <a:noFill/>
+                      </a:ln>
+                      <a:solidFill>
+                        <a:prstClr val="black"/>
+                      </a:solidFill>
+                      <a:effectLst/>
+                      <a:uLnTx/>
+                      <a:uFillTx/>
+                      <a:ea typeface="+mn-ea"/>
+                      <a:cs typeface="+mn-cs"/>
+                    </a:rPr>
+                    <a:t>Kubevirt</a:t>
+                  </a:r>
+                  <a:endParaRPr kumimoji="0" lang="en-US" sz="900" b="0" i="0" u="none" strike="noStrike" kern="1200" cap="none" spc="0" normalizeH="0" baseline="0" noProof="0" dirty="0">
+                    <a:ln>
+                      <a:noFill/>
+                    </a:ln>
+                    <a:solidFill>
+                      <a:prstClr val="black"/>
+                    </a:solidFill>
+                    <a:effectLst/>
+                    <a:uLnTx/>
+                    <a:uFillTx/>
+                    <a:ea typeface="+mn-ea"/>
+                    <a:cs typeface="+mn-cs"/>
+                  </a:endParaRPr>
+                </a:p>
+              </p:txBody>
+            </p:sp>
+            <p:sp>
+              <p:nvSpPr>
+                <p:cNvPr id="63" name="Rectangle: Rounded Corners 62">
+                  <a:extLst>
+                    <a:ext uri="{FF2B5EF4-FFF2-40B4-BE49-F238E27FC236}">
+                      <a16:creationId xmlns:a16="http://schemas.microsoft.com/office/drawing/2014/main" id="{5621BE95-1B14-0E43-E3FF-7078718035A3}"/>
+                    </a:ext>
+                  </a:extLst>
+                </p:cNvPr>
+                <p:cNvSpPr/>
+                <p:nvPr/>
+              </p:nvSpPr>
+              <p:spPr>
+                <a:xfrm>
+                  <a:off x="5361297" y="2699218"/>
+                  <a:ext cx="771420" cy="815478"/>
+                </a:xfrm>
+                <a:prstGeom prst="roundRect">
+                  <a:avLst/>
+                </a:prstGeom>
+                <a:noFill/>
+                <a:ln w="19050">
+                  <a:solidFill>
+                    <a:schemeClr val="tx1"/>
+                  </a:solidFill>
+                </a:ln>
+              </p:spPr>
+              <p:style>
+                <a:lnRef idx="2">
+                  <a:schemeClr val="accent1">
+                    <a:shade val="50000"/>
+                  </a:schemeClr>
+                </a:lnRef>
+                <a:fillRef idx="1">
+                  <a:schemeClr val="accent1"/>
+                </a:fillRef>
+                <a:effectRef idx="0">
+                  <a:schemeClr val="accent1"/>
+                </a:effectRef>
+                <a:fontRef idx="minor">
+                  <a:schemeClr val="lt1"/>
+                </a:fontRef>
+              </p:style>
+              <p:txBody>
+                <a:bodyPr lIns="45720" tIns="118872" rtlCol="0" anchor="t" anchorCtr="0"/>
+                <a:lstStyle/>
+                <a:p>
+                  <a:pPr marL="0" marR="0" lvl="0" indent="0" algn="l" defTabSz="914400" rtl="0" eaLnBrk="1" fontAlgn="auto" latinLnBrk="0" hangingPunct="1">
+                    <a:lnSpc>
+                      <a:spcPct val="100000"/>
+                    </a:lnSpc>
+                    <a:spcBef>
+                      <a:spcPts val="0"/>
+                    </a:spcBef>
+                    <a:spcAft>
+                      <a:spcPts val="0"/>
+                    </a:spcAft>
+                    <a:buClrTx/>
+                    <a:buSzTx/>
+                    <a:buFontTx/>
+                    <a:buNone/>
+                    <a:tabLst/>
+                    <a:defRPr/>
+                  </a:pPr>
+                  <a:r>
+                    <a:rPr lang="en-US" sz="800" dirty="0" err="1">
+                      <a:solidFill>
+                        <a:prstClr val="black"/>
+                      </a:solidFill>
+                    </a:rPr>
+                    <a:t>kubevirt</a:t>
+                  </a:r>
+                  <a:endParaRPr kumimoji="0" lang="en-US" sz="800" b="0" i="0" u="none" strike="noStrike" kern="1200" cap="none" spc="0" normalizeH="0" baseline="0" noProof="0" dirty="0">
+                    <a:ln>
+                      <a:noFill/>
+                    </a:ln>
+                    <a:solidFill>
+                      <a:prstClr val="black"/>
+                    </a:solidFill>
+                    <a:effectLst/>
+                    <a:uLnTx/>
+                    <a:uFillTx/>
+                    <a:ea typeface="+mn-ea"/>
+                    <a:cs typeface="+mn-cs"/>
+                  </a:endParaRPr>
+                </a:p>
+              </p:txBody>
+            </p:sp>
+          </p:grpSp>
+          <p:sp>
+            <p:nvSpPr>
+              <p:cNvPr id="128" name="Flowchart: Off-page Connector 127">
+                <a:extLst>
+                  <a:ext uri="{FF2B5EF4-FFF2-40B4-BE49-F238E27FC236}">
+                    <a16:creationId xmlns:a16="http://schemas.microsoft.com/office/drawing/2014/main" id="{B25D24C6-F24F-80D0-C832-4C6D36CBF121}"/>
+                  </a:ext>
+                </a:extLst>
+              </p:cNvPr>
+              <p:cNvSpPr/>
+              <p:nvPr/>
+            </p:nvSpPr>
+            <p:spPr>
+              <a:xfrm>
+                <a:off x="5513742" y="3393398"/>
+                <a:ext cx="466531" cy="279919"/>
+              </a:xfrm>
+              <a:prstGeom prst="flowChartOffpageConnector">
+                <a:avLst/>
+              </a:prstGeom>
+              <a:solidFill>
+                <a:schemeClr val="bg1"/>
+              </a:solidFill>
+              <a:ln w="19050">
+                <a:solidFill>
+                  <a:schemeClr val="tx1"/>
+                </a:solidFill>
+              </a:ln>
+            </p:spPr>
+            <p:style>
+              <a:lnRef idx="2">
+                <a:schemeClr val="accent1">
+                  <a:shade val="50000"/>
+                </a:schemeClr>
+              </a:lnRef>
+              <a:fillRef idx="1">
+                <a:schemeClr val="accent1"/>
+              </a:fillRef>
+              <a:effectRef idx="0">
+                <a:schemeClr val="accent1"/>
+              </a:effectRef>
+              <a:fontRef idx="minor">
+                <a:schemeClr val="lt1"/>
+              </a:fontRef>
+            </p:style>
+            <p:txBody>
+              <a:bodyPr tIns="0" rtlCol="0" anchor="t" anchorCtr="0"/>
+              <a:lstStyle/>
+              <a:p>
+                <a:pPr marL="0" marR="0" lvl="0" indent="0" algn="l" defTabSz="914400" rtl="0" eaLnBrk="1" fontAlgn="auto" latinLnBrk="0" hangingPunct="1">
+                  <a:lnSpc>
+                    <a:spcPct val="100000"/>
+                  </a:lnSpc>
+                  <a:spcBef>
+                    <a:spcPts val="0"/>
+                  </a:spcBef>
+                  <a:spcAft>
+                    <a:spcPts val="0"/>
+                  </a:spcAft>
+                  <a:buClrTx/>
+                  <a:buSzTx/>
+                  <a:buFontTx/>
+                  <a:buNone/>
+                  <a:tabLst/>
+                  <a:defRPr/>
+                </a:pPr>
+                <a:endParaRPr kumimoji="0" lang="en-US" sz="1000" b="0" i="0" u="none" strike="noStrike" kern="1200" cap="none" spc="0" normalizeH="0" baseline="0" noProof="0">
+                  <a:ln>
+                    <a:noFill/>
+                  </a:ln>
+                  <a:solidFill>
+                    <a:prstClr val="black"/>
+                  </a:solidFill>
+                  <a:effectLst/>
+                  <a:uLnTx/>
+                  <a:uFillTx/>
+                  <a:ea typeface="+mn-ea"/>
+                  <a:cs typeface="+mn-cs"/>
+                </a:endParaRPr>
+              </a:p>
+            </p:txBody>
+          </p:sp>
+          <p:sp>
+            <p:nvSpPr>
+              <p:cNvPr id="129" name="TextBox 128">
+                <a:extLst>
+                  <a:ext uri="{FF2B5EF4-FFF2-40B4-BE49-F238E27FC236}">
+                    <a16:creationId xmlns:a16="http://schemas.microsoft.com/office/drawing/2014/main" id="{0F30EC9B-DEB7-7B5F-EF09-382FA8AA41BB}"/>
+                  </a:ext>
+                </a:extLst>
+              </p:cNvPr>
+              <p:cNvSpPr txBox="1"/>
+              <p:nvPr/>
+            </p:nvSpPr>
+            <p:spPr>
+              <a:xfrm>
+                <a:off x="5540861" y="3410247"/>
+                <a:ext cx="412292" cy="230832"/>
+              </a:xfrm>
+              <a:prstGeom prst="rect">
+                <a:avLst/>
+              </a:prstGeom>
+              <a:noFill/>
+            </p:spPr>
+            <p:txBody>
+              <a:bodyPr wrap="square" rtlCol="0">
+                <a:spAutoFit/>
+              </a:bodyPr>
+              <a:lstStyle/>
+              <a:p>
+                <a:pPr marL="0" marR="0" lvl="0" indent="0" algn="l" defTabSz="914400" rtl="0" eaLnBrk="1" fontAlgn="auto" latinLnBrk="0" hangingPunct="1">
+                  <a:lnSpc>
+                    <a:spcPct val="100000"/>
+                  </a:lnSpc>
+                  <a:spcBef>
+                    <a:spcPts val="0"/>
+                  </a:spcBef>
+                  <a:spcAft>
+                    <a:spcPts val="0"/>
+                  </a:spcAft>
+                  <a:buClrTx/>
+                  <a:buSzTx/>
+                  <a:buFontTx/>
+                  <a:buNone/>
+                  <a:tabLst/>
+                  <a:defRPr/>
+                </a:pPr>
+                <a:r>
+                  <a:rPr kumimoji="0" lang="en-US" sz="900" b="0" i="0" u="none" strike="noStrike" kern="1200" cap="none" spc="0" normalizeH="0" baseline="0" noProof="0" dirty="0">
+                    <a:ln>
+                      <a:noFill/>
+                    </a:ln>
+                    <a:solidFill>
+                      <a:prstClr val="black"/>
+                    </a:solidFill>
+                    <a:effectLst/>
+                    <a:uLnTx/>
+                    <a:uFillTx/>
+                    <a:ea typeface="+mn-ea"/>
+                    <a:cs typeface="+mn-cs"/>
+                  </a:rPr>
+                  <a:t>host</a:t>
+                </a:r>
+              </a:p>
+            </p:txBody>
+          </p:sp>
+          <p:grpSp>
+            <p:nvGrpSpPr>
+              <p:cNvPr id="130" name="Group 129">
+                <a:extLst>
+                  <a:ext uri="{FF2B5EF4-FFF2-40B4-BE49-F238E27FC236}">
+                    <a16:creationId xmlns:a16="http://schemas.microsoft.com/office/drawing/2014/main" id="{7C710ACB-E418-078F-ACC7-9102B94079DC}"/>
+                  </a:ext>
+                </a:extLst>
+              </p:cNvPr>
+              <p:cNvGrpSpPr/>
+              <p:nvPr/>
+            </p:nvGrpSpPr>
+            <p:grpSpPr>
+              <a:xfrm>
+                <a:off x="5513742" y="2496148"/>
+                <a:ext cx="466531" cy="351106"/>
+                <a:chOff x="6810318" y="4284899"/>
+                <a:chExt cx="466531" cy="351106"/>
+              </a:xfrm>
+            </p:grpSpPr>
+            <p:sp>
+              <p:nvSpPr>
+                <p:cNvPr id="131" name="Arrow: Chevron 130">
+                  <a:extLst>
+                    <a:ext uri="{FF2B5EF4-FFF2-40B4-BE49-F238E27FC236}">
+                      <a16:creationId xmlns:a16="http://schemas.microsoft.com/office/drawing/2014/main" id="{7FDE113D-EB39-8E5A-4E1E-DAB44EFE7840}"/>
+                    </a:ext>
+                  </a:extLst>
+                </p:cNvPr>
+                <p:cNvSpPr/>
+                <p:nvPr/>
+              </p:nvSpPr>
+              <p:spPr>
+                <a:xfrm rot="5400000">
+                  <a:off x="6868031" y="4227186"/>
+                  <a:ext cx="351106" cy="466531"/>
+                </a:xfrm>
+                <a:prstGeom prst="chevron">
+                  <a:avLst>
+                    <a:gd name="adj" fmla="val 14000"/>
+                  </a:avLst>
+                </a:prstGeom>
+                <a:solidFill>
+                  <a:schemeClr val="bg1"/>
+                </a:solidFill>
+                <a:ln w="12700">
+                  <a:solidFill>
+                    <a:schemeClr val="tx1"/>
+                  </a:solidFill>
+                </a:ln>
+              </p:spPr>
+              <p:style>
+                <a:lnRef idx="2">
+                  <a:schemeClr val="accent1">
+                    <a:shade val="50000"/>
+                  </a:schemeClr>
+                </a:lnRef>
+                <a:fillRef idx="1">
+                  <a:schemeClr val="accent1"/>
+                </a:fillRef>
+                <a:effectRef idx="0">
+                  <a:schemeClr val="accent1"/>
+                </a:effectRef>
+                <a:fontRef idx="minor">
+                  <a:schemeClr val="lt1"/>
+                </a:fontRef>
+              </p:style>
+              <p:txBody>
+                <a:bodyPr tIns="0" rtlCol="0" anchor="t" anchorCtr="0"/>
+                <a:lstStyle/>
+                <a:p>
+                  <a:pPr marL="0" marR="0" lvl="0" indent="0" algn="l" defTabSz="914400" rtl="0" eaLnBrk="1" fontAlgn="auto" latinLnBrk="0" hangingPunct="1">
+                    <a:lnSpc>
+                      <a:spcPct val="100000"/>
+                    </a:lnSpc>
+                    <a:spcBef>
+                      <a:spcPts val="0"/>
+                    </a:spcBef>
+                    <a:spcAft>
+                      <a:spcPts val="0"/>
+                    </a:spcAft>
+                    <a:buClrTx/>
+                    <a:buSzTx/>
+                    <a:buFontTx/>
+                    <a:buNone/>
+                    <a:tabLst/>
+                    <a:defRPr/>
+                  </a:pPr>
+                  <a:endParaRPr kumimoji="0" lang="en-US" sz="1000" b="0" i="0" u="none" strike="noStrike" kern="1200" cap="none" spc="0" normalizeH="0" baseline="0" noProof="0">
+                    <a:ln>
+                      <a:noFill/>
+                    </a:ln>
+                    <a:solidFill>
+                      <a:prstClr val="black"/>
+                    </a:solidFill>
+                    <a:effectLst/>
+                    <a:uLnTx/>
+                    <a:uFillTx/>
+                    <a:ea typeface="+mn-ea"/>
+                    <a:cs typeface="+mn-cs"/>
+                  </a:endParaRPr>
+                </a:p>
+              </p:txBody>
+            </p:sp>
+            <p:sp>
+              <p:nvSpPr>
+                <p:cNvPr id="132" name="TextBox 131">
+                  <a:extLst>
+                    <a:ext uri="{FF2B5EF4-FFF2-40B4-BE49-F238E27FC236}">
+                      <a16:creationId xmlns:a16="http://schemas.microsoft.com/office/drawing/2014/main" id="{4D9EC07C-A8F0-2507-EF19-2538A77FF30C}"/>
+                    </a:ext>
+                  </a:extLst>
+                </p:cNvPr>
+                <p:cNvSpPr txBox="1"/>
+                <p:nvPr/>
+              </p:nvSpPr>
+              <p:spPr>
+                <a:xfrm>
+                  <a:off x="6837438" y="4337341"/>
+                  <a:ext cx="412292" cy="230832"/>
+                </a:xfrm>
+                <a:prstGeom prst="rect">
+                  <a:avLst/>
+                </a:prstGeom>
+                <a:noFill/>
+              </p:spPr>
+              <p:txBody>
+                <a:bodyPr wrap="square" rtlCol="0">
+                  <a:spAutoFit/>
+                </a:bodyPr>
+                <a:lstStyle/>
+                <a:p>
+                  <a:pPr marL="0" marR="0" lvl="0" indent="0" algn="l" defTabSz="914400" rtl="0" eaLnBrk="1" fontAlgn="auto" latinLnBrk="0" hangingPunct="1">
+                    <a:lnSpc>
+                      <a:spcPct val="100000"/>
+                    </a:lnSpc>
+                    <a:spcBef>
+                      <a:spcPts val="0"/>
+                    </a:spcBef>
+                    <a:spcAft>
+                      <a:spcPts val="0"/>
+                    </a:spcAft>
+                    <a:buClrTx/>
+                    <a:buSzTx/>
+                    <a:buFontTx/>
+                    <a:buNone/>
+                    <a:tabLst/>
+                    <a:defRPr/>
+                  </a:pPr>
+                  <a:r>
+                    <a:rPr kumimoji="0" lang="en-US" sz="900" b="0" i="0" u="none" strike="noStrike" kern="1200" cap="none" spc="0" normalizeH="0" baseline="0" noProof="0" dirty="0">
+                      <a:ln>
+                        <a:noFill/>
+                      </a:ln>
+                      <a:solidFill>
+                        <a:prstClr val="black"/>
+                      </a:solidFill>
+                      <a:effectLst/>
+                      <a:uLnTx/>
+                      <a:uFillTx/>
+                      <a:ea typeface="+mn-ea"/>
+                      <a:cs typeface="+mn-cs"/>
+                    </a:rPr>
+                    <a:t>host</a:t>
+                  </a:r>
+                </a:p>
+              </p:txBody>
+            </p:sp>
+          </p:grpSp>
+        </p:grpSp>
+        <p:grpSp>
+          <p:nvGrpSpPr>
+            <p:cNvPr id="134" name="Group 133">
+              <a:extLst>
+                <a:ext uri="{FF2B5EF4-FFF2-40B4-BE49-F238E27FC236}">
+                  <a16:creationId xmlns:a16="http://schemas.microsoft.com/office/drawing/2014/main" id="{8EEF53A1-6892-87E7-FFFD-86DAEFBB8EDA}"/>
+                </a:ext>
+              </a:extLst>
+            </p:cNvPr>
+            <p:cNvGrpSpPr/>
+            <p:nvPr/>
+          </p:nvGrpSpPr>
+          <p:grpSpPr>
+            <a:xfrm>
+              <a:off x="4197720" y="1397252"/>
+              <a:ext cx="771421" cy="974099"/>
+              <a:chOff x="3816085" y="2671396"/>
+              <a:chExt cx="771421" cy="974099"/>
+            </a:xfrm>
+          </p:grpSpPr>
+          <p:sp>
+            <p:nvSpPr>
+              <p:cNvPr id="135" name="Rectangle 134">
+                <a:extLst>
+                  <a:ext uri="{FF2B5EF4-FFF2-40B4-BE49-F238E27FC236}">
+                    <a16:creationId xmlns:a16="http://schemas.microsoft.com/office/drawing/2014/main" id="{CA7202A9-5C92-DA0A-A504-59147E80171E}"/>
+                  </a:ext>
+                </a:extLst>
+              </p:cNvPr>
+              <p:cNvSpPr/>
+              <p:nvPr/>
+            </p:nvSpPr>
+            <p:spPr>
+              <a:xfrm>
+                <a:off x="3816085" y="2911202"/>
+                <a:ext cx="771421" cy="279919"/>
+              </a:xfrm>
+              <a:prstGeom prst="rect">
+                <a:avLst/>
+              </a:prstGeom>
+              <a:solidFill>
+                <a:schemeClr val="bg1">
+                  <a:lumMod val="95000"/>
+                </a:schemeClr>
+              </a:solidFill>
+              <a:ln w="19050">
+                <a:solidFill>
+                  <a:schemeClr val="bg2"/>
+                </a:solidFill>
+              </a:ln>
+            </p:spPr>
+            <p:style>
+              <a:lnRef idx="2">
+                <a:schemeClr val="accent1">
+                  <a:shade val="50000"/>
+                </a:schemeClr>
+              </a:lnRef>
+              <a:fillRef idx="1">
+                <a:schemeClr val="accent1"/>
+              </a:fillRef>
+              <a:effectRef idx="0">
+                <a:schemeClr val="accent1"/>
+              </a:effectRef>
+              <a:fontRef idx="minor">
+                <a:schemeClr val="lt1"/>
+              </a:fontRef>
+            </p:style>
+            <p:txBody>
+              <a:bodyPr lIns="0" rIns="0" rtlCol="0" anchor="ctr"/>
+              <a:lstStyle/>
+              <a:p>
+                <a:pPr marL="0" marR="0" lvl="0" indent="0" algn="ctr" defTabSz="914400" rtl="0" eaLnBrk="1" fontAlgn="auto" latinLnBrk="0" hangingPunct="1">
+                  <a:lnSpc>
+                    <a:spcPct val="100000"/>
+                  </a:lnSpc>
+                  <a:spcBef>
+                    <a:spcPts val="0"/>
+                  </a:spcBef>
+                  <a:spcAft>
+                    <a:spcPts val="0"/>
+                  </a:spcAft>
+                  <a:buClrTx/>
+                  <a:buSzTx/>
+                  <a:buFontTx/>
+                  <a:buNone/>
+                  <a:tabLst/>
+                  <a:defRPr/>
+                </a:pPr>
+                <a:r>
+                  <a:rPr kumimoji="0" lang="en-US" sz="900" b="0" i="0" u="none" strike="noStrike" kern="1200" cap="none" spc="0" normalizeH="0" baseline="0" noProof="0" dirty="0">
+                    <a:ln>
+                      <a:noFill/>
+                    </a:ln>
+                    <a:solidFill>
+                      <a:prstClr val="black"/>
+                    </a:solidFill>
+                    <a:effectLst/>
+                    <a:uLnTx/>
+                    <a:uFillTx/>
+                    <a:ea typeface="+mn-ea"/>
+                    <a:cs typeface="+mn-cs"/>
+                  </a:rPr>
+                  <a:t>Compute</a:t>
+                </a:r>
+              </a:p>
+              <a:p>
+                <a:pPr marL="0" marR="0" lvl="0" indent="0" algn="ctr" defTabSz="914400" rtl="0" eaLnBrk="1" fontAlgn="auto" latinLnBrk="0" hangingPunct="1">
+                  <a:lnSpc>
+                    <a:spcPct val="100000"/>
+                  </a:lnSpc>
+                  <a:spcBef>
+                    <a:spcPts val="0"/>
+                  </a:spcBef>
+                  <a:spcAft>
+                    <a:spcPts val="0"/>
+                  </a:spcAft>
+                  <a:buClrTx/>
+                  <a:buSzTx/>
+                  <a:buFontTx/>
+                  <a:buNone/>
+                  <a:tabLst/>
+                  <a:defRPr/>
+                </a:pPr>
+                <a:r>
+                  <a:rPr lang="en-US" sz="900" dirty="0">
+                    <a:solidFill>
+                      <a:prstClr val="black"/>
+                    </a:solidFill>
+                  </a:rPr>
+                  <a:t>Platform</a:t>
+                </a:r>
+                <a:endParaRPr kumimoji="0" lang="en-US" sz="900" b="0" i="0" u="none" strike="noStrike" kern="1200" cap="none" spc="0" normalizeH="0" baseline="0" noProof="0" dirty="0">
+                  <a:ln>
+                    <a:noFill/>
+                  </a:ln>
+                  <a:solidFill>
+                    <a:prstClr val="black"/>
+                  </a:solidFill>
+                  <a:effectLst/>
+                  <a:uLnTx/>
+                  <a:uFillTx/>
+                  <a:ea typeface="+mn-ea"/>
+                  <a:cs typeface="+mn-cs"/>
+                </a:endParaRPr>
+              </a:p>
+            </p:txBody>
+          </p:sp>
+          <p:sp>
+            <p:nvSpPr>
+              <p:cNvPr id="136" name="Rectangle: Rounded Corners 135">
+                <a:extLst>
+                  <a:ext uri="{FF2B5EF4-FFF2-40B4-BE49-F238E27FC236}">
+                    <a16:creationId xmlns:a16="http://schemas.microsoft.com/office/drawing/2014/main" id="{8868F47C-14F6-B93E-6B86-604834FA16F2}"/>
+                  </a:ext>
+                </a:extLst>
+              </p:cNvPr>
+              <p:cNvSpPr/>
+              <p:nvPr/>
+            </p:nvSpPr>
+            <p:spPr>
+              <a:xfrm>
+                <a:off x="3816085" y="2671396"/>
+                <a:ext cx="771420" cy="815478"/>
+              </a:xfrm>
+              <a:prstGeom prst="roundRect">
+                <a:avLst/>
+              </a:prstGeom>
+              <a:noFill/>
+              <a:ln w="19050">
+                <a:solidFill>
+                  <a:schemeClr val="tx1"/>
+                </a:solidFill>
+              </a:ln>
+            </p:spPr>
+            <p:style>
+              <a:lnRef idx="2">
+                <a:schemeClr val="accent1">
+                  <a:shade val="50000"/>
+                </a:schemeClr>
+              </a:lnRef>
+              <a:fillRef idx="1">
+                <a:schemeClr val="accent1"/>
+              </a:fillRef>
+              <a:effectRef idx="0">
+                <a:schemeClr val="accent1"/>
+              </a:effectRef>
+              <a:fontRef idx="minor">
+                <a:schemeClr val="lt1"/>
+              </a:fontRef>
+            </p:style>
+            <p:txBody>
+              <a:bodyPr tIns="0" rtlCol="0" anchor="t" anchorCtr="0"/>
+              <a:lstStyle/>
+              <a:p>
+                <a:pPr marL="0" marR="0" lvl="0" indent="0" algn="l" defTabSz="914400" rtl="0" eaLnBrk="1" fontAlgn="auto" latinLnBrk="0" hangingPunct="1">
+                  <a:lnSpc>
+                    <a:spcPct val="100000"/>
+                  </a:lnSpc>
+                  <a:spcBef>
+                    <a:spcPts val="0"/>
+                  </a:spcBef>
+                  <a:spcAft>
+                    <a:spcPts val="0"/>
+                  </a:spcAft>
+                  <a:buClrTx/>
+                  <a:buSzTx/>
+                  <a:buFontTx/>
+                  <a:buNone/>
+                  <a:tabLst/>
+                  <a:defRPr/>
+                </a:pPr>
+                <a:r>
+                  <a:rPr kumimoji="0" lang="en-US" sz="800" b="0" i="0" u="none" strike="noStrike" kern="1200" cap="none" spc="0" normalizeH="0" baseline="0" noProof="0" dirty="0">
+                    <a:ln>
+                      <a:noFill/>
+                    </a:ln>
+                    <a:solidFill>
+                      <a:prstClr val="black"/>
+                    </a:solidFill>
+                    <a:effectLst/>
+                    <a:uLnTx/>
+                    <a:uFillTx/>
+                    <a:ea typeface="+mn-ea"/>
+                    <a:cs typeface="+mn-cs"/>
+                  </a:rPr>
+                  <a:t>vm-2</a:t>
+                </a:r>
+              </a:p>
+            </p:txBody>
+          </p:sp>
+          <p:sp>
+            <p:nvSpPr>
+              <p:cNvPr id="137" name="Flowchart: Off-page Connector 136">
+                <a:extLst>
+                  <a:ext uri="{FF2B5EF4-FFF2-40B4-BE49-F238E27FC236}">
+                    <a16:creationId xmlns:a16="http://schemas.microsoft.com/office/drawing/2014/main" id="{E72D1F6C-3096-B5DA-3F77-CF3EE10B2374}"/>
+                  </a:ext>
+                </a:extLst>
+              </p:cNvPr>
+              <p:cNvSpPr/>
+              <p:nvPr/>
+            </p:nvSpPr>
+            <p:spPr>
+              <a:xfrm>
+                <a:off x="3968530" y="3365576"/>
+                <a:ext cx="466531" cy="279919"/>
+              </a:xfrm>
+              <a:prstGeom prst="flowChartOffpageConnector">
+                <a:avLst/>
+              </a:prstGeom>
+              <a:solidFill>
+                <a:schemeClr val="bg1"/>
+              </a:solidFill>
+              <a:ln w="19050">
+                <a:solidFill>
+                  <a:schemeClr val="tx1"/>
+                </a:solidFill>
+              </a:ln>
+            </p:spPr>
+            <p:style>
+              <a:lnRef idx="2">
+                <a:schemeClr val="accent1">
+                  <a:shade val="50000"/>
+                </a:schemeClr>
+              </a:lnRef>
+              <a:fillRef idx="1">
+                <a:schemeClr val="accent1"/>
+              </a:fillRef>
+              <a:effectRef idx="0">
+                <a:schemeClr val="accent1"/>
+              </a:effectRef>
+              <a:fontRef idx="minor">
+                <a:schemeClr val="lt1"/>
+              </a:fontRef>
+            </p:style>
+            <p:txBody>
+              <a:bodyPr tIns="0" rtlCol="0" anchor="t" anchorCtr="0"/>
+              <a:lstStyle/>
+              <a:p>
+                <a:pPr marL="0" marR="0" lvl="0" indent="0" algn="l" defTabSz="914400" rtl="0" eaLnBrk="1" fontAlgn="auto" latinLnBrk="0" hangingPunct="1">
+                  <a:lnSpc>
+                    <a:spcPct val="100000"/>
+                  </a:lnSpc>
+                  <a:spcBef>
+                    <a:spcPts val="0"/>
+                  </a:spcBef>
+                  <a:spcAft>
+                    <a:spcPts val="0"/>
+                  </a:spcAft>
+                  <a:buClrTx/>
+                  <a:buSzTx/>
+                  <a:buFontTx/>
+                  <a:buNone/>
+                  <a:tabLst/>
+                  <a:defRPr/>
+                </a:pPr>
+                <a:endParaRPr kumimoji="0" lang="en-US" sz="1000" b="0" i="0" u="none" strike="noStrike" kern="1200" cap="none" spc="0" normalizeH="0" baseline="0" noProof="0">
+                  <a:ln>
+                    <a:noFill/>
+                  </a:ln>
+                  <a:solidFill>
+                    <a:prstClr val="black"/>
+                  </a:solidFill>
+                  <a:effectLst/>
+                  <a:uLnTx/>
+                  <a:uFillTx/>
+                  <a:ea typeface="+mn-ea"/>
+                  <a:cs typeface="+mn-cs"/>
+                </a:endParaRPr>
+              </a:p>
+            </p:txBody>
+          </p:sp>
+          <p:sp>
+            <p:nvSpPr>
+              <p:cNvPr id="138" name="TextBox 137">
+                <a:extLst>
+                  <a:ext uri="{FF2B5EF4-FFF2-40B4-BE49-F238E27FC236}">
+                    <a16:creationId xmlns:a16="http://schemas.microsoft.com/office/drawing/2014/main" id="{F62A2BC1-5FB2-49A8-D113-DCC8963D1E2E}"/>
+                  </a:ext>
+                </a:extLst>
+              </p:cNvPr>
+              <p:cNvSpPr txBox="1"/>
+              <p:nvPr/>
+            </p:nvSpPr>
+            <p:spPr>
+              <a:xfrm>
+                <a:off x="3995649" y="3382425"/>
+                <a:ext cx="412292" cy="230832"/>
+              </a:xfrm>
+              <a:prstGeom prst="rect">
+                <a:avLst/>
+              </a:prstGeom>
+              <a:noFill/>
+            </p:spPr>
+            <p:txBody>
+              <a:bodyPr wrap="square" rtlCol="0">
+                <a:spAutoFit/>
+              </a:bodyPr>
+              <a:lstStyle/>
+              <a:p>
+                <a:pPr marL="0" marR="0" lvl="0" indent="0" algn="l" defTabSz="914400" rtl="0" eaLnBrk="1" fontAlgn="auto" latinLnBrk="0" hangingPunct="1">
+                  <a:lnSpc>
+                    <a:spcPct val="100000"/>
+                  </a:lnSpc>
+                  <a:spcBef>
+                    <a:spcPts val="0"/>
+                  </a:spcBef>
+                  <a:spcAft>
+                    <a:spcPts val="0"/>
+                  </a:spcAft>
+                  <a:buClrTx/>
+                  <a:buSzTx/>
+                  <a:buFontTx/>
+                  <a:buNone/>
+                  <a:tabLst/>
+                  <a:defRPr/>
+                </a:pPr>
+                <a:r>
+                  <a:rPr kumimoji="0" lang="en-US" sz="900" b="0" i="0" u="none" strike="noStrike" kern="1200" cap="none" spc="0" normalizeH="0" baseline="0" noProof="0" dirty="0">
+                    <a:ln>
+                      <a:noFill/>
+                    </a:ln>
+                    <a:solidFill>
+                      <a:prstClr val="black"/>
+                    </a:solidFill>
+                    <a:effectLst/>
+                    <a:uLnTx/>
+                    <a:uFillTx/>
+                    <a:ea typeface="+mn-ea"/>
+                    <a:cs typeface="+mn-cs"/>
+                  </a:rPr>
+                  <a:t>host</a:t>
+                </a:r>
+              </a:p>
+            </p:txBody>
+          </p:sp>
+        </p:grpSp>
+        <p:grpSp>
+          <p:nvGrpSpPr>
+            <p:cNvPr id="139" name="Group 138">
+              <a:extLst>
+                <a:ext uri="{FF2B5EF4-FFF2-40B4-BE49-F238E27FC236}">
+                  <a16:creationId xmlns:a16="http://schemas.microsoft.com/office/drawing/2014/main" id="{D19AD911-C3B0-5BAA-3E01-9EDDB42030B5}"/>
+                </a:ext>
+              </a:extLst>
+            </p:cNvPr>
+            <p:cNvGrpSpPr/>
+            <p:nvPr/>
+          </p:nvGrpSpPr>
+          <p:grpSpPr>
+            <a:xfrm>
+              <a:off x="5361297" y="1397252"/>
+              <a:ext cx="771421" cy="974099"/>
+              <a:chOff x="3816085" y="2671396"/>
+              <a:chExt cx="771421" cy="974099"/>
+            </a:xfrm>
+          </p:grpSpPr>
+          <p:sp>
+            <p:nvSpPr>
+              <p:cNvPr id="140" name="Rectangle 139">
+                <a:extLst>
+                  <a:ext uri="{FF2B5EF4-FFF2-40B4-BE49-F238E27FC236}">
+                    <a16:creationId xmlns:a16="http://schemas.microsoft.com/office/drawing/2014/main" id="{604642F9-5430-0677-C911-B02ACF0C3C08}"/>
+                  </a:ext>
+                </a:extLst>
+              </p:cNvPr>
+              <p:cNvSpPr/>
+              <p:nvPr/>
+            </p:nvSpPr>
+            <p:spPr>
+              <a:xfrm>
+                <a:off x="3816085" y="2911202"/>
+                <a:ext cx="771421" cy="279919"/>
+              </a:xfrm>
+              <a:prstGeom prst="rect">
+                <a:avLst/>
+              </a:prstGeom>
+              <a:solidFill>
+                <a:schemeClr val="bg1">
+                  <a:lumMod val="95000"/>
+                </a:schemeClr>
+              </a:solidFill>
+              <a:ln w="19050">
+                <a:solidFill>
+                  <a:schemeClr val="bg2"/>
+                </a:solidFill>
+              </a:ln>
+            </p:spPr>
+            <p:style>
+              <a:lnRef idx="2">
+                <a:schemeClr val="accent1">
+                  <a:shade val="50000"/>
+                </a:schemeClr>
+              </a:lnRef>
+              <a:fillRef idx="1">
+                <a:schemeClr val="accent1"/>
+              </a:fillRef>
+              <a:effectRef idx="0">
+                <a:schemeClr val="accent1"/>
+              </a:effectRef>
+              <a:fontRef idx="minor">
+                <a:schemeClr val="lt1"/>
+              </a:fontRef>
+            </p:style>
+            <p:txBody>
+              <a:bodyPr lIns="0" rIns="0" rtlCol="0" anchor="ctr"/>
+              <a:lstStyle/>
+              <a:p>
+                <a:pPr marL="0" marR="0" lvl="0" indent="0" algn="ctr" defTabSz="914400" rtl="0" eaLnBrk="1" fontAlgn="auto" latinLnBrk="0" hangingPunct="1">
+                  <a:lnSpc>
+                    <a:spcPct val="100000"/>
+                  </a:lnSpc>
+                  <a:spcBef>
+                    <a:spcPts val="0"/>
+                  </a:spcBef>
+                  <a:spcAft>
+                    <a:spcPts val="0"/>
+                  </a:spcAft>
+                  <a:buClrTx/>
+                  <a:buSzTx/>
+                  <a:buFontTx/>
+                  <a:buNone/>
+                  <a:tabLst/>
+                  <a:defRPr/>
+                </a:pPr>
+                <a:r>
+                  <a:rPr kumimoji="0" lang="en-US" sz="900" b="0" i="0" u="none" strike="noStrike" kern="1200" cap="none" spc="0" normalizeH="0" baseline="0" noProof="0" dirty="0">
+                    <a:ln>
+                      <a:noFill/>
+                    </a:ln>
+                    <a:solidFill>
+                      <a:prstClr val="black"/>
+                    </a:solidFill>
+                    <a:effectLst/>
+                    <a:uLnTx/>
+                    <a:uFillTx/>
+                    <a:ea typeface="+mn-ea"/>
+                    <a:cs typeface="+mn-cs"/>
+                  </a:rPr>
+                  <a:t>Compute</a:t>
+                </a:r>
+              </a:p>
+              <a:p>
+                <a:pPr marL="0" marR="0" lvl="0" indent="0" algn="ctr" defTabSz="914400" rtl="0" eaLnBrk="1" fontAlgn="auto" latinLnBrk="0" hangingPunct="1">
+                  <a:lnSpc>
+                    <a:spcPct val="100000"/>
+                  </a:lnSpc>
+                  <a:spcBef>
+                    <a:spcPts val="0"/>
+                  </a:spcBef>
+                  <a:spcAft>
+                    <a:spcPts val="0"/>
+                  </a:spcAft>
+                  <a:buClrTx/>
+                  <a:buSzTx/>
+                  <a:buFontTx/>
+                  <a:buNone/>
+                  <a:tabLst/>
+                  <a:defRPr/>
+                </a:pPr>
+                <a:r>
+                  <a:rPr lang="en-US" sz="900" dirty="0">
+                    <a:solidFill>
+                      <a:prstClr val="black"/>
+                    </a:solidFill>
+                  </a:rPr>
+                  <a:t>Platform</a:t>
+                </a:r>
+                <a:endParaRPr kumimoji="0" lang="en-US" sz="900" b="0" i="0" u="none" strike="noStrike" kern="1200" cap="none" spc="0" normalizeH="0" baseline="0" noProof="0" dirty="0">
+                  <a:ln>
+                    <a:noFill/>
+                  </a:ln>
+                  <a:solidFill>
+                    <a:prstClr val="black"/>
+                  </a:solidFill>
+                  <a:effectLst/>
+                  <a:uLnTx/>
+                  <a:uFillTx/>
+                  <a:ea typeface="+mn-ea"/>
+                  <a:cs typeface="+mn-cs"/>
+                </a:endParaRPr>
+              </a:p>
+            </p:txBody>
+          </p:sp>
+          <p:sp>
+            <p:nvSpPr>
+              <p:cNvPr id="141" name="Rectangle: Rounded Corners 140">
+                <a:extLst>
+                  <a:ext uri="{FF2B5EF4-FFF2-40B4-BE49-F238E27FC236}">
+                    <a16:creationId xmlns:a16="http://schemas.microsoft.com/office/drawing/2014/main" id="{6EA74882-2540-F271-43E1-3F970B1DCD02}"/>
+                  </a:ext>
+                </a:extLst>
+              </p:cNvPr>
+              <p:cNvSpPr/>
+              <p:nvPr/>
+            </p:nvSpPr>
+            <p:spPr>
+              <a:xfrm>
+                <a:off x="3816085" y="2671396"/>
+                <a:ext cx="771420" cy="815478"/>
+              </a:xfrm>
+              <a:prstGeom prst="roundRect">
+                <a:avLst/>
+              </a:prstGeom>
+              <a:noFill/>
+              <a:ln w="19050">
+                <a:solidFill>
+                  <a:schemeClr val="tx1"/>
+                </a:solidFill>
+              </a:ln>
+            </p:spPr>
+            <p:style>
+              <a:lnRef idx="2">
+                <a:schemeClr val="accent1">
+                  <a:shade val="50000"/>
+                </a:schemeClr>
+              </a:lnRef>
+              <a:fillRef idx="1">
+                <a:schemeClr val="accent1"/>
+              </a:fillRef>
+              <a:effectRef idx="0">
+                <a:schemeClr val="accent1"/>
+              </a:effectRef>
+              <a:fontRef idx="minor">
+                <a:schemeClr val="lt1"/>
+              </a:fontRef>
+            </p:style>
+            <p:txBody>
+              <a:bodyPr tIns="0" rtlCol="0" anchor="t" anchorCtr="0"/>
+              <a:lstStyle/>
+              <a:p>
+                <a:pPr marL="0" marR="0" lvl="0" indent="0" algn="l" defTabSz="914400" rtl="0" eaLnBrk="1" fontAlgn="auto" latinLnBrk="0" hangingPunct="1">
+                  <a:lnSpc>
+                    <a:spcPct val="100000"/>
+                  </a:lnSpc>
+                  <a:spcBef>
+                    <a:spcPts val="0"/>
+                  </a:spcBef>
+                  <a:spcAft>
+                    <a:spcPts val="0"/>
+                  </a:spcAft>
+                  <a:buClrTx/>
+                  <a:buSzTx/>
+                  <a:buFontTx/>
+                  <a:buNone/>
+                  <a:tabLst/>
+                  <a:defRPr/>
+                </a:pPr>
+                <a:r>
+                  <a:rPr kumimoji="0" lang="en-US" sz="800" b="0" i="0" u="none" strike="noStrike" kern="1200" cap="none" spc="0" normalizeH="0" baseline="0" noProof="0" dirty="0">
+                    <a:ln>
+                      <a:noFill/>
+                    </a:ln>
+                    <a:solidFill>
+                      <a:prstClr val="black"/>
+                    </a:solidFill>
+                    <a:effectLst/>
+                    <a:uLnTx/>
+                    <a:uFillTx/>
+                    <a:ea typeface="+mn-ea"/>
+                    <a:cs typeface="+mn-cs"/>
+                  </a:rPr>
+                  <a:t>vm-3</a:t>
+                </a:r>
+              </a:p>
+            </p:txBody>
+          </p:sp>
+          <p:sp>
+            <p:nvSpPr>
+              <p:cNvPr id="142" name="Flowchart: Off-page Connector 141">
+                <a:extLst>
+                  <a:ext uri="{FF2B5EF4-FFF2-40B4-BE49-F238E27FC236}">
+                    <a16:creationId xmlns:a16="http://schemas.microsoft.com/office/drawing/2014/main" id="{EC43F799-86E6-68F4-7588-0D29EA9AFC45}"/>
+                  </a:ext>
+                </a:extLst>
+              </p:cNvPr>
+              <p:cNvSpPr/>
+              <p:nvPr/>
+            </p:nvSpPr>
+            <p:spPr>
+              <a:xfrm>
+                <a:off x="3968530" y="3365576"/>
+                <a:ext cx="466531" cy="279919"/>
+              </a:xfrm>
+              <a:prstGeom prst="flowChartOffpageConnector">
+                <a:avLst/>
+              </a:prstGeom>
+              <a:solidFill>
+                <a:schemeClr val="bg1"/>
+              </a:solidFill>
+              <a:ln w="19050">
+                <a:solidFill>
+                  <a:schemeClr val="tx1"/>
+                </a:solidFill>
+              </a:ln>
+            </p:spPr>
+            <p:style>
+              <a:lnRef idx="2">
+                <a:schemeClr val="accent1">
+                  <a:shade val="50000"/>
+                </a:schemeClr>
+              </a:lnRef>
+              <a:fillRef idx="1">
+                <a:schemeClr val="accent1"/>
+              </a:fillRef>
+              <a:effectRef idx="0">
+                <a:schemeClr val="accent1"/>
+              </a:effectRef>
+              <a:fontRef idx="minor">
+                <a:schemeClr val="lt1"/>
+              </a:fontRef>
+            </p:style>
+            <p:txBody>
+              <a:bodyPr tIns="0" rtlCol="0" anchor="t" anchorCtr="0"/>
+              <a:lstStyle/>
+              <a:p>
+                <a:pPr marL="0" marR="0" lvl="0" indent="0" algn="l" defTabSz="914400" rtl="0" eaLnBrk="1" fontAlgn="auto" latinLnBrk="0" hangingPunct="1">
+                  <a:lnSpc>
+                    <a:spcPct val="100000"/>
+                  </a:lnSpc>
+                  <a:spcBef>
+                    <a:spcPts val="0"/>
+                  </a:spcBef>
+                  <a:spcAft>
+                    <a:spcPts val="0"/>
+                  </a:spcAft>
+                  <a:buClrTx/>
+                  <a:buSzTx/>
+                  <a:buFontTx/>
+                  <a:buNone/>
+                  <a:tabLst/>
+                  <a:defRPr/>
+                </a:pPr>
+                <a:endParaRPr kumimoji="0" lang="en-US" sz="1000" b="0" i="0" u="none" strike="noStrike" kern="1200" cap="none" spc="0" normalizeH="0" baseline="0" noProof="0">
+                  <a:ln>
+                    <a:noFill/>
+                  </a:ln>
+                  <a:solidFill>
+                    <a:prstClr val="black"/>
+                  </a:solidFill>
+                  <a:effectLst/>
+                  <a:uLnTx/>
+                  <a:uFillTx/>
+                  <a:ea typeface="+mn-ea"/>
+                  <a:cs typeface="+mn-cs"/>
+                </a:endParaRPr>
+              </a:p>
+            </p:txBody>
+          </p:sp>
+          <p:sp>
+            <p:nvSpPr>
+              <p:cNvPr id="143" name="TextBox 142">
+                <a:extLst>
+                  <a:ext uri="{FF2B5EF4-FFF2-40B4-BE49-F238E27FC236}">
+                    <a16:creationId xmlns:a16="http://schemas.microsoft.com/office/drawing/2014/main" id="{0BE06079-08F4-64BC-128C-1603C6B4F6D1}"/>
+                  </a:ext>
+                </a:extLst>
+              </p:cNvPr>
+              <p:cNvSpPr txBox="1"/>
+              <p:nvPr/>
+            </p:nvSpPr>
+            <p:spPr>
+              <a:xfrm>
+                <a:off x="3995649" y="3382425"/>
+                <a:ext cx="412292" cy="230832"/>
+              </a:xfrm>
+              <a:prstGeom prst="rect">
+                <a:avLst/>
+              </a:prstGeom>
+              <a:noFill/>
+            </p:spPr>
+            <p:txBody>
+              <a:bodyPr wrap="square" rtlCol="0">
+                <a:spAutoFit/>
+              </a:bodyPr>
+              <a:lstStyle/>
+              <a:p>
+                <a:pPr marL="0" marR="0" lvl="0" indent="0" algn="l" defTabSz="914400" rtl="0" eaLnBrk="1" fontAlgn="auto" latinLnBrk="0" hangingPunct="1">
+                  <a:lnSpc>
+                    <a:spcPct val="100000"/>
+                  </a:lnSpc>
+                  <a:spcBef>
+                    <a:spcPts val="0"/>
+                  </a:spcBef>
+                  <a:spcAft>
+                    <a:spcPts val="0"/>
+                  </a:spcAft>
+                  <a:buClrTx/>
+                  <a:buSzTx/>
+                  <a:buFontTx/>
+                  <a:buNone/>
+                  <a:tabLst/>
+                  <a:defRPr/>
+                </a:pPr>
+                <a:r>
+                  <a:rPr kumimoji="0" lang="en-US" sz="900" b="0" i="0" u="none" strike="noStrike" kern="1200" cap="none" spc="0" normalizeH="0" baseline="0" noProof="0" dirty="0">
+                    <a:ln>
+                      <a:noFill/>
+                    </a:ln>
+                    <a:solidFill>
+                      <a:prstClr val="black"/>
+                    </a:solidFill>
+                    <a:effectLst/>
+                    <a:uLnTx/>
+                    <a:uFillTx/>
+                    <a:ea typeface="+mn-ea"/>
+                    <a:cs typeface="+mn-cs"/>
+                  </a:rPr>
+                  <a:t>host</a:t>
+                </a:r>
+              </a:p>
+            </p:txBody>
+          </p:sp>
+        </p:grpSp>
+        <p:cxnSp>
+          <p:nvCxnSpPr>
+            <p:cNvPr id="154" name="Straight Arrow Connector 153">
+              <a:extLst>
+                <a:ext uri="{FF2B5EF4-FFF2-40B4-BE49-F238E27FC236}">
+                  <a16:creationId xmlns:a16="http://schemas.microsoft.com/office/drawing/2014/main" id="{5F100C27-844A-9943-2959-E46955931F9F}"/>
+                </a:ext>
+              </a:extLst>
+            </p:cNvPr>
+            <p:cNvCxnSpPr>
+              <a:cxnSpLocks/>
+            </p:cNvCxnSpPr>
+            <p:nvPr/>
+          </p:nvCxnSpPr>
+          <p:spPr>
+            <a:xfrm flipV="1">
+              <a:off x="4583430" y="3854875"/>
+              <a:ext cx="0" cy="362085"/>
+            </a:xfrm>
+            <a:prstGeom prst="straightConnector1">
+              <a:avLst/>
+            </a:prstGeom>
+            <a:ln w="12700">
+              <a:solidFill>
+                <a:schemeClr val="tx1"/>
+              </a:solidFill>
+              <a:headEnd type="triangle" w="med" len="med"/>
+              <a:tailEnd type="none" w="med" len="med"/>
+            </a:ln>
+          </p:spPr>
+          <p:style>
+            <a:lnRef idx="1">
+              <a:schemeClr val="accent1"/>
+            </a:lnRef>
+            <a:fillRef idx="0">
+              <a:schemeClr val="accent1"/>
+            </a:fillRef>
+            <a:effectRef idx="0">
+              <a:schemeClr val="accent1"/>
+            </a:effectRef>
+            <a:fontRef idx="minor">
+              <a:schemeClr val="tx1"/>
+            </a:fontRef>
+          </p:style>
+        </p:cxnSp>
+        <p:cxnSp>
+          <p:nvCxnSpPr>
+            <p:cNvPr id="155" name="Straight Arrow Connector 154">
+              <a:extLst>
+                <a:ext uri="{FF2B5EF4-FFF2-40B4-BE49-F238E27FC236}">
+                  <a16:creationId xmlns:a16="http://schemas.microsoft.com/office/drawing/2014/main" id="{74F64149-13FF-03CC-1CBB-34C9BD7B1887}"/>
+                </a:ext>
+              </a:extLst>
+            </p:cNvPr>
+            <p:cNvCxnSpPr>
+              <a:cxnSpLocks/>
+            </p:cNvCxnSpPr>
+            <p:nvPr/>
+          </p:nvCxnSpPr>
+          <p:spPr>
+            <a:xfrm flipV="1">
+              <a:off x="5747007" y="2371350"/>
+              <a:ext cx="0" cy="362085"/>
+            </a:xfrm>
+            <a:prstGeom prst="straightConnector1">
+              <a:avLst/>
+            </a:prstGeom>
+            <a:ln w="12700">
+              <a:solidFill>
+                <a:schemeClr val="tx1"/>
+              </a:solidFill>
+              <a:headEnd type="triangle" w="med" len="med"/>
+              <a:tailEnd type="none" w="med" len="med"/>
+            </a:ln>
+          </p:spPr>
+          <p:style>
+            <a:lnRef idx="1">
+              <a:schemeClr val="accent1"/>
+            </a:lnRef>
+            <a:fillRef idx="0">
+              <a:schemeClr val="accent1"/>
+            </a:fillRef>
+            <a:effectRef idx="0">
+              <a:schemeClr val="accent1"/>
+            </a:effectRef>
+            <a:fontRef idx="minor">
+              <a:schemeClr val="tx1"/>
+            </a:fontRef>
+          </p:style>
+        </p:cxnSp>
+        <p:cxnSp>
+          <p:nvCxnSpPr>
+            <p:cNvPr id="157" name="Straight Arrow Connector 156">
+              <a:extLst>
+                <a:ext uri="{FF2B5EF4-FFF2-40B4-BE49-F238E27FC236}">
+                  <a16:creationId xmlns:a16="http://schemas.microsoft.com/office/drawing/2014/main" id="{91C0F347-28D6-5FC8-706A-1710DA078346}"/>
+                </a:ext>
+              </a:extLst>
+            </p:cNvPr>
+            <p:cNvCxnSpPr>
+              <a:cxnSpLocks/>
+            </p:cNvCxnSpPr>
+            <p:nvPr/>
+          </p:nvCxnSpPr>
+          <p:spPr>
+            <a:xfrm flipV="1">
+              <a:off x="5747007" y="3859119"/>
+              <a:ext cx="0" cy="362085"/>
+            </a:xfrm>
+            <a:prstGeom prst="straightConnector1">
+              <a:avLst/>
+            </a:prstGeom>
+            <a:ln w="12700">
+              <a:solidFill>
+                <a:schemeClr val="tx1"/>
+              </a:solidFill>
+              <a:headEnd type="triangle" w="med" len="med"/>
+              <a:tailEnd type="none" w="med" len="med"/>
+            </a:ln>
+          </p:spPr>
+          <p:style>
+            <a:lnRef idx="1">
+              <a:schemeClr val="accent1"/>
+            </a:lnRef>
+            <a:fillRef idx="0">
+              <a:schemeClr val="accent1"/>
+            </a:fillRef>
+            <a:effectRef idx="0">
+              <a:schemeClr val="accent1"/>
+            </a:effectRef>
+            <a:fontRef idx="minor">
+              <a:schemeClr val="tx1"/>
+            </a:fontRef>
+          </p:style>
+        </p:cxnSp>
+      </p:grpSp>
+    </p:spTree>
+    <p:extLst>
+      <p:ext uri="{BB962C8B-B14F-4D97-AF65-F5344CB8AC3E}">
+        <p14:creationId xmlns:p14="http://schemas.microsoft.com/office/powerpoint/2010/main" val="388922257"/>
+      </p:ext>
+    </p:extLst>
+  </p:cSld>
+  <p:clrMapOvr>
+    <a:masterClrMapping/>
+  </p:clrMapOvr>
+</p:sld>
+</file>
+
 <file path=ppt/theme/theme1.xml><?xml version="1.0" encoding="utf-8"?>
 <a:theme xmlns:a="http://schemas.openxmlformats.org/drawingml/2006/main" name="Office Theme">
   <a:themeElements>

</xml_diff>

<commit_message>
Document platform layering approach (#273)
* Document challenges with platform layering

* Additional documentation about platform layering

* Add files via upload

* Add files via upload

* Correct the link to the OASIS TOSCA TC home page
</commit_message>
<xml_diff>
--- a/profiles/community/tosca/platform/sources/platforms.pptx
+++ b/profiles/community/tosca/platform/sources/platforms.pptx
@@ -10,7 +10,8 @@
     <p:sldId id="275" r:id="rId4"/>
     <p:sldId id="278" r:id="rId5"/>
     <p:sldId id="277" r:id="rId6"/>
-    <p:sldId id="276" r:id="rId7"/>
+    <p:sldId id="279" r:id="rId7"/>
+    <p:sldId id="276" r:id="rId8"/>
   </p:sldIdLst>
   <p:sldSz cx="12192000" cy="6858000"/>
   <p:notesSz cx="6858000" cy="9144000"/>
@@ -264,7 +265,7 @@
           <a:p>
             <a:fld id="{5BAF7096-B8B4-4A3B-8A26-165AAEF12400}" type="datetimeFigureOut">
               <a:rPr lang="en-US" smtClean="0"/>
-              <a:t>12/3/2025</a:t>
+              <a:t>1/14/2026</a:t>
             </a:fld>
             <a:endParaRPr lang="en-US"/>
           </a:p>
@@ -462,7 +463,7 @@
           <a:p>
             <a:fld id="{5BAF7096-B8B4-4A3B-8A26-165AAEF12400}" type="datetimeFigureOut">
               <a:rPr lang="en-US" smtClean="0"/>
-              <a:t>12/3/2025</a:t>
+              <a:t>1/14/2026</a:t>
             </a:fld>
             <a:endParaRPr lang="en-US"/>
           </a:p>
@@ -670,7 +671,7 @@
           <a:p>
             <a:fld id="{5BAF7096-B8B4-4A3B-8A26-165AAEF12400}" type="datetimeFigureOut">
               <a:rPr lang="en-US" smtClean="0"/>
-              <a:t>12/3/2025</a:t>
+              <a:t>1/14/2026</a:t>
             </a:fld>
             <a:endParaRPr lang="en-US"/>
           </a:p>
@@ -868,7 +869,7 @@
           <a:p>
             <a:fld id="{5BAF7096-B8B4-4A3B-8A26-165AAEF12400}" type="datetimeFigureOut">
               <a:rPr lang="en-US" smtClean="0"/>
-              <a:t>12/3/2025</a:t>
+              <a:t>1/14/2026</a:t>
             </a:fld>
             <a:endParaRPr lang="en-US"/>
           </a:p>
@@ -1143,7 +1144,7 @@
           <a:p>
             <a:fld id="{5BAF7096-B8B4-4A3B-8A26-165AAEF12400}" type="datetimeFigureOut">
               <a:rPr lang="en-US" smtClean="0"/>
-              <a:t>12/3/2025</a:t>
+              <a:t>1/14/2026</a:t>
             </a:fld>
             <a:endParaRPr lang="en-US"/>
           </a:p>
@@ -1408,7 +1409,7 @@
           <a:p>
             <a:fld id="{5BAF7096-B8B4-4A3B-8A26-165AAEF12400}" type="datetimeFigureOut">
               <a:rPr lang="en-US" smtClean="0"/>
-              <a:t>12/3/2025</a:t>
+              <a:t>1/14/2026</a:t>
             </a:fld>
             <a:endParaRPr lang="en-US"/>
           </a:p>
@@ -1820,7 +1821,7 @@
           <a:p>
             <a:fld id="{5BAF7096-B8B4-4A3B-8A26-165AAEF12400}" type="datetimeFigureOut">
               <a:rPr lang="en-US" smtClean="0"/>
-              <a:t>12/3/2025</a:t>
+              <a:t>1/14/2026</a:t>
             </a:fld>
             <a:endParaRPr lang="en-US"/>
           </a:p>
@@ -1961,7 +1962,7 @@
           <a:p>
             <a:fld id="{5BAF7096-B8B4-4A3B-8A26-165AAEF12400}" type="datetimeFigureOut">
               <a:rPr lang="en-US" smtClean="0"/>
-              <a:t>12/3/2025</a:t>
+              <a:t>1/14/2026</a:t>
             </a:fld>
             <a:endParaRPr lang="en-US"/>
           </a:p>
@@ -2074,7 +2075,7 @@
           <a:p>
             <a:fld id="{5BAF7096-B8B4-4A3B-8A26-165AAEF12400}" type="datetimeFigureOut">
               <a:rPr lang="en-US" smtClean="0"/>
-              <a:t>12/3/2025</a:t>
+              <a:t>1/14/2026</a:t>
             </a:fld>
             <a:endParaRPr lang="en-US"/>
           </a:p>
@@ -2385,7 +2386,7 @@
           <a:p>
             <a:fld id="{5BAF7096-B8B4-4A3B-8A26-165AAEF12400}" type="datetimeFigureOut">
               <a:rPr lang="en-US" smtClean="0"/>
-              <a:t>12/3/2025</a:t>
+              <a:t>1/14/2026</a:t>
             </a:fld>
             <a:endParaRPr lang="en-US"/>
           </a:p>
@@ -2673,7 +2674,7 @@
           <a:p>
             <a:fld id="{5BAF7096-B8B4-4A3B-8A26-165AAEF12400}" type="datetimeFigureOut">
               <a:rPr lang="en-US" smtClean="0"/>
-              <a:t>12/3/2025</a:t>
+              <a:t>1/14/2026</a:t>
             </a:fld>
             <a:endParaRPr lang="en-US"/>
           </a:p>
@@ -2914,7 +2915,7 @@
           <a:p>
             <a:fld id="{5BAF7096-B8B4-4A3B-8A26-165AAEF12400}" type="datetimeFigureOut">
               <a:rPr lang="en-US" smtClean="0"/>
-              <a:t>12/3/2025</a:t>
+              <a:t>1/14/2026</a:t>
             </a:fld>
             <a:endParaRPr lang="en-US"/>
           </a:p>
@@ -10869,6 +10870,2242 @@
     </p:spTree>
     <p:extLst>
       <p:ext uri="{BB962C8B-B14F-4D97-AF65-F5344CB8AC3E}">
+        <p14:creationId xmlns:p14="http://schemas.microsoft.com/office/powerpoint/2010/main" val="3438471303"/>
+      </p:ext>
+    </p:extLst>
+  </p:cSld>
+  <p:clrMapOvr>
+    <a:masterClrMapping/>
+  </p:clrMapOvr>
+</p:sld>
+</file>
+
+<file path=ppt/slides/slide7.xml><?xml version="1.0" encoding="utf-8"?>
+<p:sld xmlns:a="http://schemas.openxmlformats.org/drawingml/2006/main" xmlns:r="http://schemas.openxmlformats.org/officeDocument/2006/relationships" xmlns:p="http://schemas.openxmlformats.org/presentationml/2006/main">
+  <p:cSld>
+    <p:spTree>
+      <p:nvGrpSpPr>
+        <p:cNvPr id="1" name=""/>
+        <p:cNvGrpSpPr/>
+        <p:nvPr/>
+      </p:nvGrpSpPr>
+      <p:grpSpPr>
+        <a:xfrm>
+          <a:off x="0" y="0"/>
+          <a:ext cx="0" cy="0"/>
+          <a:chOff x="0" y="0"/>
+          <a:chExt cx="0" cy="0"/>
+        </a:xfrm>
+      </p:grpSpPr>
+      <p:grpSp>
+        <p:nvGrpSpPr>
+          <p:cNvPr id="18" name="Group 17">
+            <a:extLst>
+              <a:ext uri="{FF2B5EF4-FFF2-40B4-BE49-F238E27FC236}">
+                <a16:creationId xmlns:a16="http://schemas.microsoft.com/office/drawing/2014/main" id="{0965E86A-1C94-A558-145A-CBC2E89E62AD}"/>
+              </a:ext>
+            </a:extLst>
+          </p:cNvPr>
+          <p:cNvGrpSpPr/>
+          <p:nvPr/>
+        </p:nvGrpSpPr>
+        <p:grpSpPr>
+          <a:xfrm>
+            <a:off x="5600935" y="4897646"/>
+            <a:ext cx="771421" cy="991032"/>
+            <a:chOff x="3816079" y="4223863"/>
+            <a:chExt cx="771421" cy="991032"/>
+          </a:xfrm>
+        </p:grpSpPr>
+        <p:sp>
+          <p:nvSpPr>
+            <p:cNvPr id="19" name="Rectangle 18">
+              <a:extLst>
+                <a:ext uri="{FF2B5EF4-FFF2-40B4-BE49-F238E27FC236}">
+                  <a16:creationId xmlns:a16="http://schemas.microsoft.com/office/drawing/2014/main" id="{D1423ABE-B95A-39BF-B25A-51AE295D7BCC}"/>
+                </a:ext>
+              </a:extLst>
+            </p:cNvPr>
+            <p:cNvSpPr/>
+            <p:nvPr/>
+          </p:nvSpPr>
+          <p:spPr>
+            <a:xfrm>
+              <a:off x="3816079" y="4722603"/>
+              <a:ext cx="771421" cy="250978"/>
+            </a:xfrm>
+            <a:prstGeom prst="rect">
+              <a:avLst/>
+            </a:prstGeom>
+            <a:solidFill>
+              <a:schemeClr val="bg1">
+                <a:lumMod val="95000"/>
+              </a:schemeClr>
+            </a:solidFill>
+            <a:ln w="19050">
+              <a:solidFill>
+                <a:schemeClr val="bg2"/>
+              </a:solidFill>
+            </a:ln>
+          </p:spPr>
+          <p:style>
+            <a:lnRef idx="2">
+              <a:schemeClr val="accent1">
+                <a:shade val="50000"/>
+              </a:schemeClr>
+            </a:lnRef>
+            <a:fillRef idx="1">
+              <a:schemeClr val="accent1"/>
+            </a:fillRef>
+            <a:effectRef idx="0">
+              <a:schemeClr val="accent1"/>
+            </a:effectRef>
+            <a:fontRef idx="minor">
+              <a:schemeClr val="lt1"/>
+            </a:fontRef>
+          </p:style>
+          <p:txBody>
+            <a:bodyPr lIns="0" rIns="0" rtlCol="0" anchor="ctr"/>
+            <a:lstStyle/>
+            <a:p>
+              <a:pPr marL="0" marR="0" lvl="0" indent="0" algn="ctr" defTabSz="914400" rtl="0" eaLnBrk="1" fontAlgn="auto" latinLnBrk="0" hangingPunct="1">
+                <a:lnSpc>
+                  <a:spcPct val="100000"/>
+                </a:lnSpc>
+                <a:spcBef>
+                  <a:spcPts val="0"/>
+                </a:spcBef>
+                <a:spcAft>
+                  <a:spcPts val="0"/>
+                </a:spcAft>
+                <a:buClrTx/>
+                <a:buSzTx/>
+                <a:buFontTx/>
+                <a:buNone/>
+                <a:tabLst/>
+                <a:defRPr/>
+              </a:pPr>
+              <a:r>
+                <a:rPr kumimoji="0" lang="en-US" sz="900" b="0" i="0" u="none" strike="noStrike" kern="1200" cap="none" spc="0" normalizeH="0" baseline="0" noProof="0" dirty="0">
+                  <a:ln>
+                    <a:noFill/>
+                  </a:ln>
+                  <a:solidFill>
+                    <a:prstClr val="black"/>
+                  </a:solidFill>
+                  <a:effectLst/>
+                  <a:uLnTx/>
+                  <a:uFillTx/>
+                  <a:ea typeface="+mn-ea"/>
+                  <a:cs typeface="+mn-cs"/>
+                </a:rPr>
+                <a:t>Compute</a:t>
+              </a:r>
+            </a:p>
+            <a:p>
+              <a:pPr marL="0" marR="0" lvl="0" indent="0" algn="ctr" defTabSz="914400" rtl="0" eaLnBrk="1" fontAlgn="auto" latinLnBrk="0" hangingPunct="1">
+                <a:lnSpc>
+                  <a:spcPct val="100000"/>
+                </a:lnSpc>
+                <a:spcBef>
+                  <a:spcPts val="0"/>
+                </a:spcBef>
+                <a:spcAft>
+                  <a:spcPts val="0"/>
+                </a:spcAft>
+                <a:buClrTx/>
+                <a:buSzTx/>
+                <a:buFontTx/>
+                <a:buNone/>
+                <a:tabLst/>
+                <a:defRPr/>
+              </a:pPr>
+              <a:r>
+                <a:rPr kumimoji="0" lang="en-US" sz="900" b="0" i="0" u="none" strike="noStrike" kern="1200" cap="none" spc="0" normalizeH="0" baseline="0" noProof="0" dirty="0">
+                  <a:ln>
+                    <a:noFill/>
+                  </a:ln>
+                  <a:solidFill>
+                    <a:prstClr val="black"/>
+                  </a:solidFill>
+                  <a:effectLst/>
+                  <a:uLnTx/>
+                  <a:uFillTx/>
+                  <a:ea typeface="+mn-ea"/>
+                  <a:cs typeface="+mn-cs"/>
+                </a:rPr>
+                <a:t>Platform</a:t>
+              </a:r>
+            </a:p>
+          </p:txBody>
+        </p:sp>
+        <p:sp>
+          <p:nvSpPr>
+            <p:cNvPr id="20" name="Rectangle: Rounded Corners 19">
+              <a:extLst>
+                <a:ext uri="{FF2B5EF4-FFF2-40B4-BE49-F238E27FC236}">
+                  <a16:creationId xmlns:a16="http://schemas.microsoft.com/office/drawing/2014/main" id="{78CF353B-5D46-A40D-867F-63CF5553D636}"/>
+                </a:ext>
+              </a:extLst>
+            </p:cNvPr>
+            <p:cNvSpPr/>
+            <p:nvPr/>
+          </p:nvSpPr>
+          <p:spPr>
+            <a:xfrm>
+              <a:off x="3816080" y="4399416"/>
+              <a:ext cx="771420" cy="815479"/>
+            </a:xfrm>
+            <a:prstGeom prst="roundRect">
+              <a:avLst/>
+            </a:prstGeom>
+            <a:noFill/>
+            <a:ln w="19050">
+              <a:solidFill>
+                <a:schemeClr val="tx1"/>
+              </a:solidFill>
+            </a:ln>
+          </p:spPr>
+          <p:style>
+            <a:lnRef idx="2">
+              <a:schemeClr val="accent1">
+                <a:shade val="50000"/>
+              </a:schemeClr>
+            </a:lnRef>
+            <a:fillRef idx="1">
+              <a:schemeClr val="accent1"/>
+            </a:fillRef>
+            <a:effectRef idx="0">
+              <a:schemeClr val="accent1"/>
+            </a:effectRef>
+            <a:fontRef idx="minor">
+              <a:schemeClr val="lt1"/>
+            </a:fontRef>
+          </p:style>
+          <p:txBody>
+            <a:bodyPr lIns="45720" tIns="0" bIns="9144" rtlCol="0" anchor="b" anchorCtr="0"/>
+            <a:lstStyle/>
+            <a:p>
+              <a:pPr lvl="0">
+                <a:defRPr/>
+              </a:pPr>
+              <a:r>
+                <a:rPr lang="en-US" sz="800" dirty="0">
+                  <a:solidFill>
+                    <a:prstClr val="black"/>
+                  </a:solidFill>
+                </a:rPr>
+                <a:t>server-1</a:t>
+              </a:r>
+              <a:endParaRPr kumimoji="0" lang="en-US" sz="800" b="0" i="0" u="none" strike="noStrike" kern="1200" cap="none" spc="0" normalizeH="0" baseline="0" noProof="0" dirty="0">
+                <a:ln>
+                  <a:noFill/>
+                </a:ln>
+                <a:solidFill>
+                  <a:prstClr val="black"/>
+                </a:solidFill>
+                <a:effectLst/>
+                <a:uLnTx/>
+                <a:uFillTx/>
+                <a:ea typeface="+mn-ea"/>
+                <a:cs typeface="+mn-cs"/>
+              </a:endParaRPr>
+            </a:p>
+          </p:txBody>
+        </p:sp>
+        <p:sp>
+          <p:nvSpPr>
+            <p:cNvPr id="21" name="Arrow: Chevron 20">
+              <a:extLst>
+                <a:ext uri="{FF2B5EF4-FFF2-40B4-BE49-F238E27FC236}">
+                  <a16:creationId xmlns:a16="http://schemas.microsoft.com/office/drawing/2014/main" id="{C60B1716-C9A4-F253-E974-95F1F394129E}"/>
+                </a:ext>
+              </a:extLst>
+            </p:cNvPr>
+            <p:cNvSpPr/>
+            <p:nvPr/>
+          </p:nvSpPr>
+          <p:spPr>
+            <a:xfrm rot="5400000">
+              <a:off x="4026243" y="4166150"/>
+              <a:ext cx="351106" cy="466531"/>
+            </a:xfrm>
+            <a:prstGeom prst="chevron">
+              <a:avLst>
+                <a:gd name="adj" fmla="val 14000"/>
+              </a:avLst>
+            </a:prstGeom>
+            <a:solidFill>
+              <a:schemeClr val="bg1"/>
+            </a:solidFill>
+            <a:ln w="12700">
+              <a:solidFill>
+                <a:schemeClr val="tx1"/>
+              </a:solidFill>
+            </a:ln>
+          </p:spPr>
+          <p:style>
+            <a:lnRef idx="2">
+              <a:schemeClr val="accent1">
+                <a:shade val="50000"/>
+              </a:schemeClr>
+            </a:lnRef>
+            <a:fillRef idx="1">
+              <a:schemeClr val="accent1"/>
+            </a:fillRef>
+            <a:effectRef idx="0">
+              <a:schemeClr val="accent1"/>
+            </a:effectRef>
+            <a:fontRef idx="minor">
+              <a:schemeClr val="lt1"/>
+            </a:fontRef>
+          </p:style>
+          <p:txBody>
+            <a:bodyPr tIns="0" rtlCol="0" anchor="t" anchorCtr="0"/>
+            <a:lstStyle/>
+            <a:p>
+              <a:pPr marL="0" marR="0" lvl="0" indent="0" algn="l" defTabSz="914400" rtl="0" eaLnBrk="1" fontAlgn="auto" latinLnBrk="0" hangingPunct="1">
+                <a:lnSpc>
+                  <a:spcPct val="100000"/>
+                </a:lnSpc>
+                <a:spcBef>
+                  <a:spcPts val="0"/>
+                </a:spcBef>
+                <a:spcAft>
+                  <a:spcPts val="0"/>
+                </a:spcAft>
+                <a:buClrTx/>
+                <a:buSzTx/>
+                <a:buFontTx/>
+                <a:buNone/>
+                <a:tabLst/>
+                <a:defRPr/>
+              </a:pPr>
+              <a:endParaRPr kumimoji="0" lang="en-US" sz="1000" b="0" i="0" u="none" strike="noStrike" kern="1200" cap="none" spc="0" normalizeH="0" baseline="0" noProof="0">
+                <a:ln>
+                  <a:noFill/>
+                </a:ln>
+                <a:solidFill>
+                  <a:prstClr val="black"/>
+                </a:solidFill>
+                <a:effectLst/>
+                <a:uLnTx/>
+                <a:uFillTx/>
+                <a:ea typeface="+mn-ea"/>
+                <a:cs typeface="+mn-cs"/>
+              </a:endParaRPr>
+            </a:p>
+          </p:txBody>
+        </p:sp>
+        <p:sp>
+          <p:nvSpPr>
+            <p:cNvPr id="22" name="TextBox 21">
+              <a:extLst>
+                <a:ext uri="{FF2B5EF4-FFF2-40B4-BE49-F238E27FC236}">
+                  <a16:creationId xmlns:a16="http://schemas.microsoft.com/office/drawing/2014/main" id="{F268AEC8-6C38-0232-0F56-5A4E5946BD1B}"/>
+                </a:ext>
+              </a:extLst>
+            </p:cNvPr>
+            <p:cNvSpPr txBox="1"/>
+            <p:nvPr/>
+          </p:nvSpPr>
+          <p:spPr>
+            <a:xfrm>
+              <a:off x="3995650" y="4276305"/>
+              <a:ext cx="412292" cy="230832"/>
+            </a:xfrm>
+            <a:prstGeom prst="rect">
+              <a:avLst/>
+            </a:prstGeom>
+            <a:noFill/>
+          </p:spPr>
+          <p:txBody>
+            <a:bodyPr wrap="square" rtlCol="0">
+              <a:spAutoFit/>
+            </a:bodyPr>
+            <a:lstStyle/>
+            <a:p>
+              <a:pPr marL="0" marR="0" lvl="0" indent="0" algn="l" defTabSz="914400" rtl="0" eaLnBrk="1" fontAlgn="auto" latinLnBrk="0" hangingPunct="1">
+                <a:lnSpc>
+                  <a:spcPct val="100000"/>
+                </a:lnSpc>
+                <a:spcBef>
+                  <a:spcPts val="0"/>
+                </a:spcBef>
+                <a:spcAft>
+                  <a:spcPts val="0"/>
+                </a:spcAft>
+                <a:buClrTx/>
+                <a:buSzTx/>
+                <a:buFontTx/>
+                <a:buNone/>
+                <a:tabLst/>
+                <a:defRPr/>
+              </a:pPr>
+              <a:r>
+                <a:rPr kumimoji="0" lang="en-US" sz="900" b="0" i="0" u="none" strike="noStrike" kern="1200" cap="none" spc="0" normalizeH="0" baseline="0" noProof="0" dirty="0">
+                  <a:ln>
+                    <a:noFill/>
+                  </a:ln>
+                  <a:solidFill>
+                    <a:prstClr val="black"/>
+                  </a:solidFill>
+                  <a:effectLst/>
+                  <a:uLnTx/>
+                  <a:uFillTx/>
+                  <a:ea typeface="+mn-ea"/>
+                  <a:cs typeface="+mn-cs"/>
+                </a:rPr>
+                <a:t>host</a:t>
+              </a:r>
+            </a:p>
+          </p:txBody>
+        </p:sp>
+      </p:grpSp>
+      <p:cxnSp>
+        <p:nvCxnSpPr>
+          <p:cNvPr id="157" name="Straight Arrow Connector 156">
+            <a:extLst>
+              <a:ext uri="{FF2B5EF4-FFF2-40B4-BE49-F238E27FC236}">
+                <a16:creationId xmlns:a16="http://schemas.microsoft.com/office/drawing/2014/main" id="{91C0F347-28D6-5FC8-706A-1710DA078346}"/>
+              </a:ext>
+            </a:extLst>
+          </p:cNvPr>
+          <p:cNvCxnSpPr>
+            <a:cxnSpLocks/>
+            <a:stCxn id="10" idx="0"/>
+            <a:endCxn id="27" idx="2"/>
+          </p:cNvCxnSpPr>
+          <p:nvPr/>
+        </p:nvCxnSpPr>
+        <p:spPr>
+          <a:xfrm flipH="1" flipV="1">
+            <a:off x="5688387" y="3195158"/>
+            <a:ext cx="789522" cy="312363"/>
+          </a:xfrm>
+          <a:prstGeom prst="straightConnector1">
+            <a:avLst/>
+          </a:prstGeom>
+          <a:ln w="12700">
+            <a:solidFill>
+              <a:schemeClr val="tx1"/>
+            </a:solidFill>
+            <a:headEnd type="triangle" w="med" len="med"/>
+            <a:tailEnd type="none" w="med" len="med"/>
+          </a:ln>
+        </p:spPr>
+        <p:style>
+          <a:lnRef idx="1">
+            <a:schemeClr val="accent1"/>
+          </a:lnRef>
+          <a:fillRef idx="0">
+            <a:schemeClr val="accent1"/>
+          </a:fillRef>
+          <a:effectRef idx="0">
+            <a:schemeClr val="accent1"/>
+          </a:effectRef>
+          <a:fontRef idx="minor">
+            <a:schemeClr val="tx1"/>
+          </a:fontRef>
+        </p:style>
+      </p:cxnSp>
+      <p:cxnSp>
+        <p:nvCxnSpPr>
+          <p:cNvPr id="17" name="Straight Arrow Connector 16">
+            <a:extLst>
+              <a:ext uri="{FF2B5EF4-FFF2-40B4-BE49-F238E27FC236}">
+                <a16:creationId xmlns:a16="http://schemas.microsoft.com/office/drawing/2014/main" id="{E58D11E9-E884-B98D-C7B8-50308964A9BB}"/>
+              </a:ext>
+            </a:extLst>
+          </p:cNvPr>
+          <p:cNvCxnSpPr>
+            <a:cxnSpLocks/>
+            <a:stCxn id="22" idx="0"/>
+            <a:endCxn id="37" idx="2"/>
+          </p:cNvCxnSpPr>
+          <p:nvPr/>
+        </p:nvCxnSpPr>
+        <p:spPr>
+          <a:xfrm flipV="1">
+            <a:off x="5986652" y="4634056"/>
+            <a:ext cx="491256" cy="316032"/>
+          </a:xfrm>
+          <a:prstGeom prst="straightConnector1">
+            <a:avLst/>
+          </a:prstGeom>
+          <a:ln w="12700">
+            <a:solidFill>
+              <a:schemeClr val="tx1"/>
+            </a:solidFill>
+            <a:headEnd type="triangle" w="med" len="med"/>
+            <a:tailEnd type="none" w="med" len="med"/>
+          </a:ln>
+        </p:spPr>
+        <p:style>
+          <a:lnRef idx="1">
+            <a:schemeClr val="accent1"/>
+          </a:lnRef>
+          <a:fillRef idx="0">
+            <a:schemeClr val="accent1"/>
+          </a:fillRef>
+          <a:effectRef idx="0">
+            <a:schemeClr val="accent1"/>
+          </a:effectRef>
+          <a:fontRef idx="minor">
+            <a:schemeClr val="tx1"/>
+          </a:fontRef>
+        </p:style>
+      </p:cxnSp>
+      <p:cxnSp>
+        <p:nvCxnSpPr>
+          <p:cNvPr id="4" name="Straight Arrow Connector 3">
+            <a:extLst>
+              <a:ext uri="{FF2B5EF4-FFF2-40B4-BE49-F238E27FC236}">
+                <a16:creationId xmlns:a16="http://schemas.microsoft.com/office/drawing/2014/main" id="{DC2ECF99-429F-AEDC-EECA-CE21A58CA59B}"/>
+              </a:ext>
+            </a:extLst>
+          </p:cNvPr>
+          <p:cNvCxnSpPr>
+            <a:cxnSpLocks/>
+            <a:stCxn id="21" idx="1"/>
+            <a:endCxn id="23" idx="2"/>
+          </p:cNvCxnSpPr>
+          <p:nvPr/>
+        </p:nvCxnSpPr>
+        <p:spPr>
+          <a:xfrm flipH="1" flipV="1">
+            <a:off x="5302975" y="3195158"/>
+            <a:ext cx="683677" cy="1751643"/>
+          </a:xfrm>
+          <a:prstGeom prst="straightConnector1">
+            <a:avLst/>
+          </a:prstGeom>
+          <a:ln w="12700">
+            <a:solidFill>
+              <a:schemeClr val="tx1"/>
+            </a:solidFill>
+            <a:headEnd type="triangle" w="med" len="med"/>
+            <a:tailEnd type="none" w="med" len="med"/>
+          </a:ln>
+        </p:spPr>
+        <p:style>
+          <a:lnRef idx="1">
+            <a:schemeClr val="accent1"/>
+          </a:lnRef>
+          <a:fillRef idx="0">
+            <a:schemeClr val="accent1"/>
+          </a:fillRef>
+          <a:effectRef idx="0">
+            <a:schemeClr val="accent1"/>
+          </a:effectRef>
+          <a:fontRef idx="minor">
+            <a:schemeClr val="tx1"/>
+          </a:fontRef>
+        </p:style>
+      </p:cxnSp>
+      <p:grpSp>
+        <p:nvGrpSpPr>
+          <p:cNvPr id="31" name="Group 30">
+            <a:extLst>
+              <a:ext uri="{FF2B5EF4-FFF2-40B4-BE49-F238E27FC236}">
+                <a16:creationId xmlns:a16="http://schemas.microsoft.com/office/drawing/2014/main" id="{77832EC5-4820-7807-59DB-9302AC44E342}"/>
+              </a:ext>
+            </a:extLst>
+          </p:cNvPr>
+          <p:cNvGrpSpPr/>
+          <p:nvPr/>
+        </p:nvGrpSpPr>
+        <p:grpSpPr>
+          <a:xfrm>
+            <a:off x="6092198" y="3455079"/>
+            <a:ext cx="771421" cy="1211215"/>
+            <a:chOff x="6092198" y="3344244"/>
+            <a:chExt cx="771421" cy="1211215"/>
+          </a:xfrm>
+        </p:grpSpPr>
+        <p:grpSp>
+          <p:nvGrpSpPr>
+            <p:cNvPr id="146" name="Group 145">
+              <a:extLst>
+                <a:ext uri="{FF2B5EF4-FFF2-40B4-BE49-F238E27FC236}">
+                  <a16:creationId xmlns:a16="http://schemas.microsoft.com/office/drawing/2014/main" id="{21372C5F-6019-6E0C-9508-4E8A358AF2EE}"/>
+                </a:ext>
+              </a:extLst>
+            </p:cNvPr>
+            <p:cNvGrpSpPr/>
+            <p:nvPr/>
+          </p:nvGrpSpPr>
+          <p:grpSpPr>
+            <a:xfrm>
+              <a:off x="6092198" y="3581360"/>
+              <a:ext cx="771421" cy="815478"/>
+              <a:chOff x="4115528" y="2823110"/>
+              <a:chExt cx="771421" cy="815478"/>
+            </a:xfrm>
+          </p:grpSpPr>
+          <p:sp>
+            <p:nvSpPr>
+              <p:cNvPr id="34" name="Rectangle 33">
+                <a:extLst>
+                  <a:ext uri="{FF2B5EF4-FFF2-40B4-BE49-F238E27FC236}">
+                    <a16:creationId xmlns:a16="http://schemas.microsoft.com/office/drawing/2014/main" id="{AC8C008F-40AE-7B56-066D-358A9B134B49}"/>
+                  </a:ext>
+                </a:extLst>
+              </p:cNvPr>
+              <p:cNvSpPr/>
+              <p:nvPr/>
+            </p:nvSpPr>
+            <p:spPr>
+              <a:xfrm>
+                <a:off x="4115528" y="3145212"/>
+                <a:ext cx="771421" cy="279919"/>
+              </a:xfrm>
+              <a:prstGeom prst="rect">
+                <a:avLst/>
+              </a:prstGeom>
+              <a:solidFill>
+                <a:schemeClr val="bg1">
+                  <a:lumMod val="95000"/>
+                </a:schemeClr>
+              </a:solidFill>
+              <a:ln w="19050">
+                <a:solidFill>
+                  <a:schemeClr val="bg2"/>
+                </a:solidFill>
+              </a:ln>
+            </p:spPr>
+            <p:style>
+              <a:lnRef idx="2">
+                <a:schemeClr val="accent1">
+                  <a:shade val="50000"/>
+                </a:schemeClr>
+              </a:lnRef>
+              <a:fillRef idx="1">
+                <a:schemeClr val="accent1"/>
+              </a:fillRef>
+              <a:effectRef idx="0">
+                <a:schemeClr val="accent1"/>
+              </a:effectRef>
+              <a:fontRef idx="minor">
+                <a:schemeClr val="lt1"/>
+              </a:fontRef>
+            </p:style>
+            <p:txBody>
+              <a:bodyPr lIns="0" rIns="0" rtlCol="0" anchor="ctr"/>
+              <a:lstStyle/>
+              <a:p>
+                <a:pPr marL="0" marR="0" lvl="0" indent="0" algn="ctr" defTabSz="914400" rtl="0" eaLnBrk="1" fontAlgn="auto" latinLnBrk="0" hangingPunct="1">
+                  <a:lnSpc>
+                    <a:spcPct val="100000"/>
+                  </a:lnSpc>
+                  <a:spcBef>
+                    <a:spcPts val="0"/>
+                  </a:spcBef>
+                  <a:spcAft>
+                    <a:spcPts val="0"/>
+                  </a:spcAft>
+                  <a:buClrTx/>
+                  <a:buSzTx/>
+                  <a:buFontTx/>
+                  <a:buNone/>
+                  <a:tabLst/>
+                  <a:defRPr/>
+                </a:pPr>
+                <a:r>
+                  <a:rPr kumimoji="0" lang="en-US" sz="900" b="0" i="0" u="none" strike="noStrike" kern="1200" cap="none" spc="0" normalizeH="0" baseline="0" noProof="0" dirty="0">
+                    <a:ln>
+                      <a:noFill/>
+                    </a:ln>
+                    <a:solidFill>
+                      <a:prstClr val="black"/>
+                    </a:solidFill>
+                    <a:effectLst/>
+                    <a:uLnTx/>
+                    <a:uFillTx/>
+                    <a:ea typeface="+mn-ea"/>
+                    <a:cs typeface="+mn-cs"/>
+                  </a:rPr>
+                  <a:t>Kubernetes Cluster</a:t>
+                </a:r>
+              </a:p>
+            </p:txBody>
+          </p:sp>
+          <p:sp>
+            <p:nvSpPr>
+              <p:cNvPr id="35" name="Rectangle: Rounded Corners 34">
+                <a:extLst>
+                  <a:ext uri="{FF2B5EF4-FFF2-40B4-BE49-F238E27FC236}">
+                    <a16:creationId xmlns:a16="http://schemas.microsoft.com/office/drawing/2014/main" id="{DFBFC135-6FE4-4904-9572-E0043D70EBD6}"/>
+                  </a:ext>
+                </a:extLst>
+              </p:cNvPr>
+              <p:cNvSpPr/>
+              <p:nvPr/>
+            </p:nvSpPr>
+            <p:spPr>
+              <a:xfrm>
+                <a:off x="4115528" y="2823110"/>
+                <a:ext cx="771420" cy="815478"/>
+              </a:xfrm>
+              <a:prstGeom prst="roundRect">
+                <a:avLst/>
+              </a:prstGeom>
+              <a:noFill/>
+              <a:ln w="19050">
+                <a:solidFill>
+                  <a:schemeClr val="tx1"/>
+                </a:solidFill>
+              </a:ln>
+            </p:spPr>
+            <p:style>
+              <a:lnRef idx="2">
+                <a:schemeClr val="accent1">
+                  <a:shade val="50000"/>
+                </a:schemeClr>
+              </a:lnRef>
+              <a:fillRef idx="1">
+                <a:schemeClr val="accent1"/>
+              </a:fillRef>
+              <a:effectRef idx="0">
+                <a:schemeClr val="accent1"/>
+              </a:effectRef>
+              <a:fontRef idx="minor">
+                <a:schemeClr val="lt1"/>
+              </a:fontRef>
+            </p:style>
+            <p:txBody>
+              <a:bodyPr lIns="45720" tIns="118872" rtlCol="0" anchor="t" anchorCtr="0"/>
+              <a:lstStyle/>
+              <a:p>
+                <a:pPr marL="0" marR="0" lvl="0" indent="0" algn="l" defTabSz="914400" rtl="0" eaLnBrk="1" fontAlgn="auto" latinLnBrk="0" hangingPunct="1">
+                  <a:lnSpc>
+                    <a:spcPct val="100000"/>
+                  </a:lnSpc>
+                  <a:spcBef>
+                    <a:spcPts val="0"/>
+                  </a:spcBef>
+                  <a:spcAft>
+                    <a:spcPts val="0"/>
+                  </a:spcAft>
+                  <a:buClrTx/>
+                  <a:buSzTx/>
+                  <a:buFontTx/>
+                  <a:buNone/>
+                  <a:tabLst/>
+                  <a:defRPr/>
+                </a:pPr>
+                <a:r>
+                  <a:rPr lang="en-US" sz="800" dirty="0">
+                    <a:solidFill>
+                      <a:prstClr val="black"/>
+                    </a:solidFill>
+                  </a:rPr>
+                  <a:t>cluster-1</a:t>
+                </a:r>
+                <a:endParaRPr kumimoji="0" lang="en-US" sz="800" b="0" i="0" u="none" strike="noStrike" kern="1200" cap="none" spc="0" normalizeH="0" baseline="0" noProof="0" dirty="0">
+                  <a:ln>
+                    <a:noFill/>
+                  </a:ln>
+                  <a:solidFill>
+                    <a:prstClr val="black"/>
+                  </a:solidFill>
+                  <a:effectLst/>
+                  <a:uLnTx/>
+                  <a:uFillTx/>
+                  <a:ea typeface="+mn-ea"/>
+                  <a:cs typeface="+mn-cs"/>
+                </a:endParaRPr>
+              </a:p>
+            </p:txBody>
+          </p:sp>
+        </p:grpSp>
+        <p:sp>
+          <p:nvSpPr>
+            <p:cNvPr id="36" name="Flowchart: Off-page Connector 35">
+              <a:extLst>
+                <a:ext uri="{FF2B5EF4-FFF2-40B4-BE49-F238E27FC236}">
+                  <a16:creationId xmlns:a16="http://schemas.microsoft.com/office/drawing/2014/main" id="{200F0872-23D3-5A7D-8660-9DA58F7CD82D}"/>
+                </a:ext>
+              </a:extLst>
+            </p:cNvPr>
+            <p:cNvSpPr/>
+            <p:nvPr/>
+          </p:nvSpPr>
+          <p:spPr>
+            <a:xfrm>
+              <a:off x="6244643" y="4275540"/>
+              <a:ext cx="466531" cy="279919"/>
+            </a:xfrm>
+            <a:prstGeom prst="flowChartOffpageConnector">
+              <a:avLst/>
+            </a:prstGeom>
+            <a:solidFill>
+              <a:schemeClr val="bg1"/>
+            </a:solidFill>
+            <a:ln w="19050">
+              <a:solidFill>
+                <a:schemeClr val="tx1"/>
+              </a:solidFill>
+            </a:ln>
+          </p:spPr>
+          <p:style>
+            <a:lnRef idx="2">
+              <a:schemeClr val="accent1">
+                <a:shade val="50000"/>
+              </a:schemeClr>
+            </a:lnRef>
+            <a:fillRef idx="1">
+              <a:schemeClr val="accent1"/>
+            </a:fillRef>
+            <a:effectRef idx="0">
+              <a:schemeClr val="accent1"/>
+            </a:effectRef>
+            <a:fontRef idx="minor">
+              <a:schemeClr val="lt1"/>
+            </a:fontRef>
+          </p:style>
+          <p:txBody>
+            <a:bodyPr tIns="0" rtlCol="0" anchor="t" anchorCtr="0"/>
+            <a:lstStyle/>
+            <a:p>
+              <a:pPr marL="0" marR="0" lvl="0" indent="0" algn="l" defTabSz="914400" rtl="0" eaLnBrk="1" fontAlgn="auto" latinLnBrk="0" hangingPunct="1">
+                <a:lnSpc>
+                  <a:spcPct val="100000"/>
+                </a:lnSpc>
+                <a:spcBef>
+                  <a:spcPts val="0"/>
+                </a:spcBef>
+                <a:spcAft>
+                  <a:spcPts val="0"/>
+                </a:spcAft>
+                <a:buClrTx/>
+                <a:buSzTx/>
+                <a:buFontTx/>
+                <a:buNone/>
+                <a:tabLst/>
+                <a:defRPr/>
+              </a:pPr>
+              <a:endParaRPr kumimoji="0" lang="en-US" sz="1000" b="0" i="0" u="none" strike="noStrike" kern="1200" cap="none" spc="0" normalizeH="0" baseline="0" noProof="0">
+                <a:ln>
+                  <a:noFill/>
+                </a:ln>
+                <a:solidFill>
+                  <a:prstClr val="black"/>
+                </a:solidFill>
+                <a:effectLst/>
+                <a:uLnTx/>
+                <a:uFillTx/>
+                <a:ea typeface="+mn-ea"/>
+                <a:cs typeface="+mn-cs"/>
+              </a:endParaRPr>
+            </a:p>
+          </p:txBody>
+        </p:sp>
+        <p:sp>
+          <p:nvSpPr>
+            <p:cNvPr id="37" name="TextBox 36">
+              <a:extLst>
+                <a:ext uri="{FF2B5EF4-FFF2-40B4-BE49-F238E27FC236}">
+                  <a16:creationId xmlns:a16="http://schemas.microsoft.com/office/drawing/2014/main" id="{75E9CD42-DACD-5EDE-FB72-AF6D27C6718E}"/>
+                </a:ext>
+              </a:extLst>
+            </p:cNvPr>
+            <p:cNvSpPr txBox="1"/>
+            <p:nvPr/>
+          </p:nvSpPr>
+          <p:spPr>
+            <a:xfrm>
+              <a:off x="6271762" y="4292389"/>
+              <a:ext cx="412292" cy="230832"/>
+            </a:xfrm>
+            <a:prstGeom prst="rect">
+              <a:avLst/>
+            </a:prstGeom>
+            <a:noFill/>
+          </p:spPr>
+          <p:txBody>
+            <a:bodyPr wrap="square" rtlCol="0">
+              <a:spAutoFit/>
+            </a:bodyPr>
+            <a:lstStyle/>
+            <a:p>
+              <a:pPr marL="0" marR="0" lvl="0" indent="0" algn="l" defTabSz="914400" rtl="0" eaLnBrk="1" fontAlgn="auto" latinLnBrk="0" hangingPunct="1">
+                <a:lnSpc>
+                  <a:spcPct val="100000"/>
+                </a:lnSpc>
+                <a:spcBef>
+                  <a:spcPts val="0"/>
+                </a:spcBef>
+                <a:spcAft>
+                  <a:spcPts val="0"/>
+                </a:spcAft>
+                <a:buClrTx/>
+                <a:buSzTx/>
+                <a:buFontTx/>
+                <a:buNone/>
+                <a:tabLst/>
+                <a:defRPr/>
+              </a:pPr>
+              <a:r>
+                <a:rPr kumimoji="0" lang="en-US" sz="900" b="0" i="0" u="none" strike="noStrike" kern="1200" cap="none" spc="0" normalizeH="0" baseline="0" noProof="0" dirty="0">
+                  <a:ln>
+                    <a:noFill/>
+                  </a:ln>
+                  <a:solidFill>
+                    <a:prstClr val="black"/>
+                  </a:solidFill>
+                  <a:effectLst/>
+                  <a:uLnTx/>
+                  <a:uFillTx/>
+                  <a:ea typeface="+mn-ea"/>
+                  <a:cs typeface="+mn-cs"/>
+                </a:rPr>
+                <a:t>host</a:t>
+              </a:r>
+            </a:p>
+          </p:txBody>
+        </p:sp>
+        <p:grpSp>
+          <p:nvGrpSpPr>
+            <p:cNvPr id="8" name="Group 7">
+              <a:extLst>
+                <a:ext uri="{FF2B5EF4-FFF2-40B4-BE49-F238E27FC236}">
+                  <a16:creationId xmlns:a16="http://schemas.microsoft.com/office/drawing/2014/main" id="{506200CC-AB5E-D005-7195-4302FA6C4D4F}"/>
+                </a:ext>
+              </a:extLst>
+            </p:cNvPr>
+            <p:cNvGrpSpPr/>
+            <p:nvPr/>
+          </p:nvGrpSpPr>
+          <p:grpSpPr>
+            <a:xfrm>
+              <a:off x="6244643" y="3344244"/>
+              <a:ext cx="466531" cy="351106"/>
+              <a:chOff x="6810318" y="4284899"/>
+              <a:chExt cx="466531" cy="351106"/>
+            </a:xfrm>
+          </p:grpSpPr>
+          <p:sp>
+            <p:nvSpPr>
+              <p:cNvPr id="9" name="Arrow: Chevron 8">
+                <a:extLst>
+                  <a:ext uri="{FF2B5EF4-FFF2-40B4-BE49-F238E27FC236}">
+                    <a16:creationId xmlns:a16="http://schemas.microsoft.com/office/drawing/2014/main" id="{8B500870-1B30-039B-B40D-86E40C4DE985}"/>
+                  </a:ext>
+                </a:extLst>
+              </p:cNvPr>
+              <p:cNvSpPr/>
+              <p:nvPr/>
+            </p:nvSpPr>
+            <p:spPr>
+              <a:xfrm rot="5400000">
+                <a:off x="6868031" y="4227186"/>
+                <a:ext cx="351106" cy="466531"/>
+              </a:xfrm>
+              <a:prstGeom prst="chevron">
+                <a:avLst>
+                  <a:gd name="adj" fmla="val 14000"/>
+                </a:avLst>
+              </a:prstGeom>
+              <a:solidFill>
+                <a:schemeClr val="bg1"/>
+              </a:solidFill>
+              <a:ln w="12700">
+                <a:solidFill>
+                  <a:schemeClr val="tx1"/>
+                </a:solidFill>
+              </a:ln>
+            </p:spPr>
+            <p:style>
+              <a:lnRef idx="2">
+                <a:schemeClr val="accent1">
+                  <a:shade val="50000"/>
+                </a:schemeClr>
+              </a:lnRef>
+              <a:fillRef idx="1">
+                <a:schemeClr val="accent1"/>
+              </a:fillRef>
+              <a:effectRef idx="0">
+                <a:schemeClr val="accent1"/>
+              </a:effectRef>
+              <a:fontRef idx="minor">
+                <a:schemeClr val="lt1"/>
+              </a:fontRef>
+            </p:style>
+            <p:txBody>
+              <a:bodyPr tIns="0" rtlCol="0" anchor="t" anchorCtr="0"/>
+              <a:lstStyle/>
+              <a:p>
+                <a:pPr marL="0" marR="0" lvl="0" indent="0" algn="l" defTabSz="914400" rtl="0" eaLnBrk="1" fontAlgn="auto" latinLnBrk="0" hangingPunct="1">
+                  <a:lnSpc>
+                    <a:spcPct val="100000"/>
+                  </a:lnSpc>
+                  <a:spcBef>
+                    <a:spcPts val="0"/>
+                  </a:spcBef>
+                  <a:spcAft>
+                    <a:spcPts val="0"/>
+                  </a:spcAft>
+                  <a:buClrTx/>
+                  <a:buSzTx/>
+                  <a:buFontTx/>
+                  <a:buNone/>
+                  <a:tabLst/>
+                  <a:defRPr/>
+                </a:pPr>
+                <a:endParaRPr kumimoji="0" lang="en-US" sz="1000" b="0" i="0" u="none" strike="noStrike" kern="1200" cap="none" spc="0" normalizeH="0" baseline="0" noProof="0">
+                  <a:ln>
+                    <a:noFill/>
+                  </a:ln>
+                  <a:solidFill>
+                    <a:prstClr val="black"/>
+                  </a:solidFill>
+                  <a:effectLst/>
+                  <a:uLnTx/>
+                  <a:uFillTx/>
+                  <a:ea typeface="+mn-ea"/>
+                  <a:cs typeface="+mn-cs"/>
+                </a:endParaRPr>
+              </a:p>
+            </p:txBody>
+          </p:sp>
+          <p:sp>
+            <p:nvSpPr>
+              <p:cNvPr id="10" name="TextBox 9">
+                <a:extLst>
+                  <a:ext uri="{FF2B5EF4-FFF2-40B4-BE49-F238E27FC236}">
+                    <a16:creationId xmlns:a16="http://schemas.microsoft.com/office/drawing/2014/main" id="{0BEB75F8-96B8-F6CA-6C8B-90686C014822}"/>
+                  </a:ext>
+                </a:extLst>
+              </p:cNvPr>
+              <p:cNvSpPr txBox="1"/>
+              <p:nvPr/>
+            </p:nvSpPr>
+            <p:spPr>
+              <a:xfrm>
+                <a:off x="6837438" y="4337341"/>
+                <a:ext cx="412292" cy="230832"/>
+              </a:xfrm>
+              <a:prstGeom prst="rect">
+                <a:avLst/>
+              </a:prstGeom>
+              <a:noFill/>
+            </p:spPr>
+            <p:txBody>
+              <a:bodyPr wrap="square" lIns="0" rIns="0" rtlCol="0">
+                <a:spAutoFit/>
+              </a:bodyPr>
+              <a:lstStyle/>
+              <a:p>
+                <a:pPr marL="0" marR="0" lvl="0" indent="0" algn="ctr" defTabSz="914400" rtl="0" eaLnBrk="1" fontAlgn="auto" latinLnBrk="0" hangingPunct="1">
+                  <a:lnSpc>
+                    <a:spcPct val="100000"/>
+                  </a:lnSpc>
+                  <a:spcBef>
+                    <a:spcPts val="0"/>
+                  </a:spcBef>
+                  <a:spcAft>
+                    <a:spcPts val="0"/>
+                  </a:spcAft>
+                  <a:buClrTx/>
+                  <a:buSzTx/>
+                  <a:buFontTx/>
+                  <a:buNone/>
+                  <a:tabLst/>
+                  <a:defRPr/>
+                </a:pPr>
+                <a:r>
+                  <a:rPr kumimoji="0" lang="en-US" sz="900" b="0" i="0" u="none" strike="noStrike" kern="1200" cap="none" spc="0" normalizeH="0" baseline="0" noProof="0" dirty="0">
+                    <a:ln>
+                      <a:noFill/>
+                    </a:ln>
+                    <a:solidFill>
+                      <a:prstClr val="black"/>
+                    </a:solidFill>
+                    <a:effectLst/>
+                    <a:uLnTx/>
+                    <a:uFillTx/>
+                    <a:ea typeface="+mn-ea"/>
+                    <a:cs typeface="+mn-cs"/>
+                  </a:rPr>
+                  <a:t>exec</a:t>
+                </a:r>
+              </a:p>
+            </p:txBody>
+          </p:sp>
+        </p:grpSp>
+      </p:grpSp>
+      <p:grpSp>
+        <p:nvGrpSpPr>
+          <p:cNvPr id="30" name="Group 29">
+            <a:extLst>
+              <a:ext uri="{FF2B5EF4-FFF2-40B4-BE49-F238E27FC236}">
+                <a16:creationId xmlns:a16="http://schemas.microsoft.com/office/drawing/2014/main" id="{045BFD68-B860-8B7E-CA46-21770E24C2A2}"/>
+              </a:ext>
+            </a:extLst>
+          </p:cNvPr>
+          <p:cNvGrpSpPr/>
+          <p:nvPr/>
+        </p:nvGrpSpPr>
+        <p:grpSpPr>
+          <a:xfrm>
+            <a:off x="5109672" y="848590"/>
+            <a:ext cx="771421" cy="2346568"/>
+            <a:chOff x="4860292" y="848590"/>
+            <a:chExt cx="771421" cy="2346568"/>
+          </a:xfrm>
+        </p:grpSpPr>
+        <p:grpSp>
+          <p:nvGrpSpPr>
+            <p:cNvPr id="144" name="Group 143">
+              <a:extLst>
+                <a:ext uri="{FF2B5EF4-FFF2-40B4-BE49-F238E27FC236}">
+                  <a16:creationId xmlns:a16="http://schemas.microsoft.com/office/drawing/2014/main" id="{F136A3C0-E9C9-C3DD-1CBA-AC4A2BE7E202}"/>
+                </a:ext>
+              </a:extLst>
+            </p:cNvPr>
+            <p:cNvGrpSpPr/>
+            <p:nvPr/>
+          </p:nvGrpSpPr>
+          <p:grpSpPr>
+            <a:xfrm>
+              <a:off x="4860292" y="2225721"/>
+              <a:ext cx="771421" cy="815478"/>
+              <a:chOff x="5361297" y="2699218"/>
+              <a:chExt cx="771421" cy="815478"/>
+            </a:xfrm>
+          </p:grpSpPr>
+          <p:sp>
+            <p:nvSpPr>
+              <p:cNvPr id="62" name="Rectangle 61">
+                <a:extLst>
+                  <a:ext uri="{FF2B5EF4-FFF2-40B4-BE49-F238E27FC236}">
+                    <a16:creationId xmlns:a16="http://schemas.microsoft.com/office/drawing/2014/main" id="{86204A80-509E-EF06-FA78-41005CAEC4E1}"/>
+                  </a:ext>
+                </a:extLst>
+              </p:cNvPr>
+              <p:cNvSpPr/>
+              <p:nvPr/>
+            </p:nvSpPr>
+            <p:spPr>
+              <a:xfrm>
+                <a:off x="5361297" y="3021320"/>
+                <a:ext cx="771421" cy="279919"/>
+              </a:xfrm>
+              <a:prstGeom prst="rect">
+                <a:avLst/>
+              </a:prstGeom>
+              <a:solidFill>
+                <a:schemeClr val="bg1">
+                  <a:lumMod val="95000"/>
+                </a:schemeClr>
+              </a:solidFill>
+              <a:ln w="19050">
+                <a:solidFill>
+                  <a:schemeClr val="bg2"/>
+                </a:solidFill>
+              </a:ln>
+            </p:spPr>
+            <p:style>
+              <a:lnRef idx="2">
+                <a:schemeClr val="accent1">
+                  <a:shade val="50000"/>
+                </a:schemeClr>
+              </a:lnRef>
+              <a:fillRef idx="1">
+                <a:schemeClr val="accent1"/>
+              </a:fillRef>
+              <a:effectRef idx="0">
+                <a:schemeClr val="accent1"/>
+              </a:effectRef>
+              <a:fontRef idx="minor">
+                <a:schemeClr val="lt1"/>
+              </a:fontRef>
+            </p:style>
+            <p:txBody>
+              <a:bodyPr lIns="0" rIns="0" rtlCol="0" anchor="ctr"/>
+              <a:lstStyle/>
+              <a:p>
+                <a:pPr marL="0" marR="0" lvl="0" indent="0" algn="ctr" defTabSz="914400" rtl="0" eaLnBrk="1" fontAlgn="auto" latinLnBrk="0" hangingPunct="1">
+                  <a:lnSpc>
+                    <a:spcPct val="100000"/>
+                  </a:lnSpc>
+                  <a:spcBef>
+                    <a:spcPts val="0"/>
+                  </a:spcBef>
+                  <a:spcAft>
+                    <a:spcPts val="0"/>
+                  </a:spcAft>
+                  <a:buClrTx/>
+                  <a:buSzTx/>
+                  <a:buFontTx/>
+                  <a:buNone/>
+                  <a:tabLst/>
+                  <a:defRPr/>
+                </a:pPr>
+                <a:r>
+                  <a:rPr kumimoji="0" lang="en-US" sz="900" b="0" i="0" u="none" strike="noStrike" kern="1200" cap="none" spc="0" normalizeH="0" baseline="0" noProof="0" dirty="0" err="1">
+                    <a:ln>
+                      <a:noFill/>
+                    </a:ln>
+                    <a:solidFill>
+                      <a:prstClr val="black"/>
+                    </a:solidFill>
+                    <a:effectLst/>
+                    <a:uLnTx/>
+                    <a:uFillTx/>
+                    <a:ea typeface="+mn-ea"/>
+                    <a:cs typeface="+mn-cs"/>
+                  </a:rPr>
+                  <a:t>Kubevirt</a:t>
+                </a:r>
+                <a:endParaRPr kumimoji="0" lang="en-US" sz="900" b="0" i="0" u="none" strike="noStrike" kern="1200" cap="none" spc="0" normalizeH="0" baseline="0" noProof="0" dirty="0">
+                  <a:ln>
+                    <a:noFill/>
+                  </a:ln>
+                  <a:solidFill>
+                    <a:prstClr val="black"/>
+                  </a:solidFill>
+                  <a:effectLst/>
+                  <a:uLnTx/>
+                  <a:uFillTx/>
+                  <a:ea typeface="+mn-ea"/>
+                  <a:cs typeface="+mn-cs"/>
+                </a:endParaRPr>
+              </a:p>
+            </p:txBody>
+          </p:sp>
+          <p:sp>
+            <p:nvSpPr>
+              <p:cNvPr id="63" name="Rectangle: Rounded Corners 62">
+                <a:extLst>
+                  <a:ext uri="{FF2B5EF4-FFF2-40B4-BE49-F238E27FC236}">
+                    <a16:creationId xmlns:a16="http://schemas.microsoft.com/office/drawing/2014/main" id="{5621BE95-1B14-0E43-E3FF-7078718035A3}"/>
+                  </a:ext>
+                </a:extLst>
+              </p:cNvPr>
+              <p:cNvSpPr/>
+              <p:nvPr/>
+            </p:nvSpPr>
+            <p:spPr>
+              <a:xfrm>
+                <a:off x="5361297" y="2699218"/>
+                <a:ext cx="771420" cy="815478"/>
+              </a:xfrm>
+              <a:prstGeom prst="roundRect">
+                <a:avLst/>
+              </a:prstGeom>
+              <a:noFill/>
+              <a:ln w="19050">
+                <a:solidFill>
+                  <a:schemeClr val="tx1"/>
+                </a:solidFill>
+              </a:ln>
+            </p:spPr>
+            <p:style>
+              <a:lnRef idx="2">
+                <a:schemeClr val="accent1">
+                  <a:shade val="50000"/>
+                </a:schemeClr>
+              </a:lnRef>
+              <a:fillRef idx="1">
+                <a:schemeClr val="accent1"/>
+              </a:fillRef>
+              <a:effectRef idx="0">
+                <a:schemeClr val="accent1"/>
+              </a:effectRef>
+              <a:fontRef idx="minor">
+                <a:schemeClr val="lt1"/>
+              </a:fontRef>
+            </p:style>
+            <p:txBody>
+              <a:bodyPr lIns="45720" tIns="118872" rtlCol="0" anchor="t" anchorCtr="0"/>
+              <a:lstStyle/>
+              <a:p>
+                <a:pPr marL="0" marR="0" lvl="0" indent="0" algn="l" defTabSz="914400" rtl="0" eaLnBrk="1" fontAlgn="auto" latinLnBrk="0" hangingPunct="1">
+                  <a:lnSpc>
+                    <a:spcPct val="100000"/>
+                  </a:lnSpc>
+                  <a:spcBef>
+                    <a:spcPts val="0"/>
+                  </a:spcBef>
+                  <a:spcAft>
+                    <a:spcPts val="0"/>
+                  </a:spcAft>
+                  <a:buClrTx/>
+                  <a:buSzTx/>
+                  <a:buFontTx/>
+                  <a:buNone/>
+                  <a:tabLst/>
+                  <a:defRPr/>
+                </a:pPr>
+                <a:r>
+                  <a:rPr lang="en-US" sz="800" dirty="0" err="1">
+                    <a:solidFill>
+                      <a:prstClr val="black"/>
+                    </a:solidFill>
+                  </a:rPr>
+                  <a:t>kubevirt</a:t>
+                </a:r>
+                <a:endParaRPr kumimoji="0" lang="en-US" sz="800" b="0" i="0" u="none" strike="noStrike" kern="1200" cap="none" spc="0" normalizeH="0" baseline="0" noProof="0" dirty="0">
+                  <a:ln>
+                    <a:noFill/>
+                  </a:ln>
+                  <a:solidFill>
+                    <a:prstClr val="black"/>
+                  </a:solidFill>
+                  <a:effectLst/>
+                  <a:uLnTx/>
+                  <a:uFillTx/>
+                  <a:ea typeface="+mn-ea"/>
+                  <a:cs typeface="+mn-cs"/>
+                </a:endParaRPr>
+              </a:p>
+            </p:txBody>
+          </p:sp>
+        </p:grpSp>
+        <p:grpSp>
+          <p:nvGrpSpPr>
+            <p:cNvPr id="130" name="Group 129">
+              <a:extLst>
+                <a:ext uri="{FF2B5EF4-FFF2-40B4-BE49-F238E27FC236}">
+                  <a16:creationId xmlns:a16="http://schemas.microsoft.com/office/drawing/2014/main" id="{7C710ACB-E418-078F-ACC7-9102B94079DC}"/>
+                </a:ext>
+              </a:extLst>
+            </p:cNvPr>
+            <p:cNvGrpSpPr/>
+            <p:nvPr/>
+          </p:nvGrpSpPr>
+          <p:grpSpPr>
+            <a:xfrm>
+              <a:off x="5012737" y="2022651"/>
+              <a:ext cx="466531" cy="351106"/>
+              <a:chOff x="6810318" y="4284899"/>
+              <a:chExt cx="466531" cy="351106"/>
+            </a:xfrm>
+          </p:grpSpPr>
+          <p:sp>
+            <p:nvSpPr>
+              <p:cNvPr id="131" name="Arrow: Chevron 130">
+                <a:extLst>
+                  <a:ext uri="{FF2B5EF4-FFF2-40B4-BE49-F238E27FC236}">
+                    <a16:creationId xmlns:a16="http://schemas.microsoft.com/office/drawing/2014/main" id="{7FDE113D-EB39-8E5A-4E1E-DAB44EFE7840}"/>
+                  </a:ext>
+                </a:extLst>
+              </p:cNvPr>
+              <p:cNvSpPr/>
+              <p:nvPr/>
+            </p:nvSpPr>
+            <p:spPr>
+              <a:xfrm rot="5400000">
+                <a:off x="6868031" y="4227186"/>
+                <a:ext cx="351106" cy="466531"/>
+              </a:xfrm>
+              <a:prstGeom prst="chevron">
+                <a:avLst>
+                  <a:gd name="adj" fmla="val 14000"/>
+                </a:avLst>
+              </a:prstGeom>
+              <a:solidFill>
+                <a:schemeClr val="bg1"/>
+              </a:solidFill>
+              <a:ln w="12700">
+                <a:solidFill>
+                  <a:schemeClr val="tx1"/>
+                </a:solidFill>
+              </a:ln>
+            </p:spPr>
+            <p:style>
+              <a:lnRef idx="2">
+                <a:schemeClr val="accent1">
+                  <a:shade val="50000"/>
+                </a:schemeClr>
+              </a:lnRef>
+              <a:fillRef idx="1">
+                <a:schemeClr val="accent1"/>
+              </a:fillRef>
+              <a:effectRef idx="0">
+                <a:schemeClr val="accent1"/>
+              </a:effectRef>
+              <a:fontRef idx="minor">
+                <a:schemeClr val="lt1"/>
+              </a:fontRef>
+            </p:style>
+            <p:txBody>
+              <a:bodyPr tIns="0" rtlCol="0" anchor="t" anchorCtr="0"/>
+              <a:lstStyle/>
+              <a:p>
+                <a:pPr marL="0" marR="0" lvl="0" indent="0" algn="l" defTabSz="914400" rtl="0" eaLnBrk="1" fontAlgn="auto" latinLnBrk="0" hangingPunct="1">
+                  <a:lnSpc>
+                    <a:spcPct val="100000"/>
+                  </a:lnSpc>
+                  <a:spcBef>
+                    <a:spcPts val="0"/>
+                  </a:spcBef>
+                  <a:spcAft>
+                    <a:spcPts val="0"/>
+                  </a:spcAft>
+                  <a:buClrTx/>
+                  <a:buSzTx/>
+                  <a:buFontTx/>
+                  <a:buNone/>
+                  <a:tabLst/>
+                  <a:defRPr/>
+                </a:pPr>
+                <a:endParaRPr kumimoji="0" lang="en-US" sz="1000" b="0" i="0" u="none" strike="noStrike" kern="1200" cap="none" spc="0" normalizeH="0" baseline="0" noProof="0">
+                  <a:ln>
+                    <a:noFill/>
+                  </a:ln>
+                  <a:solidFill>
+                    <a:prstClr val="black"/>
+                  </a:solidFill>
+                  <a:effectLst/>
+                  <a:uLnTx/>
+                  <a:uFillTx/>
+                  <a:ea typeface="+mn-ea"/>
+                  <a:cs typeface="+mn-cs"/>
+                </a:endParaRPr>
+              </a:p>
+            </p:txBody>
+          </p:sp>
+          <p:sp>
+            <p:nvSpPr>
+              <p:cNvPr id="132" name="TextBox 131">
+                <a:extLst>
+                  <a:ext uri="{FF2B5EF4-FFF2-40B4-BE49-F238E27FC236}">
+                    <a16:creationId xmlns:a16="http://schemas.microsoft.com/office/drawing/2014/main" id="{4D9EC07C-A8F0-2507-EF19-2538A77FF30C}"/>
+                  </a:ext>
+                </a:extLst>
+              </p:cNvPr>
+              <p:cNvSpPr txBox="1"/>
+              <p:nvPr/>
+            </p:nvSpPr>
+            <p:spPr>
+              <a:xfrm>
+                <a:off x="6837438" y="4337341"/>
+                <a:ext cx="412292" cy="230832"/>
+              </a:xfrm>
+              <a:prstGeom prst="rect">
+                <a:avLst/>
+              </a:prstGeom>
+              <a:noFill/>
+            </p:spPr>
+            <p:txBody>
+              <a:bodyPr wrap="square" rtlCol="0">
+                <a:spAutoFit/>
+              </a:bodyPr>
+              <a:lstStyle/>
+              <a:p>
+                <a:pPr marL="0" marR="0" lvl="0" indent="0" algn="l" defTabSz="914400" rtl="0" eaLnBrk="1" fontAlgn="auto" latinLnBrk="0" hangingPunct="1">
+                  <a:lnSpc>
+                    <a:spcPct val="100000"/>
+                  </a:lnSpc>
+                  <a:spcBef>
+                    <a:spcPts val="0"/>
+                  </a:spcBef>
+                  <a:spcAft>
+                    <a:spcPts val="0"/>
+                  </a:spcAft>
+                  <a:buClrTx/>
+                  <a:buSzTx/>
+                  <a:buFontTx/>
+                  <a:buNone/>
+                  <a:tabLst/>
+                  <a:defRPr/>
+                </a:pPr>
+                <a:r>
+                  <a:rPr kumimoji="0" lang="en-US" sz="900" b="0" i="0" u="none" strike="noStrike" kern="1200" cap="none" spc="0" normalizeH="0" baseline="0" noProof="0" dirty="0">
+                    <a:ln>
+                      <a:noFill/>
+                    </a:ln>
+                    <a:solidFill>
+                      <a:prstClr val="black"/>
+                    </a:solidFill>
+                    <a:effectLst/>
+                    <a:uLnTx/>
+                    <a:uFillTx/>
+                    <a:ea typeface="+mn-ea"/>
+                    <a:cs typeface="+mn-cs"/>
+                  </a:rPr>
+                  <a:t>host</a:t>
+                </a:r>
+              </a:p>
+            </p:txBody>
+          </p:sp>
+        </p:grpSp>
+        <p:grpSp>
+          <p:nvGrpSpPr>
+            <p:cNvPr id="139" name="Group 138">
+              <a:extLst>
+                <a:ext uri="{FF2B5EF4-FFF2-40B4-BE49-F238E27FC236}">
+                  <a16:creationId xmlns:a16="http://schemas.microsoft.com/office/drawing/2014/main" id="{D19AD911-C3B0-5BAA-3E01-9EDDB42030B5}"/>
+                </a:ext>
+              </a:extLst>
+            </p:cNvPr>
+            <p:cNvGrpSpPr/>
+            <p:nvPr/>
+          </p:nvGrpSpPr>
+          <p:grpSpPr>
+            <a:xfrm>
+              <a:off x="4860292" y="848590"/>
+              <a:ext cx="771421" cy="974099"/>
+              <a:chOff x="3816085" y="2671396"/>
+              <a:chExt cx="771421" cy="974099"/>
+            </a:xfrm>
+          </p:grpSpPr>
+          <p:sp>
+            <p:nvSpPr>
+              <p:cNvPr id="140" name="Rectangle 139">
+                <a:extLst>
+                  <a:ext uri="{FF2B5EF4-FFF2-40B4-BE49-F238E27FC236}">
+                    <a16:creationId xmlns:a16="http://schemas.microsoft.com/office/drawing/2014/main" id="{604642F9-5430-0677-C911-B02ACF0C3C08}"/>
+                  </a:ext>
+                </a:extLst>
+              </p:cNvPr>
+              <p:cNvSpPr/>
+              <p:nvPr/>
+            </p:nvSpPr>
+            <p:spPr>
+              <a:xfrm>
+                <a:off x="3816085" y="2911202"/>
+                <a:ext cx="771421" cy="279919"/>
+              </a:xfrm>
+              <a:prstGeom prst="rect">
+                <a:avLst/>
+              </a:prstGeom>
+              <a:solidFill>
+                <a:schemeClr val="bg1">
+                  <a:lumMod val="95000"/>
+                </a:schemeClr>
+              </a:solidFill>
+              <a:ln w="19050">
+                <a:solidFill>
+                  <a:schemeClr val="bg2"/>
+                </a:solidFill>
+              </a:ln>
+            </p:spPr>
+            <p:style>
+              <a:lnRef idx="2">
+                <a:schemeClr val="accent1">
+                  <a:shade val="50000"/>
+                </a:schemeClr>
+              </a:lnRef>
+              <a:fillRef idx="1">
+                <a:schemeClr val="accent1"/>
+              </a:fillRef>
+              <a:effectRef idx="0">
+                <a:schemeClr val="accent1"/>
+              </a:effectRef>
+              <a:fontRef idx="minor">
+                <a:schemeClr val="lt1"/>
+              </a:fontRef>
+            </p:style>
+            <p:txBody>
+              <a:bodyPr lIns="0" rIns="0" rtlCol="0" anchor="ctr"/>
+              <a:lstStyle/>
+              <a:p>
+                <a:pPr marL="0" marR="0" lvl="0" indent="0" algn="ctr" defTabSz="914400" rtl="0" eaLnBrk="1" fontAlgn="auto" latinLnBrk="0" hangingPunct="1">
+                  <a:lnSpc>
+                    <a:spcPct val="100000"/>
+                  </a:lnSpc>
+                  <a:spcBef>
+                    <a:spcPts val="0"/>
+                  </a:spcBef>
+                  <a:spcAft>
+                    <a:spcPts val="0"/>
+                  </a:spcAft>
+                  <a:buClrTx/>
+                  <a:buSzTx/>
+                  <a:buFontTx/>
+                  <a:buNone/>
+                  <a:tabLst/>
+                  <a:defRPr/>
+                </a:pPr>
+                <a:r>
+                  <a:rPr kumimoji="0" lang="en-US" sz="900" b="0" i="0" u="none" strike="noStrike" kern="1200" cap="none" spc="0" normalizeH="0" baseline="0" noProof="0" dirty="0">
+                    <a:ln>
+                      <a:noFill/>
+                    </a:ln>
+                    <a:solidFill>
+                      <a:prstClr val="black"/>
+                    </a:solidFill>
+                    <a:effectLst/>
+                    <a:uLnTx/>
+                    <a:uFillTx/>
+                    <a:ea typeface="+mn-ea"/>
+                    <a:cs typeface="+mn-cs"/>
+                  </a:rPr>
+                  <a:t>Compute</a:t>
+                </a:r>
+              </a:p>
+              <a:p>
+                <a:pPr marL="0" marR="0" lvl="0" indent="0" algn="ctr" defTabSz="914400" rtl="0" eaLnBrk="1" fontAlgn="auto" latinLnBrk="0" hangingPunct="1">
+                  <a:lnSpc>
+                    <a:spcPct val="100000"/>
+                  </a:lnSpc>
+                  <a:spcBef>
+                    <a:spcPts val="0"/>
+                  </a:spcBef>
+                  <a:spcAft>
+                    <a:spcPts val="0"/>
+                  </a:spcAft>
+                  <a:buClrTx/>
+                  <a:buSzTx/>
+                  <a:buFontTx/>
+                  <a:buNone/>
+                  <a:tabLst/>
+                  <a:defRPr/>
+                </a:pPr>
+                <a:r>
+                  <a:rPr lang="en-US" sz="900" dirty="0">
+                    <a:solidFill>
+                      <a:prstClr val="black"/>
+                    </a:solidFill>
+                  </a:rPr>
+                  <a:t>Platform</a:t>
+                </a:r>
+                <a:endParaRPr kumimoji="0" lang="en-US" sz="900" b="0" i="0" u="none" strike="noStrike" kern="1200" cap="none" spc="0" normalizeH="0" baseline="0" noProof="0" dirty="0">
+                  <a:ln>
+                    <a:noFill/>
+                  </a:ln>
+                  <a:solidFill>
+                    <a:prstClr val="black"/>
+                  </a:solidFill>
+                  <a:effectLst/>
+                  <a:uLnTx/>
+                  <a:uFillTx/>
+                  <a:ea typeface="+mn-ea"/>
+                  <a:cs typeface="+mn-cs"/>
+                </a:endParaRPr>
+              </a:p>
+            </p:txBody>
+          </p:sp>
+          <p:sp>
+            <p:nvSpPr>
+              <p:cNvPr id="141" name="Rectangle: Rounded Corners 140">
+                <a:extLst>
+                  <a:ext uri="{FF2B5EF4-FFF2-40B4-BE49-F238E27FC236}">
+                    <a16:creationId xmlns:a16="http://schemas.microsoft.com/office/drawing/2014/main" id="{6EA74882-2540-F271-43E1-3F970B1DCD02}"/>
+                  </a:ext>
+                </a:extLst>
+              </p:cNvPr>
+              <p:cNvSpPr/>
+              <p:nvPr/>
+            </p:nvSpPr>
+            <p:spPr>
+              <a:xfrm>
+                <a:off x="3816085" y="2671396"/>
+                <a:ext cx="771420" cy="815478"/>
+              </a:xfrm>
+              <a:prstGeom prst="roundRect">
+                <a:avLst/>
+              </a:prstGeom>
+              <a:noFill/>
+              <a:ln w="19050">
+                <a:solidFill>
+                  <a:schemeClr val="tx1"/>
+                </a:solidFill>
+              </a:ln>
+            </p:spPr>
+            <p:style>
+              <a:lnRef idx="2">
+                <a:schemeClr val="accent1">
+                  <a:shade val="50000"/>
+                </a:schemeClr>
+              </a:lnRef>
+              <a:fillRef idx="1">
+                <a:schemeClr val="accent1"/>
+              </a:fillRef>
+              <a:effectRef idx="0">
+                <a:schemeClr val="accent1"/>
+              </a:effectRef>
+              <a:fontRef idx="minor">
+                <a:schemeClr val="lt1"/>
+              </a:fontRef>
+            </p:style>
+            <p:txBody>
+              <a:bodyPr tIns="0" rtlCol="0" anchor="t" anchorCtr="0"/>
+              <a:lstStyle/>
+              <a:p>
+                <a:pPr marL="0" marR="0" lvl="0" indent="0" algn="l" defTabSz="914400" rtl="0" eaLnBrk="1" fontAlgn="auto" latinLnBrk="0" hangingPunct="1">
+                  <a:lnSpc>
+                    <a:spcPct val="100000"/>
+                  </a:lnSpc>
+                  <a:spcBef>
+                    <a:spcPts val="0"/>
+                  </a:spcBef>
+                  <a:spcAft>
+                    <a:spcPts val="0"/>
+                  </a:spcAft>
+                  <a:buClrTx/>
+                  <a:buSzTx/>
+                  <a:buFontTx/>
+                  <a:buNone/>
+                  <a:tabLst/>
+                  <a:defRPr/>
+                </a:pPr>
+                <a:r>
+                  <a:rPr kumimoji="0" lang="en-US" sz="800" b="0" i="0" u="none" strike="noStrike" kern="1200" cap="none" spc="0" normalizeH="0" baseline="0" noProof="0" dirty="0" err="1">
+                    <a:ln>
+                      <a:noFill/>
+                    </a:ln>
+                    <a:solidFill>
+                      <a:prstClr val="black"/>
+                    </a:solidFill>
+                    <a:effectLst/>
+                    <a:uLnTx/>
+                    <a:uFillTx/>
+                    <a:ea typeface="+mn-ea"/>
+                    <a:cs typeface="+mn-cs"/>
+                  </a:rPr>
+                  <a:t>vm</a:t>
+                </a:r>
+                <a:endParaRPr kumimoji="0" lang="en-US" sz="800" b="0" i="0" u="none" strike="noStrike" kern="1200" cap="none" spc="0" normalizeH="0" baseline="0" noProof="0" dirty="0">
+                  <a:ln>
+                    <a:noFill/>
+                  </a:ln>
+                  <a:solidFill>
+                    <a:prstClr val="black"/>
+                  </a:solidFill>
+                  <a:effectLst/>
+                  <a:uLnTx/>
+                  <a:uFillTx/>
+                  <a:ea typeface="+mn-ea"/>
+                  <a:cs typeface="+mn-cs"/>
+                </a:endParaRPr>
+              </a:p>
+            </p:txBody>
+          </p:sp>
+          <p:sp>
+            <p:nvSpPr>
+              <p:cNvPr id="142" name="Flowchart: Off-page Connector 141">
+                <a:extLst>
+                  <a:ext uri="{FF2B5EF4-FFF2-40B4-BE49-F238E27FC236}">
+                    <a16:creationId xmlns:a16="http://schemas.microsoft.com/office/drawing/2014/main" id="{EC43F799-86E6-68F4-7588-0D29EA9AFC45}"/>
+                  </a:ext>
+                </a:extLst>
+              </p:cNvPr>
+              <p:cNvSpPr/>
+              <p:nvPr/>
+            </p:nvSpPr>
+            <p:spPr>
+              <a:xfrm>
+                <a:off x="3968530" y="3365576"/>
+                <a:ext cx="466531" cy="279919"/>
+              </a:xfrm>
+              <a:prstGeom prst="flowChartOffpageConnector">
+                <a:avLst/>
+              </a:prstGeom>
+              <a:solidFill>
+                <a:schemeClr val="bg1"/>
+              </a:solidFill>
+              <a:ln w="19050">
+                <a:solidFill>
+                  <a:schemeClr val="tx1"/>
+                </a:solidFill>
+              </a:ln>
+            </p:spPr>
+            <p:style>
+              <a:lnRef idx="2">
+                <a:schemeClr val="accent1">
+                  <a:shade val="50000"/>
+                </a:schemeClr>
+              </a:lnRef>
+              <a:fillRef idx="1">
+                <a:schemeClr val="accent1"/>
+              </a:fillRef>
+              <a:effectRef idx="0">
+                <a:schemeClr val="accent1"/>
+              </a:effectRef>
+              <a:fontRef idx="minor">
+                <a:schemeClr val="lt1"/>
+              </a:fontRef>
+            </p:style>
+            <p:txBody>
+              <a:bodyPr tIns="0" rtlCol="0" anchor="t" anchorCtr="0"/>
+              <a:lstStyle/>
+              <a:p>
+                <a:pPr marL="0" marR="0" lvl="0" indent="0" algn="l" defTabSz="914400" rtl="0" eaLnBrk="1" fontAlgn="auto" latinLnBrk="0" hangingPunct="1">
+                  <a:lnSpc>
+                    <a:spcPct val="100000"/>
+                  </a:lnSpc>
+                  <a:spcBef>
+                    <a:spcPts val="0"/>
+                  </a:spcBef>
+                  <a:spcAft>
+                    <a:spcPts val="0"/>
+                  </a:spcAft>
+                  <a:buClrTx/>
+                  <a:buSzTx/>
+                  <a:buFontTx/>
+                  <a:buNone/>
+                  <a:tabLst/>
+                  <a:defRPr/>
+                </a:pPr>
+                <a:endParaRPr kumimoji="0" lang="en-US" sz="1000" b="0" i="0" u="none" strike="noStrike" kern="1200" cap="none" spc="0" normalizeH="0" baseline="0" noProof="0">
+                  <a:ln>
+                    <a:noFill/>
+                  </a:ln>
+                  <a:solidFill>
+                    <a:prstClr val="black"/>
+                  </a:solidFill>
+                  <a:effectLst/>
+                  <a:uLnTx/>
+                  <a:uFillTx/>
+                  <a:ea typeface="+mn-ea"/>
+                  <a:cs typeface="+mn-cs"/>
+                </a:endParaRPr>
+              </a:p>
+            </p:txBody>
+          </p:sp>
+          <p:sp>
+            <p:nvSpPr>
+              <p:cNvPr id="143" name="TextBox 142">
+                <a:extLst>
+                  <a:ext uri="{FF2B5EF4-FFF2-40B4-BE49-F238E27FC236}">
+                    <a16:creationId xmlns:a16="http://schemas.microsoft.com/office/drawing/2014/main" id="{0BE06079-08F4-64BC-128C-1603C6B4F6D1}"/>
+                  </a:ext>
+                </a:extLst>
+              </p:cNvPr>
+              <p:cNvSpPr txBox="1"/>
+              <p:nvPr/>
+            </p:nvSpPr>
+            <p:spPr>
+              <a:xfrm>
+                <a:off x="3995649" y="3382425"/>
+                <a:ext cx="412292" cy="230832"/>
+              </a:xfrm>
+              <a:prstGeom prst="rect">
+                <a:avLst/>
+              </a:prstGeom>
+              <a:noFill/>
+            </p:spPr>
+            <p:txBody>
+              <a:bodyPr wrap="square" rtlCol="0">
+                <a:spAutoFit/>
+              </a:bodyPr>
+              <a:lstStyle/>
+              <a:p>
+                <a:pPr marL="0" marR="0" lvl="0" indent="0" algn="l" defTabSz="914400" rtl="0" eaLnBrk="1" fontAlgn="auto" latinLnBrk="0" hangingPunct="1">
+                  <a:lnSpc>
+                    <a:spcPct val="100000"/>
+                  </a:lnSpc>
+                  <a:spcBef>
+                    <a:spcPts val="0"/>
+                  </a:spcBef>
+                  <a:spcAft>
+                    <a:spcPts val="0"/>
+                  </a:spcAft>
+                  <a:buClrTx/>
+                  <a:buSzTx/>
+                  <a:buFontTx/>
+                  <a:buNone/>
+                  <a:tabLst/>
+                  <a:defRPr/>
+                </a:pPr>
+                <a:r>
+                  <a:rPr kumimoji="0" lang="en-US" sz="900" b="0" i="0" u="none" strike="noStrike" kern="1200" cap="none" spc="0" normalizeH="0" baseline="0" noProof="0" dirty="0">
+                    <a:ln>
+                      <a:noFill/>
+                    </a:ln>
+                    <a:solidFill>
+                      <a:prstClr val="black"/>
+                    </a:solidFill>
+                    <a:effectLst/>
+                    <a:uLnTx/>
+                    <a:uFillTx/>
+                    <a:ea typeface="+mn-ea"/>
+                    <a:cs typeface="+mn-cs"/>
+                  </a:rPr>
+                  <a:t>host</a:t>
+                </a:r>
+              </a:p>
+            </p:txBody>
+          </p:sp>
+        </p:grpSp>
+        <p:cxnSp>
+          <p:nvCxnSpPr>
+            <p:cNvPr id="16" name="Straight Arrow Connector 15">
+              <a:extLst>
+                <a:ext uri="{FF2B5EF4-FFF2-40B4-BE49-F238E27FC236}">
+                  <a16:creationId xmlns:a16="http://schemas.microsoft.com/office/drawing/2014/main" id="{1C5AA650-2DDB-0A50-E127-5798B328556C}"/>
+                </a:ext>
+              </a:extLst>
+            </p:cNvPr>
+            <p:cNvCxnSpPr>
+              <a:cxnSpLocks/>
+            </p:cNvCxnSpPr>
+            <p:nvPr/>
+          </p:nvCxnSpPr>
+          <p:spPr>
+            <a:xfrm flipH="1" flipV="1">
+              <a:off x="5244478" y="1832803"/>
+              <a:ext cx="760" cy="261501"/>
+            </a:xfrm>
+            <a:prstGeom prst="straightConnector1">
+              <a:avLst/>
+            </a:prstGeom>
+            <a:ln w="12700">
+              <a:solidFill>
+                <a:schemeClr val="tx1"/>
+              </a:solidFill>
+              <a:headEnd type="triangle" w="med" len="med"/>
+              <a:tailEnd type="none" w="med" len="med"/>
+            </a:ln>
+          </p:spPr>
+          <p:style>
+            <a:lnRef idx="1">
+              <a:schemeClr val="accent1"/>
+            </a:lnRef>
+            <a:fillRef idx="0">
+              <a:schemeClr val="accent1"/>
+            </a:fillRef>
+            <a:effectRef idx="0">
+              <a:schemeClr val="accent1"/>
+            </a:effectRef>
+            <a:fontRef idx="minor">
+              <a:schemeClr val="tx1"/>
+            </a:fontRef>
+          </p:style>
+        </p:cxnSp>
+        <p:grpSp>
+          <p:nvGrpSpPr>
+            <p:cNvPr id="25" name="Group 24">
+              <a:extLst>
+                <a:ext uri="{FF2B5EF4-FFF2-40B4-BE49-F238E27FC236}">
+                  <a16:creationId xmlns:a16="http://schemas.microsoft.com/office/drawing/2014/main" id="{3018D367-5174-241C-A342-270B087AEE7E}"/>
+                </a:ext>
+              </a:extLst>
+            </p:cNvPr>
+            <p:cNvGrpSpPr/>
+            <p:nvPr/>
+          </p:nvGrpSpPr>
+          <p:grpSpPr>
+            <a:xfrm>
+              <a:off x="4891807" y="2915239"/>
+              <a:ext cx="323575" cy="279919"/>
+              <a:chOff x="1967043" y="2225721"/>
+              <a:chExt cx="323575" cy="279919"/>
+            </a:xfrm>
+          </p:grpSpPr>
+          <p:sp>
+            <p:nvSpPr>
+              <p:cNvPr id="23" name="Flowchart: Off-page Connector 22">
+                <a:extLst>
+                  <a:ext uri="{FF2B5EF4-FFF2-40B4-BE49-F238E27FC236}">
+                    <a16:creationId xmlns:a16="http://schemas.microsoft.com/office/drawing/2014/main" id="{6BD29F27-1C17-90F6-EEFD-08810396F524}"/>
+                  </a:ext>
+                </a:extLst>
+              </p:cNvPr>
+              <p:cNvSpPr/>
+              <p:nvPr/>
+            </p:nvSpPr>
+            <p:spPr>
+              <a:xfrm>
+                <a:off x="1967043" y="2225721"/>
+                <a:ext cx="323575" cy="279919"/>
+              </a:xfrm>
+              <a:prstGeom prst="flowChartOffpageConnector">
+                <a:avLst/>
+              </a:prstGeom>
+              <a:solidFill>
+                <a:schemeClr val="bg1"/>
+              </a:solidFill>
+              <a:ln w="19050">
+                <a:solidFill>
+                  <a:schemeClr val="tx1"/>
+                </a:solidFill>
+              </a:ln>
+            </p:spPr>
+            <p:style>
+              <a:lnRef idx="2">
+                <a:schemeClr val="accent1">
+                  <a:shade val="50000"/>
+                </a:schemeClr>
+              </a:lnRef>
+              <a:fillRef idx="1">
+                <a:schemeClr val="accent1"/>
+              </a:fillRef>
+              <a:effectRef idx="0">
+                <a:schemeClr val="accent1"/>
+              </a:effectRef>
+              <a:fontRef idx="minor">
+                <a:schemeClr val="lt1"/>
+              </a:fontRef>
+            </p:style>
+            <p:txBody>
+              <a:bodyPr tIns="0" rtlCol="0" anchor="t" anchorCtr="0"/>
+              <a:lstStyle/>
+              <a:p>
+                <a:pPr marL="0" marR="0" lvl="0" indent="0" algn="l" defTabSz="914400" rtl="0" eaLnBrk="1" fontAlgn="auto" latinLnBrk="0" hangingPunct="1">
+                  <a:lnSpc>
+                    <a:spcPct val="100000"/>
+                  </a:lnSpc>
+                  <a:spcBef>
+                    <a:spcPts val="0"/>
+                  </a:spcBef>
+                  <a:spcAft>
+                    <a:spcPts val="0"/>
+                  </a:spcAft>
+                  <a:buClrTx/>
+                  <a:buSzTx/>
+                  <a:buFontTx/>
+                  <a:buNone/>
+                  <a:tabLst/>
+                  <a:defRPr/>
+                </a:pPr>
+                <a:endParaRPr kumimoji="0" lang="en-US" sz="1000" b="0" i="0" u="none" strike="noStrike" kern="1200" cap="none" spc="0" normalizeH="0" baseline="0" noProof="0">
+                  <a:ln>
+                    <a:noFill/>
+                  </a:ln>
+                  <a:solidFill>
+                    <a:prstClr val="black"/>
+                  </a:solidFill>
+                  <a:effectLst/>
+                  <a:uLnTx/>
+                  <a:uFillTx/>
+                  <a:ea typeface="+mn-ea"/>
+                  <a:cs typeface="+mn-cs"/>
+                </a:endParaRPr>
+              </a:p>
+            </p:txBody>
+          </p:sp>
+          <p:sp>
+            <p:nvSpPr>
+              <p:cNvPr id="24" name="TextBox 23">
+                <a:extLst>
+                  <a:ext uri="{FF2B5EF4-FFF2-40B4-BE49-F238E27FC236}">
+                    <a16:creationId xmlns:a16="http://schemas.microsoft.com/office/drawing/2014/main" id="{E51844E3-19DA-3DBC-DBEA-4A6481BD11A7}"/>
+                  </a:ext>
+                </a:extLst>
+              </p:cNvPr>
+              <p:cNvSpPr txBox="1"/>
+              <p:nvPr/>
+            </p:nvSpPr>
+            <p:spPr>
+              <a:xfrm>
+                <a:off x="1987942" y="2225721"/>
+                <a:ext cx="285956" cy="230832"/>
+              </a:xfrm>
+              <a:prstGeom prst="rect">
+                <a:avLst/>
+              </a:prstGeom>
+              <a:noFill/>
+            </p:spPr>
+            <p:txBody>
+              <a:bodyPr wrap="square" lIns="0" rIns="0" rtlCol="0">
+                <a:spAutoFit/>
+              </a:bodyPr>
+              <a:lstStyle/>
+              <a:p>
+                <a:pPr marL="0" marR="0" lvl="0" indent="0" algn="ctr" defTabSz="914400" rtl="0" eaLnBrk="1" fontAlgn="auto" latinLnBrk="0" hangingPunct="1">
+                  <a:lnSpc>
+                    <a:spcPct val="100000"/>
+                  </a:lnSpc>
+                  <a:spcBef>
+                    <a:spcPts val="0"/>
+                  </a:spcBef>
+                  <a:spcAft>
+                    <a:spcPts val="0"/>
+                  </a:spcAft>
+                  <a:buClrTx/>
+                  <a:buSzTx/>
+                  <a:buFontTx/>
+                  <a:buNone/>
+                  <a:tabLst/>
+                  <a:defRPr/>
+                </a:pPr>
+                <a:r>
+                  <a:rPr kumimoji="0" lang="en-US" sz="900" b="0" i="0" u="none" strike="noStrike" kern="1200" cap="none" spc="0" normalizeH="0" baseline="0" noProof="0" dirty="0">
+                    <a:ln>
+                      <a:noFill/>
+                    </a:ln>
+                    <a:solidFill>
+                      <a:prstClr val="black"/>
+                    </a:solidFill>
+                    <a:effectLst/>
+                    <a:uLnTx/>
+                    <a:uFillTx/>
+                    <a:ea typeface="+mn-ea"/>
+                    <a:cs typeface="+mn-cs"/>
+                  </a:rPr>
+                  <a:t>host</a:t>
+                </a:r>
+              </a:p>
+            </p:txBody>
+          </p:sp>
+        </p:grpSp>
+        <p:grpSp>
+          <p:nvGrpSpPr>
+            <p:cNvPr id="26" name="Group 25">
+              <a:extLst>
+                <a:ext uri="{FF2B5EF4-FFF2-40B4-BE49-F238E27FC236}">
+                  <a16:creationId xmlns:a16="http://schemas.microsoft.com/office/drawing/2014/main" id="{B38147EB-897F-47B2-6397-1A0EAF8BE763}"/>
+                </a:ext>
+              </a:extLst>
+            </p:cNvPr>
+            <p:cNvGrpSpPr/>
+            <p:nvPr/>
+          </p:nvGrpSpPr>
+          <p:grpSpPr>
+            <a:xfrm>
+              <a:off x="5277219" y="2915239"/>
+              <a:ext cx="323575" cy="279919"/>
+              <a:chOff x="1967043" y="2225721"/>
+              <a:chExt cx="323575" cy="279919"/>
+            </a:xfrm>
+          </p:grpSpPr>
+          <p:sp>
+            <p:nvSpPr>
+              <p:cNvPr id="27" name="Flowchart: Off-page Connector 26">
+                <a:extLst>
+                  <a:ext uri="{FF2B5EF4-FFF2-40B4-BE49-F238E27FC236}">
+                    <a16:creationId xmlns:a16="http://schemas.microsoft.com/office/drawing/2014/main" id="{36F2813F-4F10-BDF1-C43C-F99D29A5F014}"/>
+                  </a:ext>
+                </a:extLst>
+              </p:cNvPr>
+              <p:cNvSpPr/>
+              <p:nvPr/>
+            </p:nvSpPr>
+            <p:spPr>
+              <a:xfrm>
+                <a:off x="1967043" y="2225721"/>
+                <a:ext cx="323575" cy="279919"/>
+              </a:xfrm>
+              <a:prstGeom prst="flowChartOffpageConnector">
+                <a:avLst/>
+              </a:prstGeom>
+              <a:solidFill>
+                <a:schemeClr val="bg1"/>
+              </a:solidFill>
+              <a:ln w="19050">
+                <a:solidFill>
+                  <a:schemeClr val="tx1"/>
+                </a:solidFill>
+              </a:ln>
+            </p:spPr>
+            <p:style>
+              <a:lnRef idx="2">
+                <a:schemeClr val="accent1">
+                  <a:shade val="50000"/>
+                </a:schemeClr>
+              </a:lnRef>
+              <a:fillRef idx="1">
+                <a:schemeClr val="accent1"/>
+              </a:fillRef>
+              <a:effectRef idx="0">
+                <a:schemeClr val="accent1"/>
+              </a:effectRef>
+              <a:fontRef idx="minor">
+                <a:schemeClr val="lt1"/>
+              </a:fontRef>
+            </p:style>
+            <p:txBody>
+              <a:bodyPr tIns="0" rtlCol="0" anchor="t" anchorCtr="0"/>
+              <a:lstStyle/>
+              <a:p>
+                <a:pPr marL="0" marR="0" lvl="0" indent="0" algn="l" defTabSz="914400" rtl="0" eaLnBrk="1" fontAlgn="auto" latinLnBrk="0" hangingPunct="1">
+                  <a:lnSpc>
+                    <a:spcPct val="100000"/>
+                  </a:lnSpc>
+                  <a:spcBef>
+                    <a:spcPts val="0"/>
+                  </a:spcBef>
+                  <a:spcAft>
+                    <a:spcPts val="0"/>
+                  </a:spcAft>
+                  <a:buClrTx/>
+                  <a:buSzTx/>
+                  <a:buFontTx/>
+                  <a:buNone/>
+                  <a:tabLst/>
+                  <a:defRPr/>
+                </a:pPr>
+                <a:endParaRPr kumimoji="0" lang="en-US" sz="1000" b="0" i="0" u="none" strike="noStrike" kern="1200" cap="none" spc="0" normalizeH="0" baseline="0" noProof="0">
+                  <a:ln>
+                    <a:noFill/>
+                  </a:ln>
+                  <a:solidFill>
+                    <a:prstClr val="black"/>
+                  </a:solidFill>
+                  <a:effectLst/>
+                  <a:uLnTx/>
+                  <a:uFillTx/>
+                  <a:ea typeface="+mn-ea"/>
+                  <a:cs typeface="+mn-cs"/>
+                </a:endParaRPr>
+              </a:p>
+            </p:txBody>
+          </p:sp>
+          <p:sp>
+            <p:nvSpPr>
+              <p:cNvPr id="28" name="TextBox 27">
+                <a:extLst>
+                  <a:ext uri="{FF2B5EF4-FFF2-40B4-BE49-F238E27FC236}">
+                    <a16:creationId xmlns:a16="http://schemas.microsoft.com/office/drawing/2014/main" id="{8E7E0F5B-82A8-EEE6-D14F-B5FE9C842271}"/>
+                  </a:ext>
+                </a:extLst>
+              </p:cNvPr>
+              <p:cNvSpPr txBox="1"/>
+              <p:nvPr/>
+            </p:nvSpPr>
+            <p:spPr>
+              <a:xfrm>
+                <a:off x="1987942" y="2225721"/>
+                <a:ext cx="285956" cy="230832"/>
+              </a:xfrm>
+              <a:prstGeom prst="rect">
+                <a:avLst/>
+              </a:prstGeom>
+              <a:noFill/>
+            </p:spPr>
+            <p:txBody>
+              <a:bodyPr wrap="square" lIns="0" rIns="0" rtlCol="0">
+                <a:spAutoFit/>
+              </a:bodyPr>
+              <a:lstStyle/>
+              <a:p>
+                <a:pPr marL="0" marR="0" lvl="0" indent="0" algn="ctr" defTabSz="914400" rtl="0" eaLnBrk="1" fontAlgn="auto" latinLnBrk="0" hangingPunct="1">
+                  <a:lnSpc>
+                    <a:spcPct val="100000"/>
+                  </a:lnSpc>
+                  <a:spcBef>
+                    <a:spcPts val="0"/>
+                  </a:spcBef>
+                  <a:spcAft>
+                    <a:spcPts val="0"/>
+                  </a:spcAft>
+                  <a:buClrTx/>
+                  <a:buSzTx/>
+                  <a:buFontTx/>
+                  <a:buNone/>
+                  <a:tabLst/>
+                  <a:defRPr/>
+                </a:pPr>
+                <a:r>
+                  <a:rPr kumimoji="0" lang="en-US" sz="900" b="0" i="0" u="none" strike="noStrike" kern="1200" cap="none" spc="0" normalizeH="0" baseline="0" noProof="0" dirty="0">
+                    <a:ln>
+                      <a:noFill/>
+                    </a:ln>
+                    <a:solidFill>
+                      <a:prstClr val="black"/>
+                    </a:solidFill>
+                    <a:effectLst/>
+                    <a:uLnTx/>
+                    <a:uFillTx/>
+                    <a:ea typeface="+mn-ea"/>
+                    <a:cs typeface="+mn-cs"/>
+                  </a:rPr>
+                  <a:t>runs</a:t>
+                </a:r>
+              </a:p>
+            </p:txBody>
+          </p:sp>
+        </p:grpSp>
+      </p:grpSp>
+    </p:spTree>
+    <p:extLst>
+      <p:ext uri="{BB962C8B-B14F-4D97-AF65-F5344CB8AC3E}">
         <p14:creationId xmlns:p14="http://schemas.microsoft.com/office/powerpoint/2010/main" val="2669653796"/>
       </p:ext>
     </p:extLst>

</xml_diff>